<commit_message>
add lab tasks & slides
</commit_message>
<xml_diff>
--- a/CSE-601/Academia Slides-Books/Lecure 02.pptx
+++ b/CSE-601/Academia Slides-Books/Lecure 02.pptx
@@ -1,41 +1,41 @@
 
 <file path=ppt/presentation.xml><?xml version="1.0" encoding="utf-8"?>
-<p:presentation xmlns:a="http://schemas.openxmlformats.org/drawingml/2006/main" xmlns:r="http://schemas.openxmlformats.org/officeDocument/2006/relationships" xmlns:p="http://schemas.openxmlformats.org/presentationml/2006/main" saveSubsetFonts="1">
+<p:presentation xmlns:a="http://schemas.openxmlformats.org/drawingml/2006/main" xmlns:r="http://schemas.openxmlformats.org/officeDocument/2006/relationships" xmlns:p="http://schemas.openxmlformats.org/presentationml/2006/main">
   <p:sldMasterIdLst>
     <p:sldMasterId id="2147483648" r:id="rId1"/>
   </p:sldMasterIdLst>
   <p:notesMasterIdLst>
-    <p:notesMasterId r:id="rId30"/>
+    <p:notesMasterId r:id="rId31"/>
   </p:notesMasterIdLst>
   <p:sldIdLst>
-    <p:sldId id="256" r:id="rId2"/>
-    <p:sldId id="284" r:id="rId3"/>
-    <p:sldId id="313" r:id="rId4"/>
-    <p:sldId id="312" r:id="rId5"/>
-    <p:sldId id="285" r:id="rId6"/>
-    <p:sldId id="286" r:id="rId7"/>
-    <p:sldId id="287" r:id="rId8"/>
-    <p:sldId id="275" r:id="rId9"/>
-    <p:sldId id="314" r:id="rId10"/>
-    <p:sldId id="276" r:id="rId11"/>
-    <p:sldId id="277" r:id="rId12"/>
-    <p:sldId id="278" r:id="rId13"/>
-    <p:sldId id="279" r:id="rId14"/>
-    <p:sldId id="280" r:id="rId15"/>
-    <p:sldId id="281" r:id="rId16"/>
-    <p:sldId id="282" r:id="rId17"/>
-    <p:sldId id="283" r:id="rId18"/>
-    <p:sldId id="288" r:id="rId19"/>
-    <p:sldId id="291" r:id="rId20"/>
-    <p:sldId id="292" r:id="rId21"/>
-    <p:sldId id="311" r:id="rId22"/>
-    <p:sldId id="294" r:id="rId23"/>
-    <p:sldId id="289" r:id="rId24"/>
-    <p:sldId id="315" r:id="rId25"/>
-    <p:sldId id="290" r:id="rId26"/>
-    <p:sldId id="316" r:id="rId27"/>
-    <p:sldId id="317" r:id="rId28"/>
-    <p:sldId id="318" r:id="rId29"/>
+    <p:sldId id="256" r:id="rId3"/>
+    <p:sldId id="284" r:id="rId4"/>
+    <p:sldId id="313" r:id="rId5"/>
+    <p:sldId id="312" r:id="rId6"/>
+    <p:sldId id="285" r:id="rId7"/>
+    <p:sldId id="286" r:id="rId8"/>
+    <p:sldId id="287" r:id="rId9"/>
+    <p:sldId id="275" r:id="rId10"/>
+    <p:sldId id="314" r:id="rId11"/>
+    <p:sldId id="276" r:id="rId12"/>
+    <p:sldId id="277" r:id="rId13"/>
+    <p:sldId id="278" r:id="rId14"/>
+    <p:sldId id="279" r:id="rId15"/>
+    <p:sldId id="280" r:id="rId16"/>
+    <p:sldId id="281" r:id="rId17"/>
+    <p:sldId id="282" r:id="rId18"/>
+    <p:sldId id="283" r:id="rId19"/>
+    <p:sldId id="288" r:id="rId20"/>
+    <p:sldId id="291" r:id="rId21"/>
+    <p:sldId id="292" r:id="rId22"/>
+    <p:sldId id="311" r:id="rId23"/>
+    <p:sldId id="294" r:id="rId24"/>
+    <p:sldId id="289" r:id="rId25"/>
+    <p:sldId id="315" r:id="rId26"/>
+    <p:sldId id="290" r:id="rId27"/>
+    <p:sldId id="316" r:id="rId28"/>
+    <p:sldId id="317" r:id="rId29"/>
+    <p:sldId id="318" r:id="rId30"/>
   </p:sldIdLst>
   <p:sldSz cx="12192000" cy="6858000"/>
   <p:notesSz cx="6858000" cy="9144000"/>
@@ -134,11 +134,6 @@
       </a:defRPr>
     </a:lvl9pPr>
   </p:defaultTextStyle>
-  <p:extLst>
-    <p:ext uri="{EFAFB233-063F-42B5-8137-9DF3F51BA10A}">
-      <p15:sldGuideLst xmlns:p15="http://schemas.microsoft.com/office/powerpoint/2012/main"/>
-    </p:ext>
-  </p:extLst>
 </p:presentation>
 </file>
 
@@ -224,7 +219,6 @@
           <a:p>
             <a:fld id="{99453B2A-649C-47D2-B149-313A8222923C}" type="datetimeFigureOut">
               <a:rPr lang="en-US" smtClean="0"/>
-              <a:t>4/21/2025</a:t>
             </a:fld>
             <a:endParaRPr lang="en-US"/>
           </a:p>
@@ -291,6 +285,7 @@
               <a:rPr lang="en-US"/>
               <a:t>Click to edit Master text styles</a:t>
             </a:r>
+            <a:endParaRPr lang="en-US"/>
           </a:p>
           <a:p>
             <a:pPr lvl="1"/>
@@ -298,6 +293,7 @@
               <a:rPr lang="en-US"/>
               <a:t>Second level</a:t>
             </a:r>
+            <a:endParaRPr lang="en-US"/>
           </a:p>
           <a:p>
             <a:pPr lvl="2"/>
@@ -305,6 +301,7 @@
               <a:rPr lang="en-US"/>
               <a:t>Third level</a:t>
             </a:r>
+            <a:endParaRPr lang="en-US"/>
           </a:p>
           <a:p>
             <a:pPr lvl="3"/>
@@ -312,6 +309,7 @@
               <a:rPr lang="en-US"/>
               <a:t>Fourth level</a:t>
             </a:r>
+            <a:endParaRPr lang="en-US"/>
           </a:p>
           <a:p>
             <a:pPr lvl="4"/>
@@ -319,6 +317,7 @@
               <a:rPr lang="en-US"/>
               <a:t>Fifth level</a:t>
             </a:r>
+            <a:endParaRPr lang="en-US"/>
           </a:p>
         </p:txBody>
       </p:sp>
@@ -382,18 +381,12 @@
           <a:p>
             <a:fld id="{DF93E89F-D0F4-4845-90C4-681A217667AE}" type="slidenum">
               <a:rPr lang="en-US" smtClean="0"/>
-              <a:t>‹#›</a:t>
             </a:fld>
             <a:endParaRPr lang="en-US"/>
           </a:p>
         </p:txBody>
       </p:sp>
     </p:spTree>
-    <p:extLst>
-      <p:ext uri="{BB962C8B-B14F-4D97-AF65-F5344CB8AC3E}">
-        <p14:creationId xmlns:p14="http://schemas.microsoft.com/office/powerpoint/2010/main" val="2439253828"/>
-      </p:ext>
-    </p:extLst>
   </p:cSld>
   <p:clrMap bg1="lt1" tx1="dk1" bg2="lt2" tx2="dk2" accent1="accent1" accent2="accent2" accent3="accent3" accent4="accent4" accent5="accent5" accent6="accent6" hlink="hlink" folHlink="folHlink"/>
   <p:notesStyle>
@@ -510,13 +503,7 @@
       </p:grpSpPr>
       <p:sp>
         <p:nvSpPr>
-          <p:cNvPr id="2" name="Title 1">
-            <a:extLst>
-              <a:ext uri="{FF2B5EF4-FFF2-40B4-BE49-F238E27FC236}">
-                <a16:creationId xmlns:a16="http://schemas.microsoft.com/office/drawing/2014/main" id="{D580EA83-B123-B348-623C-99A9C824942C}"/>
-              </a:ext>
-            </a:extLst>
-          </p:cNvPr>
+          <p:cNvPr id="2" name="Title 1"/>
           <p:cNvSpPr>
             <a:spLocks noGrp="1"/>
           </p:cNvSpPr>
@@ -544,18 +531,13 @@
               <a:rPr lang="en-US" dirty="0"/>
               <a:t>Click to edit Master title style</a:t>
             </a:r>
-          </a:p>
-        </p:txBody>
-      </p:sp>
-      <p:sp>
-        <p:nvSpPr>
-          <p:cNvPr id="3" name="Subtitle 2">
-            <a:extLst>
-              <a:ext uri="{FF2B5EF4-FFF2-40B4-BE49-F238E27FC236}">
-                <a16:creationId xmlns:a16="http://schemas.microsoft.com/office/drawing/2014/main" id="{29B7BDDB-CC5F-C462-45DA-B31AF985E03E}"/>
-              </a:ext>
-            </a:extLst>
-          </p:cNvPr>
+            <a:endParaRPr lang="en-US" dirty="0"/>
+          </a:p>
+        </p:txBody>
+      </p:sp>
+      <p:sp>
+        <p:nvSpPr>
+          <p:cNvPr id="3" name="Subtitle 2"/>
           <p:cNvSpPr>
             <a:spLocks noGrp="1"/>
           </p:cNvSpPr>
@@ -618,18 +600,13 @@
               <a:rPr lang="en-US" dirty="0"/>
               <a:t>Click to edit Master subtitle style</a:t>
             </a:r>
-          </a:p>
-        </p:txBody>
-      </p:sp>
-      <p:sp>
-        <p:nvSpPr>
-          <p:cNvPr id="4" name="Date Placeholder 3">
-            <a:extLst>
-              <a:ext uri="{FF2B5EF4-FFF2-40B4-BE49-F238E27FC236}">
-                <a16:creationId xmlns:a16="http://schemas.microsoft.com/office/drawing/2014/main" id="{04308136-2926-7EAC-6709-CB6F6B906332}"/>
-              </a:ext>
-            </a:extLst>
-          </p:cNvPr>
+            <a:endParaRPr lang="en-US" dirty="0"/>
+          </a:p>
+        </p:txBody>
+      </p:sp>
+      <p:sp>
+        <p:nvSpPr>
+          <p:cNvPr id="4" name="Date Placeholder 3"/>
           <p:cNvSpPr>
             <a:spLocks noGrp="1"/>
           </p:cNvSpPr>
@@ -650,8 +627,6 @@
           <a:p>
             <a:fld id="{DADE2353-34E2-4DBF-AFB1-31497BAECD2D}" type="datetimeFigureOut">
               <a:rPr lang="en-US" smtClean="0"/>
-              <a:pPr/>
-              <a:t>4/21/2025</a:t>
             </a:fld>
             <a:endParaRPr lang="en-US" dirty="0"/>
           </a:p>
@@ -659,13 +634,7 @@
       </p:sp>
       <p:sp>
         <p:nvSpPr>
-          <p:cNvPr id="5" name="Footer Placeholder 4">
-            <a:extLst>
-              <a:ext uri="{FF2B5EF4-FFF2-40B4-BE49-F238E27FC236}">
-                <a16:creationId xmlns:a16="http://schemas.microsoft.com/office/drawing/2014/main" id="{868FF8F6-7B2D-2501-5AE4-C7643DC4AD09}"/>
-              </a:ext>
-            </a:extLst>
-          </p:cNvPr>
+          <p:cNvPr id="5" name="Footer Placeholder 4"/>
           <p:cNvSpPr>
             <a:spLocks noGrp="1"/>
           </p:cNvSpPr>
@@ -690,13 +659,7 @@
       </p:sp>
       <p:sp>
         <p:nvSpPr>
-          <p:cNvPr id="6" name="Slide Number Placeholder 5">
-            <a:extLst>
-              <a:ext uri="{FF2B5EF4-FFF2-40B4-BE49-F238E27FC236}">
-                <a16:creationId xmlns:a16="http://schemas.microsoft.com/office/drawing/2014/main" id="{F8685867-F3D5-2506-FFFC-38DEF19B6F0F}"/>
-              </a:ext>
-            </a:extLst>
-          </p:cNvPr>
+          <p:cNvPr id="6" name="Slide Number Placeholder 5"/>
           <p:cNvSpPr>
             <a:spLocks noGrp="1"/>
           </p:cNvSpPr>
@@ -717,19 +680,12 @@
           <a:p>
             <a:fld id="{8170D8CF-7E31-4249-BDB4-34EBE6CF332C}" type="slidenum">
               <a:rPr lang="en-US" smtClean="0"/>
-              <a:pPr/>
-              <a:t>‹#›</a:t>
             </a:fld>
             <a:endParaRPr lang="en-US" dirty="0"/>
           </a:p>
         </p:txBody>
       </p:sp>
     </p:spTree>
-    <p:extLst>
-      <p:ext uri="{BB962C8B-B14F-4D97-AF65-F5344CB8AC3E}">
-        <p14:creationId xmlns:p14="http://schemas.microsoft.com/office/powerpoint/2010/main" val="3665624893"/>
-      </p:ext>
-    </p:extLst>
   </p:cSld>
   <p:clrMapOvr>
     <a:masterClrMapping/>
@@ -756,13 +712,7 @@
       </p:grpSpPr>
       <p:sp>
         <p:nvSpPr>
-          <p:cNvPr id="2" name="Title 1">
-            <a:extLst>
-              <a:ext uri="{FF2B5EF4-FFF2-40B4-BE49-F238E27FC236}">
-                <a16:creationId xmlns:a16="http://schemas.microsoft.com/office/drawing/2014/main" id="{0BE210B2-EA5B-981F-94FC-2D646EAD66CC}"/>
-              </a:ext>
-            </a:extLst>
-          </p:cNvPr>
+          <p:cNvPr id="2" name="Title 1"/>
           <p:cNvSpPr>
             <a:spLocks noGrp="1"/>
           </p:cNvSpPr>
@@ -779,18 +729,13 @@
               <a:rPr lang="en-US"/>
               <a:t>Click to edit Master title style</a:t>
             </a:r>
-          </a:p>
-        </p:txBody>
-      </p:sp>
-      <p:sp>
-        <p:nvSpPr>
-          <p:cNvPr id="3" name="Vertical Text Placeholder 2">
-            <a:extLst>
-              <a:ext uri="{FF2B5EF4-FFF2-40B4-BE49-F238E27FC236}">
-                <a16:creationId xmlns:a16="http://schemas.microsoft.com/office/drawing/2014/main" id="{8E9A106F-7F89-F47E-17EA-668B446AAD97}"/>
-              </a:ext>
-            </a:extLst>
-          </p:cNvPr>
+            <a:endParaRPr lang="en-US"/>
+          </a:p>
+        </p:txBody>
+      </p:sp>
+      <p:sp>
+        <p:nvSpPr>
+          <p:cNvPr id="3" name="Vertical Text Placeholder 2"/>
           <p:cNvSpPr>
             <a:spLocks noGrp="1"/>
           </p:cNvSpPr>
@@ -808,6 +753,7 @@
               <a:rPr lang="en-US"/>
               <a:t>Click to edit Master text styles</a:t>
             </a:r>
+            <a:endParaRPr lang="en-US"/>
           </a:p>
           <a:p>
             <a:pPr lvl="1"/>
@@ -815,6 +761,7 @@
               <a:rPr lang="en-US"/>
               <a:t>Second level</a:t>
             </a:r>
+            <a:endParaRPr lang="en-US"/>
           </a:p>
           <a:p>
             <a:pPr lvl="2"/>
@@ -822,6 +769,7 @@
               <a:rPr lang="en-US"/>
               <a:t>Third level</a:t>
             </a:r>
+            <a:endParaRPr lang="en-US"/>
           </a:p>
           <a:p>
             <a:pPr lvl="3"/>
@@ -829,6 +777,7 @@
               <a:rPr lang="en-US"/>
               <a:t>Fourth level</a:t>
             </a:r>
+            <a:endParaRPr lang="en-US"/>
           </a:p>
           <a:p>
             <a:pPr lvl="4"/>
@@ -836,18 +785,13 @@
               <a:rPr lang="en-US"/>
               <a:t>Fifth level</a:t>
             </a:r>
-          </a:p>
-        </p:txBody>
-      </p:sp>
-      <p:sp>
-        <p:nvSpPr>
-          <p:cNvPr id="4" name="Date Placeholder 3">
-            <a:extLst>
-              <a:ext uri="{FF2B5EF4-FFF2-40B4-BE49-F238E27FC236}">
-                <a16:creationId xmlns:a16="http://schemas.microsoft.com/office/drawing/2014/main" id="{C642C11E-85E7-6A0C-085F-36A62E6ED49B}"/>
-              </a:ext>
-            </a:extLst>
-          </p:cNvPr>
+            <a:endParaRPr lang="en-US"/>
+          </a:p>
+        </p:txBody>
+      </p:sp>
+      <p:sp>
+        <p:nvSpPr>
+          <p:cNvPr id="4" name="Date Placeholder 3"/>
           <p:cNvSpPr>
             <a:spLocks noGrp="1"/>
           </p:cNvSpPr>
@@ -862,7 +806,6 @@
           <a:p>
             <a:fld id="{DADE2353-34E2-4DBF-AFB1-31497BAECD2D}" type="datetimeFigureOut">
               <a:rPr lang="en-US" smtClean="0"/>
-              <a:t>4/21/2025</a:t>
             </a:fld>
             <a:endParaRPr lang="en-US"/>
           </a:p>
@@ -870,13 +813,7 @@
       </p:sp>
       <p:sp>
         <p:nvSpPr>
-          <p:cNvPr id="5" name="Footer Placeholder 4">
-            <a:extLst>
-              <a:ext uri="{FF2B5EF4-FFF2-40B4-BE49-F238E27FC236}">
-                <a16:creationId xmlns:a16="http://schemas.microsoft.com/office/drawing/2014/main" id="{5BF3A187-F559-1562-1E40-852905CEE89B}"/>
-              </a:ext>
-            </a:extLst>
-          </p:cNvPr>
+          <p:cNvPr id="5" name="Footer Placeholder 4"/>
           <p:cNvSpPr>
             <a:spLocks noGrp="1"/>
           </p:cNvSpPr>
@@ -895,13 +832,7 @@
       </p:sp>
       <p:sp>
         <p:nvSpPr>
-          <p:cNvPr id="6" name="Slide Number Placeholder 5">
-            <a:extLst>
-              <a:ext uri="{FF2B5EF4-FFF2-40B4-BE49-F238E27FC236}">
-                <a16:creationId xmlns:a16="http://schemas.microsoft.com/office/drawing/2014/main" id="{A6BDE776-7656-020E-6498-FD01094E33A5}"/>
-              </a:ext>
-            </a:extLst>
-          </p:cNvPr>
+          <p:cNvPr id="6" name="Slide Number Placeholder 5"/>
           <p:cNvSpPr>
             <a:spLocks noGrp="1"/>
           </p:cNvSpPr>
@@ -916,18 +847,12 @@
           <a:p>
             <a:fld id="{8170D8CF-7E31-4249-BDB4-34EBE6CF332C}" type="slidenum">
               <a:rPr lang="en-US" smtClean="0"/>
-              <a:t>‹#›</a:t>
             </a:fld>
             <a:endParaRPr lang="en-US"/>
           </a:p>
         </p:txBody>
       </p:sp>
     </p:spTree>
-    <p:extLst>
-      <p:ext uri="{BB962C8B-B14F-4D97-AF65-F5344CB8AC3E}">
-        <p14:creationId xmlns:p14="http://schemas.microsoft.com/office/powerpoint/2010/main" val="690116682"/>
-      </p:ext>
-    </p:extLst>
   </p:cSld>
   <p:clrMapOvr>
     <a:masterClrMapping/>
@@ -954,13 +879,7 @@
       </p:grpSpPr>
       <p:sp>
         <p:nvSpPr>
-          <p:cNvPr id="2" name="Vertical Title 1">
-            <a:extLst>
-              <a:ext uri="{FF2B5EF4-FFF2-40B4-BE49-F238E27FC236}">
-                <a16:creationId xmlns:a16="http://schemas.microsoft.com/office/drawing/2014/main" id="{F2C40EEC-D70E-0844-EF99-95A4CC26358C}"/>
-              </a:ext>
-            </a:extLst>
-          </p:cNvPr>
+          <p:cNvPr id="2" name="Vertical Title 1"/>
           <p:cNvSpPr>
             <a:spLocks noGrp="1"/>
           </p:cNvSpPr>
@@ -982,18 +901,13 @@
               <a:rPr lang="en-US"/>
               <a:t>Click to edit Master title style</a:t>
             </a:r>
-          </a:p>
-        </p:txBody>
-      </p:sp>
-      <p:sp>
-        <p:nvSpPr>
-          <p:cNvPr id="3" name="Vertical Text Placeholder 2">
-            <a:extLst>
-              <a:ext uri="{FF2B5EF4-FFF2-40B4-BE49-F238E27FC236}">
-                <a16:creationId xmlns:a16="http://schemas.microsoft.com/office/drawing/2014/main" id="{233AC71F-C6F3-8EAE-BCAD-8E8A3DA44750}"/>
-              </a:ext>
-            </a:extLst>
-          </p:cNvPr>
+            <a:endParaRPr lang="en-US"/>
+          </a:p>
+        </p:txBody>
+      </p:sp>
+      <p:sp>
+        <p:nvSpPr>
+          <p:cNvPr id="3" name="Vertical Text Placeholder 2"/>
           <p:cNvSpPr>
             <a:spLocks noGrp="1"/>
           </p:cNvSpPr>
@@ -1016,6 +930,7 @@
               <a:rPr lang="en-US"/>
               <a:t>Click to edit Master text styles</a:t>
             </a:r>
+            <a:endParaRPr lang="en-US"/>
           </a:p>
           <a:p>
             <a:pPr lvl="1"/>
@@ -1023,6 +938,7 @@
               <a:rPr lang="en-US"/>
               <a:t>Second level</a:t>
             </a:r>
+            <a:endParaRPr lang="en-US"/>
           </a:p>
           <a:p>
             <a:pPr lvl="2"/>
@@ -1030,6 +946,7 @@
               <a:rPr lang="en-US"/>
               <a:t>Third level</a:t>
             </a:r>
+            <a:endParaRPr lang="en-US"/>
           </a:p>
           <a:p>
             <a:pPr lvl="3"/>
@@ -1037,6 +954,7 @@
               <a:rPr lang="en-US"/>
               <a:t>Fourth level</a:t>
             </a:r>
+            <a:endParaRPr lang="en-US"/>
           </a:p>
           <a:p>
             <a:pPr lvl="4"/>
@@ -1044,18 +962,13 @@
               <a:rPr lang="en-US"/>
               <a:t>Fifth level</a:t>
             </a:r>
-          </a:p>
-        </p:txBody>
-      </p:sp>
-      <p:sp>
-        <p:nvSpPr>
-          <p:cNvPr id="4" name="Date Placeholder 3">
-            <a:extLst>
-              <a:ext uri="{FF2B5EF4-FFF2-40B4-BE49-F238E27FC236}">
-                <a16:creationId xmlns:a16="http://schemas.microsoft.com/office/drawing/2014/main" id="{04A425F2-EBCC-F04C-FF8C-ADA9B02285CA}"/>
-              </a:ext>
-            </a:extLst>
-          </p:cNvPr>
+            <a:endParaRPr lang="en-US"/>
+          </a:p>
+        </p:txBody>
+      </p:sp>
+      <p:sp>
+        <p:nvSpPr>
+          <p:cNvPr id="4" name="Date Placeholder 3"/>
           <p:cNvSpPr>
             <a:spLocks noGrp="1"/>
           </p:cNvSpPr>
@@ -1070,7 +983,6 @@
           <a:p>
             <a:fld id="{DADE2353-34E2-4DBF-AFB1-31497BAECD2D}" type="datetimeFigureOut">
               <a:rPr lang="en-US" smtClean="0"/>
-              <a:t>4/21/2025</a:t>
             </a:fld>
             <a:endParaRPr lang="en-US"/>
           </a:p>
@@ -1078,13 +990,7 @@
       </p:sp>
       <p:sp>
         <p:nvSpPr>
-          <p:cNvPr id="5" name="Footer Placeholder 4">
-            <a:extLst>
-              <a:ext uri="{FF2B5EF4-FFF2-40B4-BE49-F238E27FC236}">
-                <a16:creationId xmlns:a16="http://schemas.microsoft.com/office/drawing/2014/main" id="{2818C89F-3F70-48FA-D722-C07F224ABAD5}"/>
-              </a:ext>
-            </a:extLst>
-          </p:cNvPr>
+          <p:cNvPr id="5" name="Footer Placeholder 4"/>
           <p:cNvSpPr>
             <a:spLocks noGrp="1"/>
           </p:cNvSpPr>
@@ -1103,13 +1009,7 @@
       </p:sp>
       <p:sp>
         <p:nvSpPr>
-          <p:cNvPr id="6" name="Slide Number Placeholder 5">
-            <a:extLst>
-              <a:ext uri="{FF2B5EF4-FFF2-40B4-BE49-F238E27FC236}">
-                <a16:creationId xmlns:a16="http://schemas.microsoft.com/office/drawing/2014/main" id="{695D372A-8E0E-6F0C-1625-2E5A32F641C2}"/>
-              </a:ext>
-            </a:extLst>
-          </p:cNvPr>
+          <p:cNvPr id="6" name="Slide Number Placeholder 5"/>
           <p:cNvSpPr>
             <a:spLocks noGrp="1"/>
           </p:cNvSpPr>
@@ -1124,18 +1024,12 @@
           <a:p>
             <a:fld id="{8170D8CF-7E31-4249-BDB4-34EBE6CF332C}" type="slidenum">
               <a:rPr lang="en-US" smtClean="0"/>
-              <a:t>‹#›</a:t>
             </a:fld>
             <a:endParaRPr lang="en-US"/>
           </a:p>
         </p:txBody>
       </p:sp>
     </p:spTree>
-    <p:extLst>
-      <p:ext uri="{BB962C8B-B14F-4D97-AF65-F5344CB8AC3E}">
-        <p14:creationId xmlns:p14="http://schemas.microsoft.com/office/powerpoint/2010/main" val="1687168043"/>
-      </p:ext>
-    </p:extLst>
   </p:cSld>
   <p:clrMapOvr>
     <a:masterClrMapping/>
@@ -1162,13 +1056,7 @@
       </p:grpSpPr>
       <p:sp>
         <p:nvSpPr>
-          <p:cNvPr id="2" name="Title 1">
-            <a:extLst>
-              <a:ext uri="{FF2B5EF4-FFF2-40B4-BE49-F238E27FC236}">
-                <a16:creationId xmlns:a16="http://schemas.microsoft.com/office/drawing/2014/main" id="{D1628EBC-77B7-5541-D05B-C0FFB571C5CD}"/>
-              </a:ext>
-            </a:extLst>
-          </p:cNvPr>
+          <p:cNvPr id="2" name="Title 1"/>
           <p:cNvSpPr>
             <a:spLocks noGrp="1"/>
           </p:cNvSpPr>
@@ -1185,18 +1073,13 @@
               <a:rPr lang="en-US"/>
               <a:t>Click to edit Master title style</a:t>
             </a:r>
-          </a:p>
-        </p:txBody>
-      </p:sp>
-      <p:sp>
-        <p:nvSpPr>
-          <p:cNvPr id="3" name="Content Placeholder 2">
-            <a:extLst>
-              <a:ext uri="{FF2B5EF4-FFF2-40B4-BE49-F238E27FC236}">
-                <a16:creationId xmlns:a16="http://schemas.microsoft.com/office/drawing/2014/main" id="{5C24A5B2-8878-4CF3-235D-2E4DA7AE38B0}"/>
-              </a:ext>
-            </a:extLst>
-          </p:cNvPr>
+            <a:endParaRPr lang="en-US"/>
+          </a:p>
+        </p:txBody>
+      </p:sp>
+      <p:sp>
+        <p:nvSpPr>
+          <p:cNvPr id="3" name="Content Placeholder 2"/>
           <p:cNvSpPr>
             <a:spLocks noGrp="1"/>
           </p:cNvSpPr>
@@ -1214,6 +1097,7 @@
               <a:rPr lang="en-US"/>
               <a:t>Click to edit Master text styles</a:t>
             </a:r>
+            <a:endParaRPr lang="en-US"/>
           </a:p>
           <a:p>
             <a:pPr lvl="1"/>
@@ -1221,6 +1105,7 @@
               <a:rPr lang="en-US"/>
               <a:t>Second level</a:t>
             </a:r>
+            <a:endParaRPr lang="en-US"/>
           </a:p>
           <a:p>
             <a:pPr lvl="2"/>
@@ -1228,6 +1113,7 @@
               <a:rPr lang="en-US"/>
               <a:t>Third level</a:t>
             </a:r>
+            <a:endParaRPr lang="en-US"/>
           </a:p>
           <a:p>
             <a:pPr lvl="3"/>
@@ -1235,6 +1121,7 @@
               <a:rPr lang="en-US"/>
               <a:t>Fourth level</a:t>
             </a:r>
+            <a:endParaRPr lang="en-US"/>
           </a:p>
           <a:p>
             <a:pPr lvl="4"/>
@@ -1242,18 +1129,13 @@
               <a:rPr lang="en-US"/>
               <a:t>Fifth level</a:t>
             </a:r>
-          </a:p>
-        </p:txBody>
-      </p:sp>
-      <p:sp>
-        <p:nvSpPr>
-          <p:cNvPr id="4" name="Date Placeholder 3">
-            <a:extLst>
-              <a:ext uri="{FF2B5EF4-FFF2-40B4-BE49-F238E27FC236}">
-                <a16:creationId xmlns:a16="http://schemas.microsoft.com/office/drawing/2014/main" id="{F9BDA52E-A09B-6BBB-0E0B-64382854B1CA}"/>
-              </a:ext>
-            </a:extLst>
-          </p:cNvPr>
+            <a:endParaRPr lang="en-US"/>
+          </a:p>
+        </p:txBody>
+      </p:sp>
+      <p:sp>
+        <p:nvSpPr>
+          <p:cNvPr id="4" name="Date Placeholder 3"/>
           <p:cNvSpPr>
             <a:spLocks noGrp="1"/>
           </p:cNvSpPr>
@@ -1268,7 +1150,6 @@
           <a:p>
             <a:fld id="{DADE2353-34E2-4DBF-AFB1-31497BAECD2D}" type="datetimeFigureOut">
               <a:rPr lang="en-US" smtClean="0"/>
-              <a:t>4/21/2025</a:t>
             </a:fld>
             <a:endParaRPr lang="en-US"/>
           </a:p>
@@ -1276,13 +1157,7 @@
       </p:sp>
       <p:sp>
         <p:nvSpPr>
-          <p:cNvPr id="5" name="Footer Placeholder 4">
-            <a:extLst>
-              <a:ext uri="{FF2B5EF4-FFF2-40B4-BE49-F238E27FC236}">
-                <a16:creationId xmlns:a16="http://schemas.microsoft.com/office/drawing/2014/main" id="{DB73CAA4-028F-8789-1672-F67A9308110C}"/>
-              </a:ext>
-            </a:extLst>
-          </p:cNvPr>
+          <p:cNvPr id="5" name="Footer Placeholder 4"/>
           <p:cNvSpPr>
             <a:spLocks noGrp="1"/>
           </p:cNvSpPr>
@@ -1301,13 +1176,7 @@
       </p:sp>
       <p:sp>
         <p:nvSpPr>
-          <p:cNvPr id="6" name="Slide Number Placeholder 5">
-            <a:extLst>
-              <a:ext uri="{FF2B5EF4-FFF2-40B4-BE49-F238E27FC236}">
-                <a16:creationId xmlns:a16="http://schemas.microsoft.com/office/drawing/2014/main" id="{0FF46198-031F-4A77-B121-612492FEC199}"/>
-              </a:ext>
-            </a:extLst>
-          </p:cNvPr>
+          <p:cNvPr id="6" name="Slide Number Placeholder 5"/>
           <p:cNvSpPr>
             <a:spLocks noGrp="1"/>
           </p:cNvSpPr>
@@ -1322,18 +1191,12 @@
           <a:p>
             <a:fld id="{8170D8CF-7E31-4249-BDB4-34EBE6CF332C}" type="slidenum">
               <a:rPr lang="en-US" smtClean="0"/>
-              <a:t>‹#›</a:t>
             </a:fld>
             <a:endParaRPr lang="en-US"/>
           </a:p>
         </p:txBody>
       </p:sp>
     </p:spTree>
-    <p:extLst>
-      <p:ext uri="{BB962C8B-B14F-4D97-AF65-F5344CB8AC3E}">
-        <p14:creationId xmlns:p14="http://schemas.microsoft.com/office/powerpoint/2010/main" val="3474325578"/>
-      </p:ext>
-    </p:extLst>
   </p:cSld>
   <p:clrMapOvr>
     <a:masterClrMapping/>
@@ -1360,13 +1223,7 @@
       </p:grpSpPr>
       <p:sp>
         <p:nvSpPr>
-          <p:cNvPr id="2" name="Title 1">
-            <a:extLst>
-              <a:ext uri="{FF2B5EF4-FFF2-40B4-BE49-F238E27FC236}">
-                <a16:creationId xmlns:a16="http://schemas.microsoft.com/office/drawing/2014/main" id="{1248764A-AFDE-6C65-0399-86E094B4F107}"/>
-              </a:ext>
-            </a:extLst>
-          </p:cNvPr>
+          <p:cNvPr id="2" name="Title 1"/>
           <p:cNvSpPr>
             <a:spLocks noGrp="1"/>
           </p:cNvSpPr>
@@ -1392,18 +1249,13 @@
               <a:rPr lang="en-US" dirty="0"/>
               <a:t>Click to edit Master title style</a:t>
             </a:r>
-          </a:p>
-        </p:txBody>
-      </p:sp>
-      <p:sp>
-        <p:nvSpPr>
-          <p:cNvPr id="3" name="Text Placeholder 2">
-            <a:extLst>
-              <a:ext uri="{FF2B5EF4-FFF2-40B4-BE49-F238E27FC236}">
-                <a16:creationId xmlns:a16="http://schemas.microsoft.com/office/drawing/2014/main" id="{EA7015BA-9872-EB93-DF18-E312DAD8E2A4}"/>
-              </a:ext>
-            </a:extLst>
-          </p:cNvPr>
+            <a:endParaRPr lang="en-US" dirty="0"/>
+          </a:p>
+        </p:txBody>
+      </p:sp>
+      <p:sp>
+        <p:nvSpPr>
+          <p:cNvPr id="3" name="Text Placeholder 2"/>
           <p:cNvSpPr>
             <a:spLocks noGrp="1"/>
           </p:cNvSpPr>
@@ -1517,18 +1369,13 @@
               <a:rPr lang="en-US"/>
               <a:t>Click to edit Master text styles</a:t>
             </a:r>
-          </a:p>
-        </p:txBody>
-      </p:sp>
-      <p:sp>
-        <p:nvSpPr>
-          <p:cNvPr id="4" name="Date Placeholder 3">
-            <a:extLst>
-              <a:ext uri="{FF2B5EF4-FFF2-40B4-BE49-F238E27FC236}">
-                <a16:creationId xmlns:a16="http://schemas.microsoft.com/office/drawing/2014/main" id="{740E1158-C4EE-164E-5236-299A7F35595D}"/>
-              </a:ext>
-            </a:extLst>
-          </p:cNvPr>
+            <a:endParaRPr lang="en-US"/>
+          </a:p>
+        </p:txBody>
+      </p:sp>
+      <p:sp>
+        <p:nvSpPr>
+          <p:cNvPr id="4" name="Date Placeholder 3"/>
           <p:cNvSpPr>
             <a:spLocks noGrp="1"/>
           </p:cNvSpPr>
@@ -1543,7 +1390,6 @@
           <a:p>
             <a:fld id="{DADE2353-34E2-4DBF-AFB1-31497BAECD2D}" type="datetimeFigureOut">
               <a:rPr lang="en-US" smtClean="0"/>
-              <a:t>4/21/2025</a:t>
             </a:fld>
             <a:endParaRPr lang="en-US"/>
           </a:p>
@@ -1551,13 +1397,7 @@
       </p:sp>
       <p:sp>
         <p:nvSpPr>
-          <p:cNvPr id="5" name="Footer Placeholder 4">
-            <a:extLst>
-              <a:ext uri="{FF2B5EF4-FFF2-40B4-BE49-F238E27FC236}">
-                <a16:creationId xmlns:a16="http://schemas.microsoft.com/office/drawing/2014/main" id="{B7A1F21B-38AF-5D67-5BD7-95FB90057B2D}"/>
-              </a:ext>
-            </a:extLst>
-          </p:cNvPr>
+          <p:cNvPr id="5" name="Footer Placeholder 4"/>
           <p:cNvSpPr>
             <a:spLocks noGrp="1"/>
           </p:cNvSpPr>
@@ -1576,13 +1416,7 @@
       </p:sp>
       <p:sp>
         <p:nvSpPr>
-          <p:cNvPr id="6" name="Slide Number Placeholder 5">
-            <a:extLst>
-              <a:ext uri="{FF2B5EF4-FFF2-40B4-BE49-F238E27FC236}">
-                <a16:creationId xmlns:a16="http://schemas.microsoft.com/office/drawing/2014/main" id="{B7D03564-BFC7-AF2C-F528-1411B52D0AD5}"/>
-              </a:ext>
-            </a:extLst>
-          </p:cNvPr>
+          <p:cNvPr id="6" name="Slide Number Placeholder 5"/>
           <p:cNvSpPr>
             <a:spLocks noGrp="1"/>
           </p:cNvSpPr>
@@ -1597,18 +1431,12 @@
           <a:p>
             <a:fld id="{8170D8CF-7E31-4249-BDB4-34EBE6CF332C}" type="slidenum">
               <a:rPr lang="en-US" smtClean="0"/>
-              <a:t>‹#›</a:t>
             </a:fld>
             <a:endParaRPr lang="en-US"/>
           </a:p>
         </p:txBody>
       </p:sp>
     </p:spTree>
-    <p:extLst>
-      <p:ext uri="{BB962C8B-B14F-4D97-AF65-F5344CB8AC3E}">
-        <p14:creationId xmlns:p14="http://schemas.microsoft.com/office/powerpoint/2010/main" val="944839112"/>
-      </p:ext>
-    </p:extLst>
   </p:cSld>
   <p:clrMapOvr>
     <a:masterClrMapping/>
@@ -1635,13 +1463,7 @@
       </p:grpSpPr>
       <p:sp>
         <p:nvSpPr>
-          <p:cNvPr id="2" name="Title 1">
-            <a:extLst>
-              <a:ext uri="{FF2B5EF4-FFF2-40B4-BE49-F238E27FC236}">
-                <a16:creationId xmlns:a16="http://schemas.microsoft.com/office/drawing/2014/main" id="{B439EF2F-C0C8-F4B7-AC9F-0603498CFDE4}"/>
-              </a:ext>
-            </a:extLst>
-          </p:cNvPr>
+          <p:cNvPr id="2" name="Title 1"/>
           <p:cNvSpPr>
             <a:spLocks noGrp="1"/>
           </p:cNvSpPr>
@@ -1658,18 +1480,13 @@
               <a:rPr lang="en-US" dirty="0"/>
               <a:t>Click to edit Master title style</a:t>
             </a:r>
-          </a:p>
-        </p:txBody>
-      </p:sp>
-      <p:sp>
-        <p:nvSpPr>
-          <p:cNvPr id="3" name="Content Placeholder 2">
-            <a:extLst>
-              <a:ext uri="{FF2B5EF4-FFF2-40B4-BE49-F238E27FC236}">
-                <a16:creationId xmlns:a16="http://schemas.microsoft.com/office/drawing/2014/main" id="{3582DFC6-91C0-2E02-4DF5-FFCAE9D73393}"/>
-              </a:ext>
-            </a:extLst>
-          </p:cNvPr>
+            <a:endParaRPr lang="en-US" dirty="0"/>
+          </a:p>
+        </p:txBody>
+      </p:sp>
+      <p:sp>
+        <p:nvSpPr>
+          <p:cNvPr id="3" name="Content Placeholder 2"/>
           <p:cNvSpPr>
             <a:spLocks noGrp="1"/>
           </p:cNvSpPr>
@@ -1692,6 +1509,7 @@
               <a:rPr lang="en-US" dirty="0"/>
               <a:t>Click to edit Master text styles</a:t>
             </a:r>
+            <a:endParaRPr lang="en-US" dirty="0"/>
           </a:p>
           <a:p>
             <a:pPr lvl="1"/>
@@ -1699,6 +1517,7 @@
               <a:rPr lang="en-US" dirty="0"/>
               <a:t>Second level</a:t>
             </a:r>
+            <a:endParaRPr lang="en-US" dirty="0"/>
           </a:p>
           <a:p>
             <a:pPr lvl="2"/>
@@ -1706,6 +1525,7 @@
               <a:rPr lang="en-US" dirty="0"/>
               <a:t>Third level</a:t>
             </a:r>
+            <a:endParaRPr lang="en-US" dirty="0"/>
           </a:p>
           <a:p>
             <a:pPr lvl="3"/>
@@ -1713,6 +1533,7 @@
               <a:rPr lang="en-US" dirty="0"/>
               <a:t>Fourth level</a:t>
             </a:r>
+            <a:endParaRPr lang="en-US" dirty="0"/>
           </a:p>
           <a:p>
             <a:pPr lvl="4"/>
@@ -1720,18 +1541,13 @@
               <a:rPr lang="en-US" dirty="0"/>
               <a:t>Fifth level</a:t>
             </a:r>
-          </a:p>
-        </p:txBody>
-      </p:sp>
-      <p:sp>
-        <p:nvSpPr>
-          <p:cNvPr id="4" name="Content Placeholder 3">
-            <a:extLst>
-              <a:ext uri="{FF2B5EF4-FFF2-40B4-BE49-F238E27FC236}">
-                <a16:creationId xmlns:a16="http://schemas.microsoft.com/office/drawing/2014/main" id="{E0FAF2D9-BB3D-2B57-1C79-3C614660D606}"/>
-              </a:ext>
-            </a:extLst>
-          </p:cNvPr>
+            <a:endParaRPr lang="en-US" dirty="0"/>
+          </a:p>
+        </p:txBody>
+      </p:sp>
+      <p:sp>
+        <p:nvSpPr>
+          <p:cNvPr id="4" name="Content Placeholder 3"/>
           <p:cNvSpPr>
             <a:spLocks noGrp="1"/>
           </p:cNvSpPr>
@@ -1754,6 +1570,7 @@
               <a:rPr lang="en-US"/>
               <a:t>Click to edit Master text styles</a:t>
             </a:r>
+            <a:endParaRPr lang="en-US"/>
           </a:p>
           <a:p>
             <a:pPr lvl="1"/>
@@ -1761,6 +1578,7 @@
               <a:rPr lang="en-US"/>
               <a:t>Second level</a:t>
             </a:r>
+            <a:endParaRPr lang="en-US"/>
           </a:p>
           <a:p>
             <a:pPr lvl="2"/>
@@ -1768,6 +1586,7 @@
               <a:rPr lang="en-US"/>
               <a:t>Third level</a:t>
             </a:r>
+            <a:endParaRPr lang="en-US"/>
           </a:p>
           <a:p>
             <a:pPr lvl="3"/>
@@ -1775,6 +1594,7 @@
               <a:rPr lang="en-US"/>
               <a:t>Fourth level</a:t>
             </a:r>
+            <a:endParaRPr lang="en-US"/>
           </a:p>
           <a:p>
             <a:pPr lvl="4"/>
@@ -1782,18 +1602,13 @@
               <a:rPr lang="en-US"/>
               <a:t>Fifth level</a:t>
             </a:r>
-          </a:p>
-        </p:txBody>
-      </p:sp>
-      <p:sp>
-        <p:nvSpPr>
-          <p:cNvPr id="5" name="Date Placeholder 4">
-            <a:extLst>
-              <a:ext uri="{FF2B5EF4-FFF2-40B4-BE49-F238E27FC236}">
-                <a16:creationId xmlns:a16="http://schemas.microsoft.com/office/drawing/2014/main" id="{76F89D1C-DE7A-F3D2-BBD8-2212007CF9AC}"/>
-              </a:ext>
-            </a:extLst>
-          </p:cNvPr>
+            <a:endParaRPr lang="en-US"/>
+          </a:p>
+        </p:txBody>
+      </p:sp>
+      <p:sp>
+        <p:nvSpPr>
+          <p:cNvPr id="5" name="Date Placeholder 4"/>
           <p:cNvSpPr>
             <a:spLocks noGrp="1"/>
           </p:cNvSpPr>
@@ -1808,7 +1623,6 @@
           <a:p>
             <a:fld id="{DADE2353-34E2-4DBF-AFB1-31497BAECD2D}" type="datetimeFigureOut">
               <a:rPr lang="en-US" smtClean="0"/>
-              <a:t>4/21/2025</a:t>
             </a:fld>
             <a:endParaRPr lang="en-US"/>
           </a:p>
@@ -1816,13 +1630,7 @@
       </p:sp>
       <p:sp>
         <p:nvSpPr>
-          <p:cNvPr id="6" name="Footer Placeholder 5">
-            <a:extLst>
-              <a:ext uri="{FF2B5EF4-FFF2-40B4-BE49-F238E27FC236}">
-                <a16:creationId xmlns:a16="http://schemas.microsoft.com/office/drawing/2014/main" id="{FC6498EA-AFFA-7930-38AD-80128E1A0420}"/>
-              </a:ext>
-            </a:extLst>
-          </p:cNvPr>
+          <p:cNvPr id="6" name="Footer Placeholder 5"/>
           <p:cNvSpPr>
             <a:spLocks noGrp="1"/>
           </p:cNvSpPr>
@@ -1841,13 +1649,7 @@
       </p:sp>
       <p:sp>
         <p:nvSpPr>
-          <p:cNvPr id="7" name="Slide Number Placeholder 6">
-            <a:extLst>
-              <a:ext uri="{FF2B5EF4-FFF2-40B4-BE49-F238E27FC236}">
-                <a16:creationId xmlns:a16="http://schemas.microsoft.com/office/drawing/2014/main" id="{4D3B5B4F-6EFF-B061-8AF1-8E8B533DC6E7}"/>
-              </a:ext>
-            </a:extLst>
-          </p:cNvPr>
+          <p:cNvPr id="7" name="Slide Number Placeholder 6"/>
           <p:cNvSpPr>
             <a:spLocks noGrp="1"/>
           </p:cNvSpPr>
@@ -1862,18 +1664,12 @@
           <a:p>
             <a:fld id="{8170D8CF-7E31-4249-BDB4-34EBE6CF332C}" type="slidenum">
               <a:rPr lang="en-US" smtClean="0"/>
-              <a:t>‹#›</a:t>
             </a:fld>
             <a:endParaRPr lang="en-US"/>
           </a:p>
         </p:txBody>
       </p:sp>
     </p:spTree>
-    <p:extLst>
-      <p:ext uri="{BB962C8B-B14F-4D97-AF65-F5344CB8AC3E}">
-        <p14:creationId xmlns:p14="http://schemas.microsoft.com/office/powerpoint/2010/main" val="2788377693"/>
-      </p:ext>
-    </p:extLst>
   </p:cSld>
   <p:clrMapOvr>
     <a:masterClrMapping/>
@@ -1900,13 +1696,7 @@
       </p:grpSpPr>
       <p:sp>
         <p:nvSpPr>
-          <p:cNvPr id="2" name="Title 1">
-            <a:extLst>
-              <a:ext uri="{FF2B5EF4-FFF2-40B4-BE49-F238E27FC236}">
-                <a16:creationId xmlns:a16="http://schemas.microsoft.com/office/drawing/2014/main" id="{215B2DDE-1663-177E-8BD7-8BEC80D2FEC0}"/>
-              </a:ext>
-            </a:extLst>
-          </p:cNvPr>
+          <p:cNvPr id="2" name="Title 1"/>
           <p:cNvSpPr>
             <a:spLocks noGrp="1"/>
           </p:cNvSpPr>
@@ -1928,18 +1718,13 @@
               <a:rPr lang="en-US"/>
               <a:t>Click to edit Master title style</a:t>
             </a:r>
-          </a:p>
-        </p:txBody>
-      </p:sp>
-      <p:sp>
-        <p:nvSpPr>
-          <p:cNvPr id="3" name="Text Placeholder 2">
-            <a:extLst>
-              <a:ext uri="{FF2B5EF4-FFF2-40B4-BE49-F238E27FC236}">
-                <a16:creationId xmlns:a16="http://schemas.microsoft.com/office/drawing/2014/main" id="{B4A99556-AE83-E79F-2D3C-772B56BAC938}"/>
-              </a:ext>
-            </a:extLst>
-          </p:cNvPr>
+            <a:endParaRPr lang="en-US"/>
+          </a:p>
+        </p:txBody>
+      </p:sp>
+      <p:sp>
+        <p:nvSpPr>
+          <p:cNvPr id="3" name="Text Placeholder 2"/>
           <p:cNvSpPr>
             <a:spLocks noGrp="1"/>
           </p:cNvSpPr>
@@ -1999,18 +1784,13 @@
               <a:rPr lang="en-US"/>
               <a:t>Click to edit Master text styles</a:t>
             </a:r>
-          </a:p>
-        </p:txBody>
-      </p:sp>
-      <p:sp>
-        <p:nvSpPr>
-          <p:cNvPr id="4" name="Content Placeholder 3">
-            <a:extLst>
-              <a:ext uri="{FF2B5EF4-FFF2-40B4-BE49-F238E27FC236}">
-                <a16:creationId xmlns:a16="http://schemas.microsoft.com/office/drawing/2014/main" id="{35FA90DF-E452-316F-79B9-BD362BF25E61}"/>
-              </a:ext>
-            </a:extLst>
-          </p:cNvPr>
+            <a:endParaRPr lang="en-US"/>
+          </a:p>
+        </p:txBody>
+      </p:sp>
+      <p:sp>
+        <p:nvSpPr>
+          <p:cNvPr id="4" name="Content Placeholder 3"/>
           <p:cNvSpPr>
             <a:spLocks noGrp="1"/>
           </p:cNvSpPr>
@@ -2033,6 +1813,7 @@
               <a:rPr lang="en-US"/>
               <a:t>Click to edit Master text styles</a:t>
             </a:r>
+            <a:endParaRPr lang="en-US"/>
           </a:p>
           <a:p>
             <a:pPr lvl="1"/>
@@ -2040,6 +1821,7 @@
               <a:rPr lang="en-US"/>
               <a:t>Second level</a:t>
             </a:r>
+            <a:endParaRPr lang="en-US"/>
           </a:p>
           <a:p>
             <a:pPr lvl="2"/>
@@ -2047,6 +1829,7 @@
               <a:rPr lang="en-US"/>
               <a:t>Third level</a:t>
             </a:r>
+            <a:endParaRPr lang="en-US"/>
           </a:p>
           <a:p>
             <a:pPr lvl="3"/>
@@ -2054,6 +1837,7 @@
               <a:rPr lang="en-US"/>
               <a:t>Fourth level</a:t>
             </a:r>
+            <a:endParaRPr lang="en-US"/>
           </a:p>
           <a:p>
             <a:pPr lvl="4"/>
@@ -2061,18 +1845,13 @@
               <a:rPr lang="en-US"/>
               <a:t>Fifth level</a:t>
             </a:r>
-          </a:p>
-        </p:txBody>
-      </p:sp>
-      <p:sp>
-        <p:nvSpPr>
-          <p:cNvPr id="5" name="Text Placeholder 4">
-            <a:extLst>
-              <a:ext uri="{FF2B5EF4-FFF2-40B4-BE49-F238E27FC236}">
-                <a16:creationId xmlns:a16="http://schemas.microsoft.com/office/drawing/2014/main" id="{459413A0-B263-09D1-A818-28153CD11B92}"/>
-              </a:ext>
-            </a:extLst>
-          </p:cNvPr>
+            <a:endParaRPr lang="en-US"/>
+          </a:p>
+        </p:txBody>
+      </p:sp>
+      <p:sp>
+        <p:nvSpPr>
+          <p:cNvPr id="5" name="Text Placeholder 4"/>
           <p:cNvSpPr>
             <a:spLocks noGrp="1"/>
           </p:cNvSpPr>
@@ -2132,18 +1911,13 @@
               <a:rPr lang="en-US"/>
               <a:t>Click to edit Master text styles</a:t>
             </a:r>
-          </a:p>
-        </p:txBody>
-      </p:sp>
-      <p:sp>
-        <p:nvSpPr>
-          <p:cNvPr id="6" name="Content Placeholder 5">
-            <a:extLst>
-              <a:ext uri="{FF2B5EF4-FFF2-40B4-BE49-F238E27FC236}">
-                <a16:creationId xmlns:a16="http://schemas.microsoft.com/office/drawing/2014/main" id="{F98343CC-E13C-44AE-FFB0-17F77AD01B65}"/>
-              </a:ext>
-            </a:extLst>
-          </p:cNvPr>
+            <a:endParaRPr lang="en-US"/>
+          </a:p>
+        </p:txBody>
+      </p:sp>
+      <p:sp>
+        <p:nvSpPr>
+          <p:cNvPr id="6" name="Content Placeholder 5"/>
           <p:cNvSpPr>
             <a:spLocks noGrp="1"/>
           </p:cNvSpPr>
@@ -2166,6 +1940,7 @@
               <a:rPr lang="en-US"/>
               <a:t>Click to edit Master text styles</a:t>
             </a:r>
+            <a:endParaRPr lang="en-US"/>
           </a:p>
           <a:p>
             <a:pPr lvl="1"/>
@@ -2173,6 +1948,7 @@
               <a:rPr lang="en-US"/>
               <a:t>Second level</a:t>
             </a:r>
+            <a:endParaRPr lang="en-US"/>
           </a:p>
           <a:p>
             <a:pPr lvl="2"/>
@@ -2180,6 +1956,7 @@
               <a:rPr lang="en-US"/>
               <a:t>Third level</a:t>
             </a:r>
+            <a:endParaRPr lang="en-US"/>
           </a:p>
           <a:p>
             <a:pPr lvl="3"/>
@@ -2187,6 +1964,7 @@
               <a:rPr lang="en-US"/>
               <a:t>Fourth level</a:t>
             </a:r>
+            <a:endParaRPr lang="en-US"/>
           </a:p>
           <a:p>
             <a:pPr lvl="4"/>
@@ -2194,18 +1972,13 @@
               <a:rPr lang="en-US"/>
               <a:t>Fifth level</a:t>
             </a:r>
-          </a:p>
-        </p:txBody>
-      </p:sp>
-      <p:sp>
-        <p:nvSpPr>
-          <p:cNvPr id="7" name="Date Placeholder 6">
-            <a:extLst>
-              <a:ext uri="{FF2B5EF4-FFF2-40B4-BE49-F238E27FC236}">
-                <a16:creationId xmlns:a16="http://schemas.microsoft.com/office/drawing/2014/main" id="{EAC35E32-B3ED-220C-9668-725A95C4CB7C}"/>
-              </a:ext>
-            </a:extLst>
-          </p:cNvPr>
+            <a:endParaRPr lang="en-US"/>
+          </a:p>
+        </p:txBody>
+      </p:sp>
+      <p:sp>
+        <p:nvSpPr>
+          <p:cNvPr id="7" name="Date Placeholder 6"/>
           <p:cNvSpPr>
             <a:spLocks noGrp="1"/>
           </p:cNvSpPr>
@@ -2220,7 +1993,6 @@
           <a:p>
             <a:fld id="{DADE2353-34E2-4DBF-AFB1-31497BAECD2D}" type="datetimeFigureOut">
               <a:rPr lang="en-US" smtClean="0"/>
-              <a:t>4/21/2025</a:t>
             </a:fld>
             <a:endParaRPr lang="en-US"/>
           </a:p>
@@ -2228,13 +2000,7 @@
       </p:sp>
       <p:sp>
         <p:nvSpPr>
-          <p:cNvPr id="8" name="Footer Placeholder 7">
-            <a:extLst>
-              <a:ext uri="{FF2B5EF4-FFF2-40B4-BE49-F238E27FC236}">
-                <a16:creationId xmlns:a16="http://schemas.microsoft.com/office/drawing/2014/main" id="{0AF9B67F-C847-C91A-2378-95BC4DC656E7}"/>
-              </a:ext>
-            </a:extLst>
-          </p:cNvPr>
+          <p:cNvPr id="8" name="Footer Placeholder 7"/>
           <p:cNvSpPr>
             <a:spLocks noGrp="1"/>
           </p:cNvSpPr>
@@ -2253,13 +2019,7 @@
       </p:sp>
       <p:sp>
         <p:nvSpPr>
-          <p:cNvPr id="9" name="Slide Number Placeholder 8">
-            <a:extLst>
-              <a:ext uri="{FF2B5EF4-FFF2-40B4-BE49-F238E27FC236}">
-                <a16:creationId xmlns:a16="http://schemas.microsoft.com/office/drawing/2014/main" id="{ADFBC0CF-7F11-81A8-9DE7-C0020765F1A9}"/>
-              </a:ext>
-            </a:extLst>
-          </p:cNvPr>
+          <p:cNvPr id="9" name="Slide Number Placeholder 8"/>
           <p:cNvSpPr>
             <a:spLocks noGrp="1"/>
           </p:cNvSpPr>
@@ -2274,18 +2034,12 @@
           <a:p>
             <a:fld id="{8170D8CF-7E31-4249-BDB4-34EBE6CF332C}" type="slidenum">
               <a:rPr lang="en-US" smtClean="0"/>
-              <a:t>‹#›</a:t>
             </a:fld>
             <a:endParaRPr lang="en-US"/>
           </a:p>
         </p:txBody>
       </p:sp>
     </p:spTree>
-    <p:extLst>
-      <p:ext uri="{BB962C8B-B14F-4D97-AF65-F5344CB8AC3E}">
-        <p14:creationId xmlns:p14="http://schemas.microsoft.com/office/powerpoint/2010/main" val="2206593980"/>
-      </p:ext>
-    </p:extLst>
   </p:cSld>
   <p:clrMapOvr>
     <a:masterClrMapping/>
@@ -2312,13 +2066,7 @@
       </p:grpSpPr>
       <p:sp>
         <p:nvSpPr>
-          <p:cNvPr id="2" name="Title 1">
-            <a:extLst>
-              <a:ext uri="{FF2B5EF4-FFF2-40B4-BE49-F238E27FC236}">
-                <a16:creationId xmlns:a16="http://schemas.microsoft.com/office/drawing/2014/main" id="{EB55E68C-E983-2625-8934-F05ABA045E75}"/>
-              </a:ext>
-            </a:extLst>
-          </p:cNvPr>
+          <p:cNvPr id="2" name="Title 1"/>
           <p:cNvSpPr>
             <a:spLocks noGrp="1"/>
           </p:cNvSpPr>
@@ -2335,18 +2083,13 @@
               <a:rPr lang="en-US"/>
               <a:t>Click to edit Master title style</a:t>
             </a:r>
-          </a:p>
-        </p:txBody>
-      </p:sp>
-      <p:sp>
-        <p:nvSpPr>
-          <p:cNvPr id="3" name="Date Placeholder 2">
-            <a:extLst>
-              <a:ext uri="{FF2B5EF4-FFF2-40B4-BE49-F238E27FC236}">
-                <a16:creationId xmlns:a16="http://schemas.microsoft.com/office/drawing/2014/main" id="{A113005A-3552-A4BA-7ED5-C0B652451608}"/>
-              </a:ext>
-            </a:extLst>
-          </p:cNvPr>
+            <a:endParaRPr lang="en-US"/>
+          </a:p>
+        </p:txBody>
+      </p:sp>
+      <p:sp>
+        <p:nvSpPr>
+          <p:cNvPr id="3" name="Date Placeholder 2"/>
           <p:cNvSpPr>
             <a:spLocks noGrp="1"/>
           </p:cNvSpPr>
@@ -2361,7 +2104,6 @@
           <a:p>
             <a:fld id="{DADE2353-34E2-4DBF-AFB1-31497BAECD2D}" type="datetimeFigureOut">
               <a:rPr lang="en-US" smtClean="0"/>
-              <a:t>4/21/2025</a:t>
             </a:fld>
             <a:endParaRPr lang="en-US"/>
           </a:p>
@@ -2369,13 +2111,7 @@
       </p:sp>
       <p:sp>
         <p:nvSpPr>
-          <p:cNvPr id="4" name="Footer Placeholder 3">
-            <a:extLst>
-              <a:ext uri="{FF2B5EF4-FFF2-40B4-BE49-F238E27FC236}">
-                <a16:creationId xmlns:a16="http://schemas.microsoft.com/office/drawing/2014/main" id="{DF0FD07F-1E0A-BB39-D500-943046E3605A}"/>
-              </a:ext>
-            </a:extLst>
-          </p:cNvPr>
+          <p:cNvPr id="4" name="Footer Placeholder 3"/>
           <p:cNvSpPr>
             <a:spLocks noGrp="1"/>
           </p:cNvSpPr>
@@ -2394,13 +2130,7 @@
       </p:sp>
       <p:sp>
         <p:nvSpPr>
-          <p:cNvPr id="5" name="Slide Number Placeholder 4">
-            <a:extLst>
-              <a:ext uri="{FF2B5EF4-FFF2-40B4-BE49-F238E27FC236}">
-                <a16:creationId xmlns:a16="http://schemas.microsoft.com/office/drawing/2014/main" id="{436F57A9-C6E5-178B-69A6-2F933F7B5A4C}"/>
-              </a:ext>
-            </a:extLst>
-          </p:cNvPr>
+          <p:cNvPr id="5" name="Slide Number Placeholder 4"/>
           <p:cNvSpPr>
             <a:spLocks noGrp="1"/>
           </p:cNvSpPr>
@@ -2415,18 +2145,12 @@
           <a:p>
             <a:fld id="{8170D8CF-7E31-4249-BDB4-34EBE6CF332C}" type="slidenum">
               <a:rPr lang="en-US" smtClean="0"/>
-              <a:t>‹#›</a:t>
             </a:fld>
             <a:endParaRPr lang="en-US"/>
           </a:p>
         </p:txBody>
       </p:sp>
     </p:spTree>
-    <p:extLst>
-      <p:ext uri="{BB962C8B-B14F-4D97-AF65-F5344CB8AC3E}">
-        <p14:creationId xmlns:p14="http://schemas.microsoft.com/office/powerpoint/2010/main" val="3854888455"/>
-      </p:ext>
-    </p:extLst>
   </p:cSld>
   <p:clrMapOvr>
     <a:masterClrMapping/>
@@ -2453,13 +2177,7 @@
       </p:grpSpPr>
       <p:sp>
         <p:nvSpPr>
-          <p:cNvPr id="2" name="Date Placeholder 1">
-            <a:extLst>
-              <a:ext uri="{FF2B5EF4-FFF2-40B4-BE49-F238E27FC236}">
-                <a16:creationId xmlns:a16="http://schemas.microsoft.com/office/drawing/2014/main" id="{F6CAEDF5-6B80-553D-1D72-5FC8892290D2}"/>
-              </a:ext>
-            </a:extLst>
-          </p:cNvPr>
+          <p:cNvPr id="2" name="Date Placeholder 1"/>
           <p:cNvSpPr>
             <a:spLocks noGrp="1"/>
           </p:cNvSpPr>
@@ -2474,7 +2192,6 @@
           <a:p>
             <a:fld id="{DADE2353-34E2-4DBF-AFB1-31497BAECD2D}" type="datetimeFigureOut">
               <a:rPr lang="en-US" smtClean="0"/>
-              <a:t>4/21/2025</a:t>
             </a:fld>
             <a:endParaRPr lang="en-US"/>
           </a:p>
@@ -2482,13 +2199,7 @@
       </p:sp>
       <p:sp>
         <p:nvSpPr>
-          <p:cNvPr id="3" name="Footer Placeholder 2">
-            <a:extLst>
-              <a:ext uri="{FF2B5EF4-FFF2-40B4-BE49-F238E27FC236}">
-                <a16:creationId xmlns:a16="http://schemas.microsoft.com/office/drawing/2014/main" id="{BDA4D675-7E04-BF12-E83D-66063E514450}"/>
-              </a:ext>
-            </a:extLst>
-          </p:cNvPr>
+          <p:cNvPr id="3" name="Footer Placeholder 2"/>
           <p:cNvSpPr>
             <a:spLocks noGrp="1"/>
           </p:cNvSpPr>
@@ -2507,13 +2218,7 @@
       </p:sp>
       <p:sp>
         <p:nvSpPr>
-          <p:cNvPr id="4" name="Slide Number Placeholder 3">
-            <a:extLst>
-              <a:ext uri="{FF2B5EF4-FFF2-40B4-BE49-F238E27FC236}">
-                <a16:creationId xmlns:a16="http://schemas.microsoft.com/office/drawing/2014/main" id="{3631C55B-FF10-A9BC-7A01-320746F2A271}"/>
-              </a:ext>
-            </a:extLst>
-          </p:cNvPr>
+          <p:cNvPr id="4" name="Slide Number Placeholder 3"/>
           <p:cNvSpPr>
             <a:spLocks noGrp="1"/>
           </p:cNvSpPr>
@@ -2528,18 +2233,12 @@
           <a:p>
             <a:fld id="{8170D8CF-7E31-4249-BDB4-34EBE6CF332C}" type="slidenum">
               <a:rPr lang="en-US" smtClean="0"/>
-              <a:t>‹#›</a:t>
             </a:fld>
             <a:endParaRPr lang="en-US"/>
           </a:p>
         </p:txBody>
       </p:sp>
     </p:spTree>
-    <p:extLst>
-      <p:ext uri="{BB962C8B-B14F-4D97-AF65-F5344CB8AC3E}">
-        <p14:creationId xmlns:p14="http://schemas.microsoft.com/office/powerpoint/2010/main" val="1855613573"/>
-      </p:ext>
-    </p:extLst>
   </p:cSld>
   <p:clrMapOvr>
     <a:masterClrMapping/>
@@ -2566,13 +2265,7 @@
       </p:grpSpPr>
       <p:sp>
         <p:nvSpPr>
-          <p:cNvPr id="2" name="Title 1">
-            <a:extLst>
-              <a:ext uri="{FF2B5EF4-FFF2-40B4-BE49-F238E27FC236}">
-                <a16:creationId xmlns:a16="http://schemas.microsoft.com/office/drawing/2014/main" id="{EA85EAE0-596B-69E2-8B33-A6710ACA0048}"/>
-              </a:ext>
-            </a:extLst>
-          </p:cNvPr>
+          <p:cNvPr id="2" name="Title 1"/>
           <p:cNvSpPr>
             <a:spLocks noGrp="1"/>
           </p:cNvSpPr>
@@ -2598,18 +2291,13 @@
               <a:rPr lang="en-US"/>
               <a:t>Click to edit Master title style</a:t>
             </a:r>
-          </a:p>
-        </p:txBody>
-      </p:sp>
-      <p:sp>
-        <p:nvSpPr>
-          <p:cNvPr id="3" name="Content Placeholder 2">
-            <a:extLst>
-              <a:ext uri="{FF2B5EF4-FFF2-40B4-BE49-F238E27FC236}">
-                <a16:creationId xmlns:a16="http://schemas.microsoft.com/office/drawing/2014/main" id="{1B2E4BFB-0A58-BFAB-6A5A-36C1C73A5D6B}"/>
-              </a:ext>
-            </a:extLst>
-          </p:cNvPr>
+            <a:endParaRPr lang="en-US"/>
+          </a:p>
+        </p:txBody>
+      </p:sp>
+      <p:sp>
+        <p:nvSpPr>
+          <p:cNvPr id="3" name="Content Placeholder 2"/>
           <p:cNvSpPr>
             <a:spLocks noGrp="1"/>
           </p:cNvSpPr>
@@ -2660,6 +2348,7 @@
               <a:rPr lang="en-US"/>
               <a:t>Click to edit Master text styles</a:t>
             </a:r>
+            <a:endParaRPr lang="en-US"/>
           </a:p>
           <a:p>
             <a:pPr lvl="1"/>
@@ -2667,6 +2356,7 @@
               <a:rPr lang="en-US"/>
               <a:t>Second level</a:t>
             </a:r>
+            <a:endParaRPr lang="en-US"/>
           </a:p>
           <a:p>
             <a:pPr lvl="2"/>
@@ -2674,6 +2364,7 @@
               <a:rPr lang="en-US"/>
               <a:t>Third level</a:t>
             </a:r>
+            <a:endParaRPr lang="en-US"/>
           </a:p>
           <a:p>
             <a:pPr lvl="3"/>
@@ -2681,6 +2372,7 @@
               <a:rPr lang="en-US"/>
               <a:t>Fourth level</a:t>
             </a:r>
+            <a:endParaRPr lang="en-US"/>
           </a:p>
           <a:p>
             <a:pPr lvl="4"/>
@@ -2688,18 +2380,13 @@
               <a:rPr lang="en-US"/>
               <a:t>Fifth level</a:t>
             </a:r>
-          </a:p>
-        </p:txBody>
-      </p:sp>
-      <p:sp>
-        <p:nvSpPr>
-          <p:cNvPr id="4" name="Text Placeholder 3">
-            <a:extLst>
-              <a:ext uri="{FF2B5EF4-FFF2-40B4-BE49-F238E27FC236}">
-                <a16:creationId xmlns:a16="http://schemas.microsoft.com/office/drawing/2014/main" id="{FBCE2E35-7E9E-B3E9-EB5B-E908D7E90E37}"/>
-              </a:ext>
-            </a:extLst>
-          </p:cNvPr>
+            <a:endParaRPr lang="en-US"/>
+          </a:p>
+        </p:txBody>
+      </p:sp>
+      <p:sp>
+        <p:nvSpPr>
+          <p:cNvPr id="4" name="Text Placeholder 3"/>
           <p:cNvSpPr>
             <a:spLocks noGrp="1"/>
           </p:cNvSpPr>
@@ -2759,18 +2446,13 @@
               <a:rPr lang="en-US"/>
               <a:t>Click to edit Master text styles</a:t>
             </a:r>
-          </a:p>
-        </p:txBody>
-      </p:sp>
-      <p:sp>
-        <p:nvSpPr>
-          <p:cNvPr id="5" name="Date Placeholder 4">
-            <a:extLst>
-              <a:ext uri="{FF2B5EF4-FFF2-40B4-BE49-F238E27FC236}">
-                <a16:creationId xmlns:a16="http://schemas.microsoft.com/office/drawing/2014/main" id="{30DAF7D8-83AE-8FAD-D27F-9B1F0C40D75C}"/>
-              </a:ext>
-            </a:extLst>
-          </p:cNvPr>
+            <a:endParaRPr lang="en-US"/>
+          </a:p>
+        </p:txBody>
+      </p:sp>
+      <p:sp>
+        <p:nvSpPr>
+          <p:cNvPr id="5" name="Date Placeholder 4"/>
           <p:cNvSpPr>
             <a:spLocks noGrp="1"/>
           </p:cNvSpPr>
@@ -2785,7 +2467,6 @@
           <a:p>
             <a:fld id="{DADE2353-34E2-4DBF-AFB1-31497BAECD2D}" type="datetimeFigureOut">
               <a:rPr lang="en-US" smtClean="0"/>
-              <a:t>4/21/2025</a:t>
             </a:fld>
             <a:endParaRPr lang="en-US"/>
           </a:p>
@@ -2793,13 +2474,7 @@
       </p:sp>
       <p:sp>
         <p:nvSpPr>
-          <p:cNvPr id="6" name="Footer Placeholder 5">
-            <a:extLst>
-              <a:ext uri="{FF2B5EF4-FFF2-40B4-BE49-F238E27FC236}">
-                <a16:creationId xmlns:a16="http://schemas.microsoft.com/office/drawing/2014/main" id="{1AA3D02B-BC93-B132-5356-786E6D6BC0D0}"/>
-              </a:ext>
-            </a:extLst>
-          </p:cNvPr>
+          <p:cNvPr id="6" name="Footer Placeholder 5"/>
           <p:cNvSpPr>
             <a:spLocks noGrp="1"/>
           </p:cNvSpPr>
@@ -2818,13 +2493,7 @@
       </p:sp>
       <p:sp>
         <p:nvSpPr>
-          <p:cNvPr id="7" name="Slide Number Placeholder 6">
-            <a:extLst>
-              <a:ext uri="{FF2B5EF4-FFF2-40B4-BE49-F238E27FC236}">
-                <a16:creationId xmlns:a16="http://schemas.microsoft.com/office/drawing/2014/main" id="{1E455FA3-E63F-F867-683E-F1B4839FBE5D}"/>
-              </a:ext>
-            </a:extLst>
-          </p:cNvPr>
+          <p:cNvPr id="7" name="Slide Number Placeholder 6"/>
           <p:cNvSpPr>
             <a:spLocks noGrp="1"/>
           </p:cNvSpPr>
@@ -2839,18 +2508,12 @@
           <a:p>
             <a:fld id="{8170D8CF-7E31-4249-BDB4-34EBE6CF332C}" type="slidenum">
               <a:rPr lang="en-US" smtClean="0"/>
-              <a:t>‹#›</a:t>
             </a:fld>
             <a:endParaRPr lang="en-US"/>
           </a:p>
         </p:txBody>
       </p:sp>
     </p:spTree>
-    <p:extLst>
-      <p:ext uri="{BB962C8B-B14F-4D97-AF65-F5344CB8AC3E}">
-        <p14:creationId xmlns:p14="http://schemas.microsoft.com/office/powerpoint/2010/main" val="341393397"/>
-      </p:ext>
-    </p:extLst>
   </p:cSld>
   <p:clrMapOvr>
     <a:masterClrMapping/>
@@ -2877,13 +2540,7 @@
       </p:grpSpPr>
       <p:sp>
         <p:nvSpPr>
-          <p:cNvPr id="2" name="Title 1">
-            <a:extLst>
-              <a:ext uri="{FF2B5EF4-FFF2-40B4-BE49-F238E27FC236}">
-                <a16:creationId xmlns:a16="http://schemas.microsoft.com/office/drawing/2014/main" id="{C86CB282-822B-43D1-AD6D-C3C4AD3B156B}"/>
-              </a:ext>
-            </a:extLst>
-          </p:cNvPr>
+          <p:cNvPr id="2" name="Title 1"/>
           <p:cNvSpPr>
             <a:spLocks noGrp="1"/>
           </p:cNvSpPr>
@@ -2909,18 +2566,13 @@
               <a:rPr lang="en-US"/>
               <a:t>Click to edit Master title style</a:t>
             </a:r>
-          </a:p>
-        </p:txBody>
-      </p:sp>
-      <p:sp>
-        <p:nvSpPr>
-          <p:cNvPr id="3" name="Picture Placeholder 2">
-            <a:extLst>
-              <a:ext uri="{FF2B5EF4-FFF2-40B4-BE49-F238E27FC236}">
-                <a16:creationId xmlns:a16="http://schemas.microsoft.com/office/drawing/2014/main" id="{FE0A5E38-E64E-BF7D-AE8B-3B67FCD42EA7}"/>
-              </a:ext>
-            </a:extLst>
-          </p:cNvPr>
+            <a:endParaRPr lang="en-US"/>
+          </a:p>
+        </p:txBody>
+      </p:sp>
+      <p:sp>
+        <p:nvSpPr>
+          <p:cNvPr id="3" name="Picture Placeholder 2"/>
           <p:cNvSpPr>
             <a:spLocks noGrp="1"/>
           </p:cNvSpPr>
@@ -2981,13 +2633,7 @@
       </p:sp>
       <p:sp>
         <p:nvSpPr>
-          <p:cNvPr id="4" name="Text Placeholder 3">
-            <a:extLst>
-              <a:ext uri="{FF2B5EF4-FFF2-40B4-BE49-F238E27FC236}">
-                <a16:creationId xmlns:a16="http://schemas.microsoft.com/office/drawing/2014/main" id="{C51DFBFC-96B2-169D-EE47-D15510C7CF37}"/>
-              </a:ext>
-            </a:extLst>
-          </p:cNvPr>
+          <p:cNvPr id="4" name="Text Placeholder 3"/>
           <p:cNvSpPr>
             <a:spLocks noGrp="1"/>
           </p:cNvSpPr>
@@ -3047,18 +2693,13 @@
               <a:rPr lang="en-US"/>
               <a:t>Click to edit Master text styles</a:t>
             </a:r>
-          </a:p>
-        </p:txBody>
-      </p:sp>
-      <p:sp>
-        <p:nvSpPr>
-          <p:cNvPr id="5" name="Date Placeholder 4">
-            <a:extLst>
-              <a:ext uri="{FF2B5EF4-FFF2-40B4-BE49-F238E27FC236}">
-                <a16:creationId xmlns:a16="http://schemas.microsoft.com/office/drawing/2014/main" id="{F7A5B041-516D-D4A0-53AC-A15CC4DEF491}"/>
-              </a:ext>
-            </a:extLst>
-          </p:cNvPr>
+            <a:endParaRPr lang="en-US"/>
+          </a:p>
+        </p:txBody>
+      </p:sp>
+      <p:sp>
+        <p:nvSpPr>
+          <p:cNvPr id="5" name="Date Placeholder 4"/>
           <p:cNvSpPr>
             <a:spLocks noGrp="1"/>
           </p:cNvSpPr>
@@ -3073,7 +2714,6 @@
           <a:p>
             <a:fld id="{DADE2353-34E2-4DBF-AFB1-31497BAECD2D}" type="datetimeFigureOut">
               <a:rPr lang="en-US" smtClean="0"/>
-              <a:t>4/21/2025</a:t>
             </a:fld>
             <a:endParaRPr lang="en-US"/>
           </a:p>
@@ -3081,13 +2721,7 @@
       </p:sp>
       <p:sp>
         <p:nvSpPr>
-          <p:cNvPr id="6" name="Footer Placeholder 5">
-            <a:extLst>
-              <a:ext uri="{FF2B5EF4-FFF2-40B4-BE49-F238E27FC236}">
-                <a16:creationId xmlns:a16="http://schemas.microsoft.com/office/drawing/2014/main" id="{1FFCB22D-A2EE-F043-E84F-873FC44C5351}"/>
-              </a:ext>
-            </a:extLst>
-          </p:cNvPr>
+          <p:cNvPr id="6" name="Footer Placeholder 5"/>
           <p:cNvSpPr>
             <a:spLocks noGrp="1"/>
           </p:cNvSpPr>
@@ -3106,13 +2740,7 @@
       </p:sp>
       <p:sp>
         <p:nvSpPr>
-          <p:cNvPr id="7" name="Slide Number Placeholder 6">
-            <a:extLst>
-              <a:ext uri="{FF2B5EF4-FFF2-40B4-BE49-F238E27FC236}">
-                <a16:creationId xmlns:a16="http://schemas.microsoft.com/office/drawing/2014/main" id="{77F5EFEA-E4B3-9109-8B92-790A4EB8A3BB}"/>
-              </a:ext>
-            </a:extLst>
-          </p:cNvPr>
+          <p:cNvPr id="7" name="Slide Number Placeholder 6"/>
           <p:cNvSpPr>
             <a:spLocks noGrp="1"/>
           </p:cNvSpPr>
@@ -3127,18 +2755,12 @@
           <a:p>
             <a:fld id="{8170D8CF-7E31-4249-BDB4-34EBE6CF332C}" type="slidenum">
               <a:rPr lang="en-US" smtClean="0"/>
-              <a:t>‹#›</a:t>
             </a:fld>
             <a:endParaRPr lang="en-US"/>
           </a:p>
         </p:txBody>
       </p:sp>
     </p:spTree>
-    <p:extLst>
-      <p:ext uri="{BB962C8B-B14F-4D97-AF65-F5344CB8AC3E}">
-        <p14:creationId xmlns:p14="http://schemas.microsoft.com/office/powerpoint/2010/main" val="216119829"/>
-      </p:ext>
-    </p:extLst>
   </p:cSld>
   <p:clrMapOvr>
     <a:masterClrMapping/>
@@ -3170,13 +2792,7 @@
       </p:grpSpPr>
       <p:sp>
         <p:nvSpPr>
-          <p:cNvPr id="2" name="Title Placeholder 1">
-            <a:extLst>
-              <a:ext uri="{FF2B5EF4-FFF2-40B4-BE49-F238E27FC236}">
-                <a16:creationId xmlns:a16="http://schemas.microsoft.com/office/drawing/2014/main" id="{75839076-86F1-BF96-5F1C-E02770190C9F}"/>
-              </a:ext>
-            </a:extLst>
-          </p:cNvPr>
+          <p:cNvPr id="2" name="Title Placeholder 1"/>
           <p:cNvSpPr>
             <a:spLocks noGrp="1"/>
           </p:cNvSpPr>
@@ -3203,18 +2819,13 @@
               <a:rPr lang="en-US" dirty="0"/>
               <a:t>Click to edit Master title style</a:t>
             </a:r>
-          </a:p>
-        </p:txBody>
-      </p:sp>
-      <p:sp>
-        <p:nvSpPr>
-          <p:cNvPr id="3" name="Text Placeholder 2">
-            <a:extLst>
-              <a:ext uri="{FF2B5EF4-FFF2-40B4-BE49-F238E27FC236}">
-                <a16:creationId xmlns:a16="http://schemas.microsoft.com/office/drawing/2014/main" id="{E1BD6091-9A2B-FD71-4279-2B59B29F6E50}"/>
-              </a:ext>
-            </a:extLst>
-          </p:cNvPr>
+            <a:endParaRPr lang="en-US" dirty="0"/>
+          </a:p>
+        </p:txBody>
+      </p:sp>
+      <p:sp>
+        <p:nvSpPr>
+          <p:cNvPr id="3" name="Text Placeholder 2"/>
           <p:cNvSpPr>
             <a:spLocks noGrp="1"/>
           </p:cNvSpPr>
@@ -3242,6 +2853,7 @@
               <a:rPr lang="en-US" dirty="0"/>
               <a:t>Click to edit Master text styles</a:t>
             </a:r>
+            <a:endParaRPr lang="en-US" dirty="0"/>
           </a:p>
           <a:p>
             <a:pPr lvl="1"/>
@@ -3249,6 +2861,7 @@
               <a:rPr lang="en-US" dirty="0"/>
               <a:t>Second level</a:t>
             </a:r>
+            <a:endParaRPr lang="en-US" dirty="0"/>
           </a:p>
           <a:p>
             <a:pPr lvl="2"/>
@@ -3256,6 +2869,7 @@
               <a:rPr lang="en-US" dirty="0"/>
               <a:t>Third level</a:t>
             </a:r>
+            <a:endParaRPr lang="en-US" dirty="0"/>
           </a:p>
           <a:p>
             <a:pPr lvl="3"/>
@@ -3263,6 +2877,7 @@
               <a:rPr lang="en-US" dirty="0"/>
               <a:t>Fourth level</a:t>
             </a:r>
+            <a:endParaRPr lang="en-US" dirty="0"/>
           </a:p>
           <a:p>
             <a:pPr lvl="4"/>
@@ -3270,18 +2885,13 @@
               <a:rPr lang="en-US" dirty="0"/>
               <a:t>Fifth level</a:t>
             </a:r>
-          </a:p>
-        </p:txBody>
-      </p:sp>
-      <p:sp>
-        <p:nvSpPr>
-          <p:cNvPr id="4" name="Date Placeholder 3">
-            <a:extLst>
-              <a:ext uri="{FF2B5EF4-FFF2-40B4-BE49-F238E27FC236}">
-                <a16:creationId xmlns:a16="http://schemas.microsoft.com/office/drawing/2014/main" id="{F9DCA7DB-A213-4889-8665-C38ED1E11C43}"/>
-              </a:ext>
-            </a:extLst>
-          </p:cNvPr>
+            <a:endParaRPr lang="en-US" dirty="0"/>
+          </a:p>
+        </p:txBody>
+      </p:sp>
+      <p:sp>
+        <p:nvSpPr>
+          <p:cNvPr id="4" name="Date Placeholder 3"/>
           <p:cNvSpPr>
             <a:spLocks noGrp="1"/>
           </p:cNvSpPr>
@@ -3314,7 +2924,6 @@
           <a:p>
             <a:fld id="{DADE2353-34E2-4DBF-AFB1-31497BAECD2D}" type="datetimeFigureOut">
               <a:rPr lang="en-US" smtClean="0"/>
-              <a:t>4/21/2025</a:t>
             </a:fld>
             <a:endParaRPr lang="en-US"/>
           </a:p>
@@ -3322,13 +2931,7 @@
       </p:sp>
       <p:sp>
         <p:nvSpPr>
-          <p:cNvPr id="5" name="Footer Placeholder 4">
-            <a:extLst>
-              <a:ext uri="{FF2B5EF4-FFF2-40B4-BE49-F238E27FC236}">
-                <a16:creationId xmlns:a16="http://schemas.microsoft.com/office/drawing/2014/main" id="{BFDA2211-1479-F897-C505-D1C571BD76FC}"/>
-              </a:ext>
-            </a:extLst>
-          </p:cNvPr>
+          <p:cNvPr id="5" name="Footer Placeholder 4"/>
           <p:cNvSpPr>
             <a:spLocks noGrp="1"/>
           </p:cNvSpPr>
@@ -3365,13 +2968,7 @@
       </p:sp>
       <p:sp>
         <p:nvSpPr>
-          <p:cNvPr id="6" name="Slide Number Placeholder 5">
-            <a:extLst>
-              <a:ext uri="{FF2B5EF4-FFF2-40B4-BE49-F238E27FC236}">
-                <a16:creationId xmlns:a16="http://schemas.microsoft.com/office/drawing/2014/main" id="{C280501B-5298-2352-229F-4D7E94A5D9BF}"/>
-              </a:ext>
-            </a:extLst>
-          </p:cNvPr>
+          <p:cNvPr id="6" name="Slide Number Placeholder 5"/>
           <p:cNvSpPr>
             <a:spLocks noGrp="1"/>
           </p:cNvSpPr>
@@ -3404,18 +3001,12 @@
           <a:p>
             <a:fld id="{8170D8CF-7E31-4249-BDB4-34EBE6CF332C}" type="slidenum">
               <a:rPr lang="en-US" smtClean="0"/>
-              <a:t>‹#›</a:t>
             </a:fld>
             <a:endParaRPr lang="en-US"/>
           </a:p>
         </p:txBody>
       </p:sp>
     </p:spTree>
-    <p:extLst>
-      <p:ext uri="{BB962C8B-B14F-4D97-AF65-F5344CB8AC3E}">
-        <p14:creationId xmlns:p14="http://schemas.microsoft.com/office/powerpoint/2010/main" val="1926361448"/>
-      </p:ext>
-    </p:extLst>
   </p:cSld>
   <p:clrMap bg1="lt1" tx1="dk1" bg2="lt2" tx2="dk2" accent1="accent1" accent2="accent2" accent3="accent3" accent4="accent4" accent5="accent5" accent6="accent6" hlink="hlink" folHlink="folHlink"/>
   <p:sldLayoutIdLst>
@@ -3459,7 +3050,7 @@
         <a:spcBef>
           <a:spcPts val="1000"/>
         </a:spcBef>
-        <a:buFont typeface="Arial" panose="020B0604020202020204" pitchFamily="34" charset="0"/>
+        <a:buFont typeface="Arial" panose="020B0604020202090204" pitchFamily="34" charset="0"/>
         <a:buChar char="•"/>
         <a:defRPr sz="2800" kern="1200">
           <a:solidFill>
@@ -3477,7 +3068,7 @@
         <a:spcBef>
           <a:spcPts val="500"/>
         </a:spcBef>
-        <a:buFont typeface="Arial" panose="020B0604020202020204" pitchFamily="34" charset="0"/>
+        <a:buFont typeface="Arial" panose="020B0604020202090204" pitchFamily="34" charset="0"/>
         <a:buChar char="•"/>
         <a:defRPr sz="2400" kern="1200">
           <a:solidFill>
@@ -3495,7 +3086,7 @@
         <a:spcBef>
           <a:spcPts val="500"/>
         </a:spcBef>
-        <a:buFont typeface="Arial" panose="020B0604020202020204" pitchFamily="34" charset="0"/>
+        <a:buFont typeface="Arial" panose="020B0604020202090204" pitchFamily="34" charset="0"/>
         <a:buChar char="•"/>
         <a:defRPr sz="2000" kern="1200">
           <a:solidFill>
@@ -3513,7 +3104,7 @@
         <a:spcBef>
           <a:spcPts val="500"/>
         </a:spcBef>
-        <a:buFont typeface="Arial" panose="020B0604020202020204" pitchFamily="34" charset="0"/>
+        <a:buFont typeface="Arial" panose="020B0604020202090204" pitchFamily="34" charset="0"/>
         <a:buChar char="•"/>
         <a:defRPr sz="1800" kern="1200">
           <a:solidFill>
@@ -3531,7 +3122,7 @@
         <a:spcBef>
           <a:spcPts val="500"/>
         </a:spcBef>
-        <a:buFont typeface="Arial" panose="020B0604020202020204" pitchFamily="34" charset="0"/>
+        <a:buFont typeface="Arial" panose="020B0604020202090204" pitchFamily="34" charset="0"/>
         <a:buChar char="•"/>
         <a:defRPr sz="1800" kern="1200">
           <a:solidFill>
@@ -3549,7 +3140,7 @@
         <a:spcBef>
           <a:spcPts val="500"/>
         </a:spcBef>
-        <a:buFont typeface="Arial" panose="020B0604020202020204" pitchFamily="34" charset="0"/>
+        <a:buFont typeface="Arial" panose="020B0604020202090204" pitchFamily="34" charset="0"/>
         <a:buChar char="•"/>
         <a:defRPr sz="1800" kern="1200">
           <a:solidFill>
@@ -3567,7 +3158,7 @@
         <a:spcBef>
           <a:spcPts val="500"/>
         </a:spcBef>
-        <a:buFont typeface="Arial" panose="020B0604020202020204" pitchFamily="34" charset="0"/>
+        <a:buFont typeface="Arial" panose="020B0604020202090204" pitchFamily="34" charset="0"/>
         <a:buChar char="•"/>
         <a:defRPr sz="1800" kern="1200">
           <a:solidFill>
@@ -3585,7 +3176,7 @@
         <a:spcBef>
           <a:spcPts val="500"/>
         </a:spcBef>
-        <a:buFont typeface="Arial" panose="020B0604020202020204" pitchFamily="34" charset="0"/>
+        <a:buFont typeface="Arial" panose="020B0604020202090204" pitchFamily="34" charset="0"/>
         <a:buChar char="•"/>
         <a:defRPr sz="1800" kern="1200">
           <a:solidFill>
@@ -3603,7 +3194,7 @@
         <a:spcBef>
           <a:spcPts val="500"/>
         </a:spcBef>
-        <a:buFont typeface="Arial" panose="020B0604020202020204" pitchFamily="34" charset="0"/>
+        <a:buFont typeface="Arial" panose="020B0604020202090204" pitchFamily="34" charset="0"/>
         <a:buChar char="•"/>
         <a:defRPr sz="1800" kern="1200">
           <a:solidFill>
@@ -3733,13 +3324,7 @@
       </p:grpSpPr>
       <p:sp>
         <p:nvSpPr>
-          <p:cNvPr id="2" name="Title 1">
-            <a:extLst>
-              <a:ext uri="{FF2B5EF4-FFF2-40B4-BE49-F238E27FC236}">
-                <a16:creationId xmlns:a16="http://schemas.microsoft.com/office/drawing/2014/main" id="{F8BF91A9-48A0-8AA1-90B9-3D1E136E78A0}"/>
-              </a:ext>
-            </a:extLst>
-          </p:cNvPr>
+          <p:cNvPr id="2" name="Title 1"/>
           <p:cNvSpPr>
             <a:spLocks noGrp="1"/>
           </p:cNvSpPr>
@@ -3756,18 +3341,13 @@
               <a:rPr lang="en-US" dirty="0"/>
               <a:t>CSE 601: Distributed Systems</a:t>
             </a:r>
-          </a:p>
-        </p:txBody>
-      </p:sp>
-      <p:sp>
-        <p:nvSpPr>
-          <p:cNvPr id="3" name="Subtitle 2">
-            <a:extLst>
-              <a:ext uri="{FF2B5EF4-FFF2-40B4-BE49-F238E27FC236}">
-                <a16:creationId xmlns:a16="http://schemas.microsoft.com/office/drawing/2014/main" id="{BB4E9863-D6E1-F1B2-EC0A-B6FC55B7E399}"/>
-              </a:ext>
-            </a:extLst>
-          </p:cNvPr>
+            <a:endParaRPr lang="en-US" dirty="0"/>
+          </a:p>
+        </p:txBody>
+      </p:sp>
+      <p:sp>
+        <p:nvSpPr>
+          <p:cNvPr id="3" name="Subtitle 2"/>
           <p:cNvSpPr>
             <a:spLocks noGrp="1"/>
           </p:cNvSpPr>
@@ -3784,15 +3364,11 @@
               <a:rPr lang="en-US" dirty="0"/>
               <a:t>Toukir Ahammed</a:t>
             </a:r>
+            <a:endParaRPr lang="en-US" dirty="0"/>
           </a:p>
         </p:txBody>
       </p:sp>
     </p:spTree>
-    <p:extLst>
-      <p:ext uri="{BB962C8B-B14F-4D97-AF65-F5344CB8AC3E}">
-        <p14:creationId xmlns:p14="http://schemas.microsoft.com/office/powerpoint/2010/main" val="408452947"/>
-      </p:ext>
-    </p:extLst>
   </p:cSld>
   <p:clrMapOvr>
     <a:masterClrMapping/>
@@ -3819,13 +3395,7 @@
       </p:grpSpPr>
       <p:sp>
         <p:nvSpPr>
-          <p:cNvPr id="2" name="Title 1">
-            <a:extLst>
-              <a:ext uri="{FF2B5EF4-FFF2-40B4-BE49-F238E27FC236}">
-                <a16:creationId xmlns:a16="http://schemas.microsoft.com/office/drawing/2014/main" id="{C177080E-F936-988F-8F7B-85976497DD5B}"/>
-              </a:ext>
-            </a:extLst>
-          </p:cNvPr>
+          <p:cNvPr id="2" name="Title 1"/>
           <p:cNvSpPr>
             <a:spLocks noGrp="1"/>
           </p:cNvSpPr>
@@ -3847,28 +3417,18 @@
               <a:rPr lang="en-US" dirty="0"/>
               <a:t>Types of distribution transparency</a:t>
             </a:r>
+            <a:endParaRPr lang="en-US" dirty="0"/>
           </a:p>
         </p:txBody>
       </p:sp>
       <p:graphicFrame>
         <p:nvGraphicFramePr>
-          <p:cNvPr id="9" name="Content Placeholder 8">
-            <a:extLst>
-              <a:ext uri="{FF2B5EF4-FFF2-40B4-BE49-F238E27FC236}">
-                <a16:creationId xmlns:a16="http://schemas.microsoft.com/office/drawing/2014/main" id="{7129CABD-834C-6F9F-FBAC-E6F5181F9563}"/>
-              </a:ext>
-            </a:extLst>
-          </p:cNvPr>
+          <p:cNvPr id="9" name="Content Placeholder 8"/>
           <p:cNvGraphicFramePr>
             <a:graphicFrameLocks noGrp="1"/>
           </p:cNvGraphicFramePr>
           <p:nvPr>
             <p:ph idx="1"/>
-            <p:extLst>
-              <p:ext uri="{D42A27DB-BD31-4B8C-83A1-F6EECF244321}">
-                <p14:modId xmlns:p14="http://schemas.microsoft.com/office/powerpoint/2010/main" val="4248368690"/>
-              </p:ext>
-            </p:extLst>
           </p:nvPr>
         </p:nvGraphicFramePr>
         <p:xfrm>
@@ -3882,20 +3442,8 @@
                 <a:tableStyleId>{5940675A-B579-460E-94D1-54222C63F5DA}</a:tableStyleId>
               </a:tblPr>
               <a:tblGrid>
-                <a:gridCol w="1813910">
-                  <a:extLst>
-                    <a:ext uri="{9D8B030D-6E8A-4147-A177-3AD203B41FA5}">
-                      <a16:colId xmlns:a16="http://schemas.microsoft.com/office/drawing/2014/main" val="3143096282"/>
-                    </a:ext>
-                  </a:extLst>
-                </a:gridCol>
-                <a:gridCol w="8306622">
-                  <a:extLst>
-                    <a:ext uri="{9D8B030D-6E8A-4147-A177-3AD203B41FA5}">
-                      <a16:colId xmlns:a16="http://schemas.microsoft.com/office/drawing/2014/main" val="2428792869"/>
-                    </a:ext>
-                  </a:extLst>
-                </a:gridCol>
+                <a:gridCol w="1813910"/>
+                <a:gridCol w="8306622"/>
               </a:tblGrid>
               <a:tr h="550795">
                 <a:tc>
@@ -3909,6 +3457,9 @@
                         </a:rPr>
                         <a:t>Transparency</a:t>
                       </a:r>
+                      <a:endParaRPr lang="en-US" sz="2000" b="1" dirty="0">
+                        <a:latin typeface="Gill Sans MT" panose="020B0502020104020203" pitchFamily="34" charset="0"/>
+                      </a:endParaRPr>
                     </a:p>
                   </a:txBody>
                   <a:tcPr/>
@@ -3924,15 +3475,13 @@
                         </a:rPr>
                         <a:t>Description</a:t>
                       </a:r>
+                      <a:endParaRPr lang="en-US" sz="2000" b="1" dirty="0">
+                        <a:latin typeface="Gill Sans MT" panose="020B0502020104020203" pitchFamily="34" charset="0"/>
+                      </a:endParaRPr>
                     </a:p>
                   </a:txBody>
                   <a:tcPr/>
                 </a:tc>
-                <a:extLst>
-                  <a:ext uri="{0D108BD9-81ED-4DB2-BD59-A6C34878D82A}">
-                    <a16:rowId xmlns:a16="http://schemas.microsoft.com/office/drawing/2014/main" val="2172786769"/>
-                  </a:ext>
-                </a:extLst>
               </a:tr>
               <a:tr h="550795">
                 <a:tc>
@@ -3946,6 +3495,9 @@
                         </a:rPr>
                         <a:t>Access</a:t>
                       </a:r>
+                      <a:endParaRPr lang="en-US" sz="2000" dirty="0">
+                        <a:latin typeface="Gill Sans MT" panose="020B0502020104020203" pitchFamily="34" charset="0"/>
+                      </a:endParaRPr>
                     </a:p>
                   </a:txBody>
                   <a:tcPr/>
@@ -3971,11 +3523,6 @@
                   </a:txBody>
                   <a:tcPr/>
                 </a:tc>
-                <a:extLst>
-                  <a:ext uri="{0D108BD9-81ED-4DB2-BD59-A6C34878D82A}">
-                    <a16:rowId xmlns:a16="http://schemas.microsoft.com/office/drawing/2014/main" val="3622197745"/>
-                  </a:ext>
-                </a:extLst>
               </a:tr>
               <a:tr h="550795">
                 <a:tc>
@@ -4020,11 +3567,6 @@
                   </a:txBody>
                   <a:tcPr/>
                 </a:tc>
-                <a:extLst>
-                  <a:ext uri="{0D108BD9-81ED-4DB2-BD59-A6C34878D82A}">
-                    <a16:rowId xmlns:a16="http://schemas.microsoft.com/office/drawing/2014/main" val="4827039"/>
-                  </a:ext>
-                </a:extLst>
               </a:tr>
               <a:tr h="550795">
                 <a:tc>
@@ -4069,11 +3611,6 @@
                   </a:txBody>
                   <a:tcPr/>
                 </a:tc>
-                <a:extLst>
-                  <a:ext uri="{0D108BD9-81ED-4DB2-BD59-A6C34878D82A}">
-                    <a16:rowId xmlns:a16="http://schemas.microsoft.com/office/drawing/2014/main" val="3052996734"/>
-                  </a:ext>
-                </a:extLst>
               </a:tr>
               <a:tr h="550795">
                 <a:tc>
@@ -4118,11 +3655,6 @@
                   </a:txBody>
                   <a:tcPr/>
                 </a:tc>
-                <a:extLst>
-                  <a:ext uri="{0D108BD9-81ED-4DB2-BD59-A6C34878D82A}">
-                    <a16:rowId xmlns:a16="http://schemas.microsoft.com/office/drawing/2014/main" val="1385523150"/>
-                  </a:ext>
-                </a:extLst>
               </a:tr>
               <a:tr h="550795">
                 <a:tc>
@@ -4167,11 +3699,6 @@
                   </a:txBody>
                   <a:tcPr/>
                 </a:tc>
-                <a:extLst>
-                  <a:ext uri="{0D108BD9-81ED-4DB2-BD59-A6C34878D82A}">
-                    <a16:rowId xmlns:a16="http://schemas.microsoft.com/office/drawing/2014/main" val="3161056359"/>
-                  </a:ext>
-                </a:extLst>
               </a:tr>
               <a:tr h="550795">
                 <a:tc>
@@ -4216,11 +3743,6 @@
                   </a:txBody>
                   <a:tcPr/>
                 </a:tc>
-                <a:extLst>
-                  <a:ext uri="{0D108BD9-81ED-4DB2-BD59-A6C34878D82A}">
-                    <a16:rowId xmlns:a16="http://schemas.microsoft.com/office/drawing/2014/main" val="1615401437"/>
-                  </a:ext>
-                </a:extLst>
               </a:tr>
               <a:tr h="550795">
                 <a:tc>
@@ -4265,22 +3787,12 @@
                   </a:txBody>
                   <a:tcPr/>
                 </a:tc>
-                <a:extLst>
-                  <a:ext uri="{0D108BD9-81ED-4DB2-BD59-A6C34878D82A}">
-                    <a16:rowId xmlns:a16="http://schemas.microsoft.com/office/drawing/2014/main" val="2308873069"/>
-                  </a:ext>
-                </a:extLst>
               </a:tr>
             </a:tbl>
           </a:graphicData>
         </a:graphic>
       </p:graphicFrame>
     </p:spTree>
-    <p:extLst>
-      <p:ext uri="{BB962C8B-B14F-4D97-AF65-F5344CB8AC3E}">
-        <p14:creationId xmlns:p14="http://schemas.microsoft.com/office/powerpoint/2010/main" val="2591551433"/>
-      </p:ext>
-    </p:extLst>
   </p:cSld>
   <p:clrMapOvr>
     <a:masterClrMapping/>
@@ -4307,13 +3819,7 @@
       </p:grpSpPr>
       <p:sp>
         <p:nvSpPr>
-          <p:cNvPr id="2" name="Title 1">
-            <a:extLst>
-              <a:ext uri="{FF2B5EF4-FFF2-40B4-BE49-F238E27FC236}">
-                <a16:creationId xmlns:a16="http://schemas.microsoft.com/office/drawing/2014/main" id="{4153DE13-A83E-319D-B735-9E07BED82DB5}"/>
-              </a:ext>
-            </a:extLst>
-          </p:cNvPr>
+          <p:cNvPr id="2" name="Title 1"/>
           <p:cNvSpPr>
             <a:spLocks noGrp="1"/>
           </p:cNvSpPr>
@@ -4330,18 +3836,13 @@
               <a:rPr lang="en-US" dirty="0"/>
               <a:t>Access Transparency</a:t>
             </a:r>
-          </a:p>
-        </p:txBody>
-      </p:sp>
-      <p:sp>
-        <p:nvSpPr>
-          <p:cNvPr id="3" name="Content Placeholder 2">
-            <a:extLst>
-              <a:ext uri="{FF2B5EF4-FFF2-40B4-BE49-F238E27FC236}">
-                <a16:creationId xmlns:a16="http://schemas.microsoft.com/office/drawing/2014/main" id="{DE559A10-06C1-CB57-4ACF-EB322737E70B}"/>
-              </a:ext>
-            </a:extLst>
-          </p:cNvPr>
+            <a:endParaRPr lang="en-US" dirty="0"/>
+          </a:p>
+        </p:txBody>
+      </p:sp>
+      <p:sp>
+        <p:nvSpPr>
+          <p:cNvPr id="3" name="Content Placeholder 2"/>
           <p:cNvSpPr>
             <a:spLocks noGrp="1"/>
           </p:cNvSpPr>
@@ -4365,6 +3866,7 @@
               <a:rPr lang="en-US" dirty="0"/>
               <a:t> deals with hiding differences in data representation and the way that objects can be accessed.</a:t>
             </a:r>
+            <a:endParaRPr lang="en-US" dirty="0"/>
           </a:p>
           <a:p>
             <a:pPr marL="0" indent="0" algn="just">
@@ -4378,6 +3880,7 @@
               <a:rPr lang="en-US" dirty="0"/>
               <a:t>:</a:t>
             </a:r>
+            <a:endParaRPr lang="en-US" dirty="0"/>
           </a:p>
           <a:p>
             <a:pPr algn="just"/>
@@ -4385,6 +3888,7 @@
               <a:rPr lang="en-US" dirty="0"/>
               <a:t>A distributed system may have computer systems that run different operating systems, each having their own file-naming conventions.</a:t>
             </a:r>
+            <a:endParaRPr lang="en-US" dirty="0"/>
           </a:p>
           <a:p>
             <a:pPr algn="just"/>
@@ -4392,6 +3896,7 @@
               <a:rPr lang="en-US" dirty="0"/>
               <a:t>Access issues that should preferably be hidden:</a:t>
             </a:r>
+            <a:endParaRPr lang="en-US" dirty="0"/>
           </a:p>
           <a:p>
             <a:pPr lvl="1" algn="just"/>
@@ -4399,6 +3904,7 @@
               <a:rPr lang="en-US" dirty="0"/>
               <a:t>differences in naming conventions</a:t>
             </a:r>
+            <a:endParaRPr lang="en-US" dirty="0"/>
           </a:p>
           <a:p>
             <a:pPr lvl="1" algn="just"/>
@@ -4406,6 +3912,7 @@
               <a:rPr lang="en-US" dirty="0"/>
               <a:t>differences in file operations, or</a:t>
             </a:r>
+            <a:endParaRPr lang="en-US" dirty="0"/>
           </a:p>
           <a:p>
             <a:pPr lvl="1" algn="just"/>
@@ -4413,15 +3920,11 @@
               <a:rPr lang="en-US" dirty="0"/>
               <a:t>differences in low-level communication with other processes</a:t>
             </a:r>
+            <a:endParaRPr lang="en-US" dirty="0"/>
           </a:p>
         </p:txBody>
       </p:sp>
     </p:spTree>
-    <p:extLst>
-      <p:ext uri="{BB962C8B-B14F-4D97-AF65-F5344CB8AC3E}">
-        <p14:creationId xmlns:p14="http://schemas.microsoft.com/office/powerpoint/2010/main" val="2743963420"/>
-      </p:ext>
-    </p:extLst>
   </p:cSld>
   <p:clrMapOvr>
     <a:masterClrMapping/>
@@ -4448,13 +3951,7 @@
       </p:grpSpPr>
       <p:sp>
         <p:nvSpPr>
-          <p:cNvPr id="2" name="Title 1">
-            <a:extLst>
-              <a:ext uri="{FF2B5EF4-FFF2-40B4-BE49-F238E27FC236}">
-                <a16:creationId xmlns:a16="http://schemas.microsoft.com/office/drawing/2014/main" id="{A51DF99F-C30C-B1F5-CCF4-8CEDF6865953}"/>
-              </a:ext>
-            </a:extLst>
-          </p:cNvPr>
+          <p:cNvPr id="2" name="Title 1"/>
           <p:cNvSpPr>
             <a:spLocks noGrp="1"/>
           </p:cNvSpPr>
@@ -4471,18 +3968,13 @@
               <a:rPr lang="en-US" dirty="0"/>
               <a:t>Location Transparency</a:t>
             </a:r>
-          </a:p>
-        </p:txBody>
-      </p:sp>
-      <p:sp>
-        <p:nvSpPr>
-          <p:cNvPr id="3" name="Content Placeholder 2">
-            <a:extLst>
-              <a:ext uri="{FF2B5EF4-FFF2-40B4-BE49-F238E27FC236}">
-                <a16:creationId xmlns:a16="http://schemas.microsoft.com/office/drawing/2014/main" id="{89D8A355-9024-4213-7A9E-2CFAD9956514}"/>
-              </a:ext>
-            </a:extLst>
-          </p:cNvPr>
+            <a:endParaRPr lang="en-US" dirty="0"/>
+          </a:p>
+        </p:txBody>
+      </p:sp>
+      <p:sp>
+        <p:nvSpPr>
+          <p:cNvPr id="3" name="Content Placeholder 2"/>
           <p:cNvSpPr>
             <a:spLocks noGrp="1"/>
           </p:cNvSpPr>
@@ -4506,6 +3998,7 @@
               <a:rPr lang="en-US" sz="2800" b="0" i="0" u="none" strike="noStrike" baseline="0" dirty="0"/>
               <a:t>refers to the fact that users cannot tell where an object is physically located in the system.</a:t>
             </a:r>
+            <a:endParaRPr lang="en-US" sz="2800" b="0" i="0" u="none" strike="noStrike" baseline="0" dirty="0"/>
           </a:p>
           <a:p>
             <a:pPr algn="just"/>
@@ -4525,6 +4018,11 @@
               </a:rPr>
               <a:t> plays an important role in achieving location transparency. It can often be achieved by assigning only logical names to resources.</a:t>
             </a:r>
+            <a:endParaRPr lang="en-US" sz="2800" b="0" i="0" u="none" strike="noStrike" baseline="0" dirty="0">
+              <a:solidFill>
+                <a:srgbClr val="000000"/>
+              </a:solidFill>
+            </a:endParaRPr>
           </a:p>
           <a:p>
             <a:pPr algn="just"/>
@@ -4581,7 +4079,7 @@
                 <a:solidFill>
                   <a:schemeClr val="accent1"/>
                 </a:solidFill>
-                <a:hlinkClick r:id="rId2"/>
+                <a:hlinkClick r:id="rId1"/>
               </a:rPr>
               <a:t>https://iit.du.ac.bd</a:t>
             </a:r>
@@ -4598,11 +4096,6 @@
         </p:txBody>
       </p:sp>
     </p:spTree>
-    <p:extLst>
-      <p:ext uri="{BB962C8B-B14F-4D97-AF65-F5344CB8AC3E}">
-        <p14:creationId xmlns:p14="http://schemas.microsoft.com/office/powerpoint/2010/main" val="3525343714"/>
-      </p:ext>
-    </p:extLst>
   </p:cSld>
   <p:clrMapOvr>
     <a:masterClrMapping/>
@@ -4629,13 +4122,7 @@
       </p:grpSpPr>
       <p:sp>
         <p:nvSpPr>
-          <p:cNvPr id="2" name="Title 1">
-            <a:extLst>
-              <a:ext uri="{FF2B5EF4-FFF2-40B4-BE49-F238E27FC236}">
-                <a16:creationId xmlns:a16="http://schemas.microsoft.com/office/drawing/2014/main" id="{DD37C400-4B06-EF8E-ADB3-ED3C6D73F396}"/>
-              </a:ext>
-            </a:extLst>
-          </p:cNvPr>
+          <p:cNvPr id="2" name="Title 1"/>
           <p:cNvSpPr>
             <a:spLocks noGrp="1"/>
           </p:cNvSpPr>
@@ -4652,18 +4139,13 @@
               <a:rPr lang="en-US" dirty="0"/>
               <a:t>Migration Transparency</a:t>
             </a:r>
-          </a:p>
-        </p:txBody>
-      </p:sp>
-      <p:sp>
-        <p:nvSpPr>
-          <p:cNvPr id="3" name="Content Placeholder 2">
-            <a:extLst>
-              <a:ext uri="{FF2B5EF4-FFF2-40B4-BE49-F238E27FC236}">
-                <a16:creationId xmlns:a16="http://schemas.microsoft.com/office/drawing/2014/main" id="{F1793282-D9CE-A48E-218F-A68A2CDD399D}"/>
-              </a:ext>
-            </a:extLst>
-          </p:cNvPr>
+            <a:endParaRPr lang="en-US" dirty="0"/>
+          </a:p>
+        </p:txBody>
+      </p:sp>
+      <p:sp>
+        <p:nvSpPr>
+          <p:cNvPr id="3" name="Content Placeholder 2"/>
           <p:cNvSpPr>
             <a:spLocks noGrp="1"/>
           </p:cNvSpPr>
@@ -4691,6 +4173,7 @@
               <a:rPr lang="en-US" sz="2800" b="0" i="0" u="none" strike="noStrike" baseline="0" dirty="0"/>
               <a:t>.</a:t>
             </a:r>
+            <a:endParaRPr lang="en-US" sz="2800" b="0" i="0" u="none" strike="noStrike" baseline="0" dirty="0"/>
           </a:p>
           <a:p>
             <a:pPr algn="just"/>
@@ -4698,15 +4181,11 @@
               <a:rPr lang="en-US" sz="2800" b="0" i="0" u="none" strike="noStrike" baseline="0" dirty="0"/>
               <a:t>In the previous example, the URL also gives no clue whether files at that site have always been at their current location or were recently moved there.</a:t>
             </a:r>
+            <a:endParaRPr lang="en-US" sz="2800" b="0" i="0" u="none" strike="noStrike" baseline="0" dirty="0"/>
           </a:p>
         </p:txBody>
       </p:sp>
     </p:spTree>
-    <p:extLst>
-      <p:ext uri="{BB962C8B-B14F-4D97-AF65-F5344CB8AC3E}">
-        <p14:creationId xmlns:p14="http://schemas.microsoft.com/office/powerpoint/2010/main" val="936782034"/>
-      </p:ext>
-    </p:extLst>
   </p:cSld>
   <p:clrMapOvr>
     <a:masterClrMapping/>
@@ -4733,13 +4212,7 @@
       </p:grpSpPr>
       <p:sp>
         <p:nvSpPr>
-          <p:cNvPr id="2" name="Title 1">
-            <a:extLst>
-              <a:ext uri="{FF2B5EF4-FFF2-40B4-BE49-F238E27FC236}">
-                <a16:creationId xmlns:a16="http://schemas.microsoft.com/office/drawing/2014/main" id="{DD37C400-4B06-EF8E-ADB3-ED3C6D73F396}"/>
-              </a:ext>
-            </a:extLst>
-          </p:cNvPr>
+          <p:cNvPr id="2" name="Title 1"/>
           <p:cNvSpPr>
             <a:spLocks noGrp="1"/>
           </p:cNvSpPr>
@@ -4756,18 +4229,13 @@
               <a:rPr lang="en-US" dirty="0"/>
               <a:t>Relocation Transparency</a:t>
             </a:r>
-          </a:p>
-        </p:txBody>
-      </p:sp>
-      <p:sp>
-        <p:nvSpPr>
-          <p:cNvPr id="3" name="Content Placeholder 2">
-            <a:extLst>
-              <a:ext uri="{FF2B5EF4-FFF2-40B4-BE49-F238E27FC236}">
-                <a16:creationId xmlns:a16="http://schemas.microsoft.com/office/drawing/2014/main" id="{F1793282-D9CE-A48E-218F-A68A2CDD399D}"/>
-              </a:ext>
-            </a:extLst>
-          </p:cNvPr>
+            <a:endParaRPr lang="en-US" dirty="0"/>
+          </a:p>
+        </p:txBody>
+      </p:sp>
+      <p:sp>
+        <p:nvSpPr>
+          <p:cNvPr id="3" name="Content Placeholder 2"/>
           <p:cNvSpPr>
             <a:spLocks noGrp="1"/>
           </p:cNvSpPr>
@@ -4784,17 +4252,34 @@
           <a:p>
             <a:pPr algn="just"/>
             <a:r>
-              <a:rPr lang="en-US" sz="2800" b="1" i="0" u="none" strike="noStrike" baseline="0" dirty="0"/>
+              <a:rPr lang="en-US" sz="2800" b="1" i="0" u="none" strike="noStrike" baseline="0" dirty="0">
+                <a:highlight>
+                  <a:srgbClr val="FFFF00"/>
+                </a:highlight>
+              </a:rPr>
               <a:t>Relocation transparency</a:t>
             </a:r>
             <a:r>
-              <a:rPr lang="en-US" dirty="0"/>
+              <a:rPr lang="en-US" dirty="0">
+                <a:highlight>
+                  <a:srgbClr val="FFFF00"/>
+                </a:highlight>
+              </a:rPr>
               <a:t> supports </a:t>
             </a:r>
             <a:r>
+              <a:rPr lang="en-US" sz="2800" b="0" i="0" u="none" strike="noStrike" baseline="0" dirty="0">
+                <a:highlight>
+                  <a:srgbClr val="FFFF00"/>
+                </a:highlight>
+              </a:rPr>
+              <a:t>the mobility of processes and resources initiated by users,</a:t>
+            </a:r>
+            <a:r>
               <a:rPr lang="en-US" sz="2800" b="0" i="0" u="none" strike="noStrike" baseline="0" dirty="0"/>
-              <a:t>the mobility of processes and resources initiated by users, without affecting ongoing communication and operations. In such cases, resources can be relocated while they are being accessed without the user or application noticing anything</a:t>
-            </a:r>
+              <a:t> without affecting ongoing communication and operations. In such cases, resources can be relocated while they are being accessed without the user or application noticing anything</a:t>
+            </a:r>
+            <a:endParaRPr lang="en-US" sz="2800" b="0" i="0" u="none" strike="noStrike" baseline="0" dirty="0"/>
           </a:p>
           <a:p>
             <a:pPr algn="just"/>
@@ -4806,6 +4291,7 @@
               <a:rPr lang="en-US" sz="2800" b="0" i="0" u="none" strike="noStrike" baseline="0" dirty="0"/>
               <a:t>:</a:t>
             </a:r>
+            <a:endParaRPr lang="en-US" sz="2800" b="0" i="0" u="none" strike="noStrike" baseline="0" dirty="0"/>
           </a:p>
           <a:p>
             <a:pPr lvl="1" algn="just"/>
@@ -4813,6 +4299,7 @@
               <a:rPr lang="en-US" b="0" i="0" u="none" strike="noStrike" baseline="0" dirty="0"/>
               <a:t>communication between mobile phones: regardless whether two people are actually moving, mobile phones will allow them to continue their conversation.</a:t>
             </a:r>
+            <a:endParaRPr lang="en-US" b="0" i="0" u="none" strike="noStrike" baseline="0" dirty="0"/>
           </a:p>
           <a:p>
             <a:pPr lvl="1" algn="just"/>
@@ -4820,15 +4307,11 @@
               <a:rPr lang="en-US" b="0" i="0" u="none" strike="noStrike" baseline="0" dirty="0"/>
               <a:t>online tracking and tracing of goods as they are being transported from one place to another</a:t>
             </a:r>
+            <a:endParaRPr lang="en-US" b="0" i="0" u="none" strike="noStrike" baseline="0" dirty="0"/>
           </a:p>
         </p:txBody>
       </p:sp>
     </p:spTree>
-    <p:extLst>
-      <p:ext uri="{BB962C8B-B14F-4D97-AF65-F5344CB8AC3E}">
-        <p14:creationId xmlns:p14="http://schemas.microsoft.com/office/powerpoint/2010/main" val="3739817730"/>
-      </p:ext>
-    </p:extLst>
   </p:cSld>
   <p:clrMapOvr>
     <a:masterClrMapping/>
@@ -4855,13 +4338,7 @@
       </p:grpSpPr>
       <p:sp>
         <p:nvSpPr>
-          <p:cNvPr id="2" name="Title 1">
-            <a:extLst>
-              <a:ext uri="{FF2B5EF4-FFF2-40B4-BE49-F238E27FC236}">
-                <a16:creationId xmlns:a16="http://schemas.microsoft.com/office/drawing/2014/main" id="{C4D13705-9974-63DA-6424-B0F0827B514D}"/>
-              </a:ext>
-            </a:extLst>
-          </p:cNvPr>
+          <p:cNvPr id="2" name="Title 1"/>
           <p:cNvSpPr>
             <a:spLocks noGrp="1"/>
           </p:cNvSpPr>
@@ -4878,18 +4355,13 @@
               <a:rPr lang="en-US" dirty="0"/>
               <a:t>Replication Transparency </a:t>
             </a:r>
-          </a:p>
-        </p:txBody>
-      </p:sp>
-      <p:sp>
-        <p:nvSpPr>
-          <p:cNvPr id="3" name="Content Placeholder 2">
-            <a:extLst>
-              <a:ext uri="{FF2B5EF4-FFF2-40B4-BE49-F238E27FC236}">
-                <a16:creationId xmlns:a16="http://schemas.microsoft.com/office/drawing/2014/main" id="{86BA8139-F269-8AAA-E40F-2A8AAEEE9B62}"/>
-              </a:ext>
-            </a:extLst>
-          </p:cNvPr>
+            <a:endParaRPr lang="en-US" dirty="0"/>
+          </a:p>
+        </p:txBody>
+      </p:sp>
+      <p:sp>
+        <p:nvSpPr>
+          <p:cNvPr id="3" name="Content Placeholder 2"/>
           <p:cNvSpPr>
             <a:spLocks noGrp="1"/>
           </p:cNvSpPr>
@@ -4909,6 +4381,7 @@
               <a:rPr lang="en-US" sz="2800" i="0" u="none" strike="noStrike" baseline="0" dirty="0"/>
               <a:t>In distributed systems, resources may be replicated to increase availability or to improve performance by placing a copy close to the place where it is accessed.</a:t>
             </a:r>
+            <a:endParaRPr lang="en-US" sz="2800" i="0" u="none" strike="noStrike" baseline="0" dirty="0"/>
           </a:p>
           <a:p>
             <a:pPr algn="just"/>
@@ -4920,6 +4393,7 @@
               <a:rPr lang="en-US" sz="2800" b="0" i="0" u="none" strike="noStrike" baseline="0" dirty="0"/>
               <a:t>deals with hiding the fact that several copies of a resource exist, or that several processes are operating so that one can take over when another fails.</a:t>
             </a:r>
+            <a:endParaRPr lang="en-US" sz="2800" b="0" i="0" u="none" strike="noStrike" baseline="0" dirty="0"/>
           </a:p>
           <a:p>
             <a:pPr algn="just"/>
@@ -4932,19 +4406,22 @@
               <a:t>: </a:t>
             </a:r>
             <a:r>
+              <a:rPr lang="en-US" sz="2800" b="0" i="0" u="none" strike="noStrike" baseline="0" dirty="0">
+                <a:highlight>
+                  <a:srgbClr val="FFFF00"/>
+                </a:highlight>
+              </a:rPr>
+              <a:t>a system that supports replication transparency should generally support location transparency as well,</a:t>
+            </a:r>
+            <a:r>
               <a:rPr lang="en-US" sz="2800" b="0" i="0" u="none" strike="noStrike" baseline="0" dirty="0"/>
-              <a:t>a system that supports replication transparency should generally support location transparency as well, because it would otherwise be impossible to refer to replicas at different locations.</a:t>
+              <a:t> because it would otherwise be impossible to refer to replicas at different locations.</a:t>
             </a:r>
             <a:endParaRPr lang="en-US" dirty="0"/>
           </a:p>
         </p:txBody>
       </p:sp>
     </p:spTree>
-    <p:extLst>
-      <p:ext uri="{BB962C8B-B14F-4D97-AF65-F5344CB8AC3E}">
-        <p14:creationId xmlns:p14="http://schemas.microsoft.com/office/powerpoint/2010/main" val="1891914322"/>
-      </p:ext>
-    </p:extLst>
   </p:cSld>
   <p:clrMapOvr>
     <a:masterClrMapping/>
@@ -4971,13 +4448,7 @@
       </p:grpSpPr>
       <p:sp>
         <p:nvSpPr>
-          <p:cNvPr id="2" name="Title 1">
-            <a:extLst>
-              <a:ext uri="{FF2B5EF4-FFF2-40B4-BE49-F238E27FC236}">
-                <a16:creationId xmlns:a16="http://schemas.microsoft.com/office/drawing/2014/main" id="{55A7806E-285A-88E5-F0A8-DCCBB984E689}"/>
-              </a:ext>
-            </a:extLst>
-          </p:cNvPr>
+          <p:cNvPr id="2" name="Title 1"/>
           <p:cNvSpPr>
             <a:spLocks noGrp="1"/>
           </p:cNvSpPr>
@@ -4994,18 +4465,13 @@
               <a:rPr lang="en-US" dirty="0"/>
               <a:t>Concurrency Transparency</a:t>
             </a:r>
-          </a:p>
-        </p:txBody>
-      </p:sp>
-      <p:sp>
-        <p:nvSpPr>
-          <p:cNvPr id="3" name="Content Placeholder 2">
-            <a:extLst>
-              <a:ext uri="{FF2B5EF4-FFF2-40B4-BE49-F238E27FC236}">
-                <a16:creationId xmlns:a16="http://schemas.microsoft.com/office/drawing/2014/main" id="{CE398CC9-928A-8D4F-8CB6-06ADCB8B1C63}"/>
-              </a:ext>
-            </a:extLst>
-          </p:cNvPr>
+            <a:endParaRPr lang="en-US" dirty="0"/>
+          </a:p>
+        </p:txBody>
+      </p:sp>
+      <p:sp>
+        <p:nvSpPr>
+          <p:cNvPr id="3" name="Content Placeholder 2"/>
           <p:cNvSpPr>
             <a:spLocks noGrp="1"/>
           </p:cNvSpPr>
@@ -5045,6 +4511,7 @@
               <a:rPr lang="en-US" sz="2800" b="0" i="0" u="none" strike="noStrike" baseline="0" dirty="0"/>
               <a:t> sharing of resources. </a:t>
             </a:r>
+            <a:endParaRPr lang="en-US" sz="2800" b="0" i="0" u="none" strike="noStrike" baseline="0" dirty="0"/>
           </a:p>
           <a:p>
             <a:pPr algn="just"/>
@@ -5064,23 +4531,27 @@
               <a:rPr lang="en-US" sz="2800" b="0" i="0" u="none" strike="noStrike" baseline="0" dirty="0"/>
               <a:t>.</a:t>
             </a:r>
+            <a:endParaRPr lang="en-US" sz="2800" b="0" i="0" u="none" strike="noStrike" baseline="0" dirty="0"/>
           </a:p>
           <a:p>
             <a:pPr algn="just"/>
             <a:r>
-              <a:rPr lang="en-US" sz="2800" b="0" i="0" u="none" strike="noStrike" baseline="0" dirty="0"/>
+              <a:rPr lang="en-US" sz="2800" b="0" i="0" u="none" strike="noStrike" baseline="0" dirty="0">
+                <a:highlight>
+                  <a:srgbClr val="FFFF00"/>
+                </a:highlight>
+              </a:rPr>
               <a:t>An important issue of concurrent access is the consistency of the resource. It can be achieved through locking mechanisms, by which users are given exclusive access to the desired resource.</a:t>
             </a:r>
-            <a:endParaRPr lang="en-US" dirty="0"/>
+            <a:endParaRPr lang="en-US" sz="2800" b="0" i="0" u="none" strike="noStrike" baseline="0" dirty="0">
+              <a:highlight>
+                <a:srgbClr val="FFFF00"/>
+              </a:highlight>
+            </a:endParaRPr>
           </a:p>
         </p:txBody>
       </p:sp>
     </p:spTree>
-    <p:extLst>
-      <p:ext uri="{BB962C8B-B14F-4D97-AF65-F5344CB8AC3E}">
-        <p14:creationId xmlns:p14="http://schemas.microsoft.com/office/powerpoint/2010/main" val="383325931"/>
-      </p:ext>
-    </p:extLst>
   </p:cSld>
   <p:clrMapOvr>
     <a:masterClrMapping/>
@@ -5107,13 +4578,7 @@
       </p:grpSpPr>
       <p:sp>
         <p:nvSpPr>
-          <p:cNvPr id="2" name="Title 1">
-            <a:extLst>
-              <a:ext uri="{FF2B5EF4-FFF2-40B4-BE49-F238E27FC236}">
-                <a16:creationId xmlns:a16="http://schemas.microsoft.com/office/drawing/2014/main" id="{8FDF7A16-1287-A1E6-EB45-5990F001E51D}"/>
-              </a:ext>
-            </a:extLst>
-          </p:cNvPr>
+          <p:cNvPr id="2" name="Title 1"/>
           <p:cNvSpPr>
             <a:spLocks noGrp="1"/>
           </p:cNvSpPr>
@@ -5130,18 +4595,13 @@
               <a:rPr lang="en-US" dirty="0"/>
               <a:t>Failure Transparency</a:t>
             </a:r>
-          </a:p>
-        </p:txBody>
-      </p:sp>
-      <p:sp>
-        <p:nvSpPr>
-          <p:cNvPr id="3" name="Content Placeholder 2">
-            <a:extLst>
-              <a:ext uri="{FF2B5EF4-FFF2-40B4-BE49-F238E27FC236}">
-                <a16:creationId xmlns:a16="http://schemas.microsoft.com/office/drawing/2014/main" id="{7CFCB729-B625-34A9-6FD9-20D5244AAA43}"/>
-              </a:ext>
-            </a:extLst>
-          </p:cNvPr>
+            <a:endParaRPr lang="en-US" dirty="0"/>
+          </a:p>
+        </p:txBody>
+      </p:sp>
+      <p:sp>
+        <p:nvSpPr>
+          <p:cNvPr id="3" name="Content Placeholder 2"/>
           <p:cNvSpPr>
             <a:spLocks noGrp="1"/>
           </p:cNvSpPr>
@@ -5165,6 +4625,7 @@
               <a:rPr lang="en-US" dirty="0"/>
               <a:t> means that a user or application does not notice that some piece of the system fails to work properly, and that the system subsequently (and automatically) recovers from that failure.</a:t>
             </a:r>
+            <a:endParaRPr lang="en-US" dirty="0"/>
           </a:p>
           <a:p>
             <a:pPr algn="just"/>
@@ -5172,6 +4633,7 @@
               <a:rPr lang="en-US" dirty="0"/>
               <a:t>Masking failures is one of the hardest issues in distributed systems and is even impossible in certain cases. The main difficulty in masking and transparently recovering from failures lies in the inability to distinguish between a dead process and a painfully slowly responding one.</a:t>
             </a:r>
+            <a:endParaRPr lang="en-US" dirty="0"/>
           </a:p>
           <a:p>
             <a:pPr algn="just"/>
@@ -5183,15 +4645,11 @@
               <a:rPr lang="en-US" dirty="0"/>
               <a:t>: when contacting a busy Web server, a browser will eventually time out and report that the Web page is unavailable. At that point, the user cannot tell whether the server is actually down or that the network is badly congested.</a:t>
             </a:r>
+            <a:endParaRPr lang="en-US" dirty="0"/>
           </a:p>
         </p:txBody>
       </p:sp>
     </p:spTree>
-    <p:extLst>
-      <p:ext uri="{BB962C8B-B14F-4D97-AF65-F5344CB8AC3E}">
-        <p14:creationId xmlns:p14="http://schemas.microsoft.com/office/powerpoint/2010/main" val="3349081525"/>
-      </p:ext>
-    </p:extLst>
   </p:cSld>
   <p:clrMapOvr>
     <a:masterClrMapping/>
@@ -5218,13 +4676,7 @@
       </p:grpSpPr>
       <p:sp>
         <p:nvSpPr>
-          <p:cNvPr id="2" name="Title 1">
-            <a:extLst>
-              <a:ext uri="{FF2B5EF4-FFF2-40B4-BE49-F238E27FC236}">
-                <a16:creationId xmlns:a16="http://schemas.microsoft.com/office/drawing/2014/main" id="{9B61ED1B-3659-B7C1-080B-9B5E71DE097F}"/>
-              </a:ext>
-            </a:extLst>
-          </p:cNvPr>
+          <p:cNvPr id="2" name="Title 1"/>
           <p:cNvSpPr>
             <a:spLocks noGrp="1"/>
           </p:cNvSpPr>
@@ -5241,18 +4693,13 @@
               <a:rPr lang="en-US" dirty="0"/>
               <a:t>Design Goals of a Distributed Systems</a:t>
             </a:r>
-          </a:p>
-        </p:txBody>
-      </p:sp>
-      <p:sp>
-        <p:nvSpPr>
-          <p:cNvPr id="3" name="Text Placeholder 2">
-            <a:extLst>
-              <a:ext uri="{FF2B5EF4-FFF2-40B4-BE49-F238E27FC236}">
-                <a16:creationId xmlns:a16="http://schemas.microsoft.com/office/drawing/2014/main" id="{651E0CF6-DF3E-9103-BD39-4B63C2F4287F}"/>
-              </a:ext>
-            </a:extLst>
-          </p:cNvPr>
+            <a:endParaRPr lang="en-US" dirty="0"/>
+          </a:p>
+        </p:txBody>
+      </p:sp>
+      <p:sp>
+        <p:nvSpPr>
+          <p:cNvPr id="3" name="Text Placeholder 2"/>
           <p:cNvSpPr>
             <a:spLocks noGrp="1"/>
           </p:cNvSpPr>
@@ -5275,15 +4722,15 @@
               </a:rPr>
               <a:t>Openness</a:t>
             </a:r>
+            <a:endParaRPr lang="en-US" sz="4000" b="1" dirty="0">
+              <a:solidFill>
+                <a:schemeClr val="tx1"/>
+              </a:solidFill>
+            </a:endParaRPr>
           </a:p>
         </p:txBody>
       </p:sp>
     </p:spTree>
-    <p:extLst>
-      <p:ext uri="{BB962C8B-B14F-4D97-AF65-F5344CB8AC3E}">
-        <p14:creationId xmlns:p14="http://schemas.microsoft.com/office/powerpoint/2010/main" val="2176669972"/>
-      </p:ext>
-    </p:extLst>
   </p:cSld>
   <p:clrMapOvr>
     <a:masterClrMapping/>
@@ -5310,13 +4757,7 @@
       </p:grpSpPr>
       <p:sp>
         <p:nvSpPr>
-          <p:cNvPr id="4" name="Title 3">
-            <a:extLst>
-              <a:ext uri="{FF2B5EF4-FFF2-40B4-BE49-F238E27FC236}">
-                <a16:creationId xmlns:a16="http://schemas.microsoft.com/office/drawing/2014/main" id="{237C1800-D66D-B5EF-D616-8696EBCF59F0}"/>
-              </a:ext>
-            </a:extLst>
-          </p:cNvPr>
+          <p:cNvPr id="4" name="Title 3"/>
           <p:cNvSpPr>
             <a:spLocks noGrp="1"/>
           </p:cNvSpPr>
@@ -5333,18 +4774,13 @@
               <a:rPr lang="en-US" dirty="0"/>
               <a:t>Openness</a:t>
             </a:r>
-          </a:p>
-        </p:txBody>
-      </p:sp>
-      <p:sp>
-        <p:nvSpPr>
-          <p:cNvPr id="5" name="Content Placeholder 4">
-            <a:extLst>
-              <a:ext uri="{FF2B5EF4-FFF2-40B4-BE49-F238E27FC236}">
-                <a16:creationId xmlns:a16="http://schemas.microsoft.com/office/drawing/2014/main" id="{EA23242E-DA39-6E04-8B16-D6615918082D}"/>
-              </a:ext>
-            </a:extLst>
-          </p:cNvPr>
+            <a:endParaRPr lang="en-US" dirty="0"/>
+          </a:p>
+        </p:txBody>
+      </p:sp>
+      <p:sp>
+        <p:nvSpPr>
+          <p:cNvPr id="5" name="Content Placeholder 4"/>
           <p:cNvSpPr>
             <a:spLocks noGrp="1"/>
           </p:cNvSpPr>
@@ -5362,6 +4798,7 @@
               <a:rPr lang="en-US" sz="2800" b="0" i="0" u="none" strike="noStrike" baseline="0" dirty="0"/>
               <a:t>Another important goal of distributed systems is openness.</a:t>
             </a:r>
+            <a:endParaRPr lang="en-US" sz="2800" b="0" i="0" u="none" strike="noStrike" baseline="0" dirty="0"/>
           </a:p>
           <a:p>
             <a:pPr algn="just"/>
@@ -5377,6 +4814,7 @@
               <a:rPr lang="en-US" sz="2800" b="0" i="0" u="none" strike="noStrike" baseline="0" dirty="0"/>
               <a:t>is essentially a system that offers components that can easily be used by, or integrated into other systems. </a:t>
             </a:r>
+            <a:endParaRPr lang="en-US" sz="2800" b="0" i="0" u="none" strike="noStrike" baseline="0" dirty="0"/>
           </a:p>
           <a:p>
             <a:pPr algn="just"/>
@@ -5384,6 +4822,7 @@
               <a:rPr lang="en-US" sz="2800" b="0" i="0" u="none" strike="noStrike" baseline="0" dirty="0"/>
               <a:t>At the same time, an open distributed system itself will often consist of components that originate from elsewhere.</a:t>
             </a:r>
+            <a:endParaRPr lang="en-US" sz="2800" b="0" i="0" u="none" strike="noStrike" baseline="0" dirty="0"/>
           </a:p>
           <a:p>
             <a:pPr algn="just"/>
@@ -5400,11 +4839,6 @@
         </p:txBody>
       </p:sp>
     </p:spTree>
-    <p:extLst>
-      <p:ext uri="{BB962C8B-B14F-4D97-AF65-F5344CB8AC3E}">
-        <p14:creationId xmlns:p14="http://schemas.microsoft.com/office/powerpoint/2010/main" val="1741284047"/>
-      </p:ext>
-    </p:extLst>
   </p:cSld>
   <p:clrMapOvr>
     <a:masterClrMapping/>
@@ -5431,13 +4865,7 @@
       </p:grpSpPr>
       <p:sp>
         <p:nvSpPr>
-          <p:cNvPr id="2" name="Title 1">
-            <a:extLst>
-              <a:ext uri="{FF2B5EF4-FFF2-40B4-BE49-F238E27FC236}">
-                <a16:creationId xmlns:a16="http://schemas.microsoft.com/office/drawing/2014/main" id="{9B61ED1B-3659-B7C1-080B-9B5E71DE097F}"/>
-              </a:ext>
-            </a:extLst>
-          </p:cNvPr>
+          <p:cNvPr id="2" name="Title 1"/>
           <p:cNvSpPr>
             <a:spLocks noGrp="1"/>
           </p:cNvSpPr>
@@ -5454,18 +4882,13 @@
               <a:rPr lang="en-US" dirty="0"/>
               <a:t>Design Goals of a Distributed Systems</a:t>
             </a:r>
-          </a:p>
-        </p:txBody>
-      </p:sp>
-      <p:sp>
-        <p:nvSpPr>
-          <p:cNvPr id="3" name="Text Placeholder 2">
-            <a:extLst>
-              <a:ext uri="{FF2B5EF4-FFF2-40B4-BE49-F238E27FC236}">
-                <a16:creationId xmlns:a16="http://schemas.microsoft.com/office/drawing/2014/main" id="{651E0CF6-DF3E-9103-BD39-4B63C2F4287F}"/>
-              </a:ext>
-            </a:extLst>
-          </p:cNvPr>
+            <a:endParaRPr lang="en-US" dirty="0"/>
+          </a:p>
+        </p:txBody>
+      </p:sp>
+      <p:sp>
+        <p:nvSpPr>
+          <p:cNvPr id="3" name="Text Placeholder 2"/>
           <p:cNvSpPr>
             <a:spLocks noGrp="1"/>
           </p:cNvSpPr>
@@ -5489,11 +4912,6 @@
         </p:txBody>
       </p:sp>
     </p:spTree>
-    <p:extLst>
-      <p:ext uri="{BB962C8B-B14F-4D97-AF65-F5344CB8AC3E}">
-        <p14:creationId xmlns:p14="http://schemas.microsoft.com/office/powerpoint/2010/main" val="3550440308"/>
-      </p:ext>
-    </p:extLst>
   </p:cSld>
   <p:clrMapOvr>
     <a:masterClrMapping/>
@@ -5520,13 +4938,7 @@
       </p:grpSpPr>
       <p:sp>
         <p:nvSpPr>
-          <p:cNvPr id="4" name="Title 3">
-            <a:extLst>
-              <a:ext uri="{FF2B5EF4-FFF2-40B4-BE49-F238E27FC236}">
-                <a16:creationId xmlns:a16="http://schemas.microsoft.com/office/drawing/2014/main" id="{237C1800-D66D-B5EF-D616-8696EBCF59F0}"/>
-              </a:ext>
-            </a:extLst>
-          </p:cNvPr>
+          <p:cNvPr id="4" name="Title 3"/>
           <p:cNvSpPr>
             <a:spLocks noGrp="1"/>
           </p:cNvSpPr>
@@ -5543,18 +4955,13 @@
               <a:rPr lang="en-US" dirty="0"/>
               <a:t>Openness: Interoperability</a:t>
             </a:r>
-          </a:p>
-        </p:txBody>
-      </p:sp>
-      <p:sp>
-        <p:nvSpPr>
-          <p:cNvPr id="5" name="Content Placeholder 4">
-            <a:extLst>
-              <a:ext uri="{FF2B5EF4-FFF2-40B4-BE49-F238E27FC236}">
-                <a16:creationId xmlns:a16="http://schemas.microsoft.com/office/drawing/2014/main" id="{EA23242E-DA39-6E04-8B16-D6615918082D}"/>
-              </a:ext>
-            </a:extLst>
-          </p:cNvPr>
+            <a:endParaRPr lang="en-US" dirty="0"/>
+          </a:p>
+        </p:txBody>
+      </p:sp>
+      <p:sp>
+        <p:nvSpPr>
+          <p:cNvPr id="5" name="Content Placeholder 4"/>
           <p:cNvSpPr>
             <a:spLocks noGrp="1"/>
           </p:cNvSpPr>
@@ -5576,6 +4983,7 @@
               <a:rPr lang="en-US" sz="2800" b="0" i="0" u="none" strike="noStrike" baseline="0" dirty="0"/>
               <a:t>characterizes the extent by which two implementations of systems or components from different manufacturers can co-exist and work together by merely relying on each other’s services as specified by a common standard.</a:t>
             </a:r>
+            <a:endParaRPr lang="en-US" sz="2800" b="0" i="0" u="none" strike="noStrike" baseline="0" dirty="0"/>
           </a:p>
           <a:p>
             <a:pPr algn="just"/>
@@ -5587,15 +4995,11 @@
               <a:rPr lang="en-US" dirty="0"/>
               <a:t>: a healthcare system where hospitals and clinics using different software platforms, exchange patient data seamlessly through open standards</a:t>
             </a:r>
+            <a:endParaRPr lang="en-US" dirty="0"/>
           </a:p>
         </p:txBody>
       </p:sp>
     </p:spTree>
-    <p:extLst>
-      <p:ext uri="{BB962C8B-B14F-4D97-AF65-F5344CB8AC3E}">
-        <p14:creationId xmlns:p14="http://schemas.microsoft.com/office/powerpoint/2010/main" val="3718615395"/>
-      </p:ext>
-    </p:extLst>
   </p:cSld>
   <p:clrMapOvr>
     <a:masterClrMapping/>
@@ -5622,13 +5026,7 @@
       </p:grpSpPr>
       <p:sp>
         <p:nvSpPr>
-          <p:cNvPr id="4" name="Title 3">
-            <a:extLst>
-              <a:ext uri="{FF2B5EF4-FFF2-40B4-BE49-F238E27FC236}">
-                <a16:creationId xmlns:a16="http://schemas.microsoft.com/office/drawing/2014/main" id="{237C1800-D66D-B5EF-D616-8696EBCF59F0}"/>
-              </a:ext>
-            </a:extLst>
-          </p:cNvPr>
+          <p:cNvPr id="4" name="Title 3"/>
           <p:cNvSpPr>
             <a:spLocks noGrp="1"/>
           </p:cNvSpPr>
@@ -5645,18 +5043,13 @@
               <a:rPr lang="en-US" dirty="0"/>
               <a:t>Openness: Portability</a:t>
             </a:r>
-          </a:p>
-        </p:txBody>
-      </p:sp>
-      <p:sp>
-        <p:nvSpPr>
-          <p:cNvPr id="5" name="Content Placeholder 4">
-            <a:extLst>
-              <a:ext uri="{FF2B5EF4-FFF2-40B4-BE49-F238E27FC236}">
-                <a16:creationId xmlns:a16="http://schemas.microsoft.com/office/drawing/2014/main" id="{EA23242E-DA39-6E04-8B16-D6615918082D}"/>
-              </a:ext>
-            </a:extLst>
-          </p:cNvPr>
+            <a:endParaRPr lang="en-US" dirty="0"/>
+          </a:p>
+        </p:txBody>
+      </p:sp>
+      <p:sp>
+        <p:nvSpPr>
+          <p:cNvPr id="5" name="Content Placeholder 4"/>
           <p:cNvSpPr>
             <a:spLocks noGrp="1"/>
           </p:cNvSpPr>
@@ -5678,6 +5071,7 @@
               <a:rPr lang="en-US" sz="2800" b="0" i="0" u="none" strike="noStrike" baseline="0" dirty="0"/>
               <a:t>characterizes to what extent an application developed for a distributed system A can be executed, without modification, on a different distributed system B that implements the same interfaces as A.</a:t>
             </a:r>
+            <a:endParaRPr lang="en-US" sz="2800" b="0" i="0" u="none" strike="noStrike" baseline="0" dirty="0"/>
           </a:p>
           <a:p>
             <a:pPr algn="just"/>
@@ -5698,11 +5092,6 @@
         </p:txBody>
       </p:sp>
     </p:spTree>
-    <p:extLst>
-      <p:ext uri="{BB962C8B-B14F-4D97-AF65-F5344CB8AC3E}">
-        <p14:creationId xmlns:p14="http://schemas.microsoft.com/office/powerpoint/2010/main" val="4207400737"/>
-      </p:ext>
-    </p:extLst>
   </p:cSld>
   <p:clrMapOvr>
     <a:masterClrMapping/>
@@ -5729,13 +5118,7 @@
       </p:grpSpPr>
       <p:sp>
         <p:nvSpPr>
-          <p:cNvPr id="4" name="Title 3">
-            <a:extLst>
-              <a:ext uri="{FF2B5EF4-FFF2-40B4-BE49-F238E27FC236}">
-                <a16:creationId xmlns:a16="http://schemas.microsoft.com/office/drawing/2014/main" id="{237C1800-D66D-B5EF-D616-8696EBCF59F0}"/>
-              </a:ext>
-            </a:extLst>
-          </p:cNvPr>
+          <p:cNvPr id="4" name="Title 3"/>
           <p:cNvSpPr>
             <a:spLocks noGrp="1"/>
           </p:cNvSpPr>
@@ -5752,18 +5135,13 @@
               <a:rPr lang="en-US" dirty="0"/>
               <a:t>Openness: Extensibility</a:t>
             </a:r>
-          </a:p>
-        </p:txBody>
-      </p:sp>
-      <p:sp>
-        <p:nvSpPr>
-          <p:cNvPr id="5" name="Content Placeholder 4">
-            <a:extLst>
-              <a:ext uri="{FF2B5EF4-FFF2-40B4-BE49-F238E27FC236}">
-                <a16:creationId xmlns:a16="http://schemas.microsoft.com/office/drawing/2014/main" id="{EA23242E-DA39-6E04-8B16-D6615918082D}"/>
-              </a:ext>
-            </a:extLst>
-          </p:cNvPr>
+            <a:endParaRPr lang="en-US" dirty="0"/>
+          </a:p>
+        </p:txBody>
+      </p:sp>
+      <p:sp>
+        <p:nvSpPr>
+          <p:cNvPr id="5" name="Content Placeholder 4"/>
           <p:cNvSpPr>
             <a:spLocks noGrp="1"/>
           </p:cNvSpPr>
@@ -5791,6 +5169,7 @@
               <a:rPr lang="en-US" sz="2800" b="0" i="0" u="none" strike="noStrike" baseline="0" dirty="0"/>
               <a:t>.</a:t>
             </a:r>
+            <a:endParaRPr lang="en-US" sz="2800" b="0" i="0" u="none" strike="noStrike" baseline="0" dirty="0"/>
           </a:p>
           <a:p>
             <a:pPr algn="just"/>
@@ -5802,6 +5181,7 @@
               <a:rPr lang="en-US" sz="2800" b="0" i="0" u="none" strike="noStrike" baseline="0" dirty="0"/>
               <a:t>n an extensible system, it should be relatively easy to add parts that run on a different operating system, or even to replace an entire file system.</a:t>
             </a:r>
+            <a:endParaRPr lang="en-US" sz="2800" b="0" i="0" u="none" strike="noStrike" baseline="0" dirty="0"/>
           </a:p>
           <a:p>
             <a:pPr algn="just"/>
@@ -5818,11 +5198,6 @@
         </p:txBody>
       </p:sp>
     </p:spTree>
-    <p:extLst>
-      <p:ext uri="{BB962C8B-B14F-4D97-AF65-F5344CB8AC3E}">
-        <p14:creationId xmlns:p14="http://schemas.microsoft.com/office/powerpoint/2010/main" val="3930324354"/>
-      </p:ext>
-    </p:extLst>
   </p:cSld>
   <p:clrMapOvr>
     <a:masterClrMapping/>
@@ -5849,13 +5224,7 @@
       </p:grpSpPr>
       <p:sp>
         <p:nvSpPr>
-          <p:cNvPr id="2" name="Title 1">
-            <a:extLst>
-              <a:ext uri="{FF2B5EF4-FFF2-40B4-BE49-F238E27FC236}">
-                <a16:creationId xmlns:a16="http://schemas.microsoft.com/office/drawing/2014/main" id="{9B61ED1B-3659-B7C1-080B-9B5E71DE097F}"/>
-              </a:ext>
-            </a:extLst>
-          </p:cNvPr>
+          <p:cNvPr id="2" name="Title 1"/>
           <p:cNvSpPr>
             <a:spLocks noGrp="1"/>
           </p:cNvSpPr>
@@ -5872,18 +5241,13 @@
               <a:rPr lang="en-US" dirty="0"/>
               <a:t>Design Goals of a Distributed Systems</a:t>
             </a:r>
-          </a:p>
-        </p:txBody>
-      </p:sp>
-      <p:sp>
-        <p:nvSpPr>
-          <p:cNvPr id="3" name="Text Placeholder 2">
-            <a:extLst>
-              <a:ext uri="{FF2B5EF4-FFF2-40B4-BE49-F238E27FC236}">
-                <a16:creationId xmlns:a16="http://schemas.microsoft.com/office/drawing/2014/main" id="{651E0CF6-DF3E-9103-BD39-4B63C2F4287F}"/>
-              </a:ext>
-            </a:extLst>
-          </p:cNvPr>
+            <a:endParaRPr lang="en-US" dirty="0"/>
+          </a:p>
+        </p:txBody>
+      </p:sp>
+      <p:sp>
+        <p:nvSpPr>
+          <p:cNvPr id="3" name="Text Placeholder 2"/>
           <p:cNvSpPr>
             <a:spLocks noGrp="1"/>
           </p:cNvSpPr>
@@ -5906,15 +5270,15 @@
               </a:rPr>
               <a:t>Scalability</a:t>
             </a:r>
+            <a:endParaRPr lang="en-US" sz="4000" b="1" dirty="0">
+              <a:solidFill>
+                <a:schemeClr val="tx1"/>
+              </a:solidFill>
+            </a:endParaRPr>
           </a:p>
         </p:txBody>
       </p:sp>
     </p:spTree>
-    <p:extLst>
-      <p:ext uri="{BB962C8B-B14F-4D97-AF65-F5344CB8AC3E}">
-        <p14:creationId xmlns:p14="http://schemas.microsoft.com/office/powerpoint/2010/main" val="3855479371"/>
-      </p:ext>
-    </p:extLst>
   </p:cSld>
   <p:clrMapOvr>
     <a:masterClrMapping/>
@@ -5927,13 +5291,7 @@
   <p:cSld>
     <p:spTree>
       <p:nvGrpSpPr>
-        <p:cNvPr id="1" name="">
-          <a:extLst>
-            <a:ext uri="{FF2B5EF4-FFF2-40B4-BE49-F238E27FC236}">
-              <a16:creationId xmlns:a16="http://schemas.microsoft.com/office/drawing/2014/main" id="{66B5853C-D0D3-34C3-B25E-2B7D487FF584}"/>
-            </a:ext>
-          </a:extLst>
-        </p:cNvPr>
+        <p:cNvPr id="1" name=""/>
         <p:cNvGrpSpPr/>
         <p:nvPr/>
       </p:nvGrpSpPr>
@@ -5947,13 +5305,7 @@
       </p:grpSpPr>
       <p:sp>
         <p:nvSpPr>
-          <p:cNvPr id="2" name="Title 1">
-            <a:extLst>
-              <a:ext uri="{FF2B5EF4-FFF2-40B4-BE49-F238E27FC236}">
-                <a16:creationId xmlns:a16="http://schemas.microsoft.com/office/drawing/2014/main" id="{632683C3-03BF-C4AB-F928-7E8BF44AE68E}"/>
-              </a:ext>
-            </a:extLst>
-          </p:cNvPr>
+          <p:cNvPr id="2" name="Title 1"/>
           <p:cNvSpPr>
             <a:spLocks noGrp="1"/>
           </p:cNvSpPr>
@@ -5970,18 +5322,13 @@
               <a:rPr lang="en-US" dirty="0"/>
               <a:t>Scalability </a:t>
             </a:r>
-          </a:p>
-        </p:txBody>
-      </p:sp>
-      <p:sp>
-        <p:nvSpPr>
-          <p:cNvPr id="3" name="Content Placeholder 2">
-            <a:extLst>
-              <a:ext uri="{FF2B5EF4-FFF2-40B4-BE49-F238E27FC236}">
-                <a16:creationId xmlns:a16="http://schemas.microsoft.com/office/drawing/2014/main" id="{70FDEED7-4C0C-97C5-2F77-A0BFDBA959A9}"/>
-              </a:ext>
-            </a:extLst>
-          </p:cNvPr>
+            <a:endParaRPr lang="en-US" dirty="0"/>
+          </a:p>
+        </p:txBody>
+      </p:sp>
+      <p:sp>
+        <p:nvSpPr>
+          <p:cNvPr id="3" name="Content Placeholder 2"/>
           <p:cNvSpPr>
             <a:spLocks noGrp="1"/>
           </p:cNvSpPr>
@@ -6001,44 +5348,75 @@
               <a:rPr lang="en-US" i="0" u="none" strike="noStrike" baseline="0" dirty="0"/>
               <a:t>The scalability of a system reflects its ability to deliver a high-quality service as demands on the system increase.</a:t>
             </a:r>
+            <a:endParaRPr lang="en-US" i="0" u="none" strike="noStrike" baseline="0" dirty="0"/>
           </a:p>
           <a:p>
             <a:pPr algn="just"/>
             <a:r>
-              <a:rPr lang="en-US" i="0" u="none" strike="noStrike" baseline="0" dirty="0"/>
+              <a:rPr lang="en-US" i="0" u="none" strike="noStrike" baseline="0" dirty="0">
+                <a:highlight>
+                  <a:srgbClr val="FFFF00"/>
+                </a:highlight>
+              </a:rPr>
               <a:t>Scalability of a system can be measured along at least three different dimensions</a:t>
             </a:r>
+            <a:endParaRPr lang="en-US" i="0" u="none" strike="noStrike" baseline="0" dirty="0">
+              <a:highlight>
+                <a:srgbClr val="FFFF00"/>
+              </a:highlight>
+            </a:endParaRPr>
           </a:p>
           <a:p>
             <a:pPr lvl="1" algn="just"/>
             <a:r>
-              <a:rPr lang="en-US" dirty="0"/>
+              <a:rPr lang="en-US" dirty="0">
+                <a:highlight>
+                  <a:srgbClr val="FFFF00"/>
+                </a:highlight>
+              </a:rPr>
               <a:t>Size</a:t>
             </a:r>
+            <a:endParaRPr lang="en-US" dirty="0">
+              <a:highlight>
+                <a:srgbClr val="FFFF00"/>
+              </a:highlight>
+            </a:endParaRPr>
           </a:p>
           <a:p>
             <a:pPr lvl="1" algn="just"/>
             <a:r>
-              <a:rPr lang="en-US" i="0" u="none" strike="noStrike" baseline="0" dirty="0"/>
+              <a:rPr lang="en-US" i="0" u="none" strike="noStrike" baseline="0" dirty="0">
+                <a:highlight>
+                  <a:srgbClr val="FFFF00"/>
+                </a:highlight>
+              </a:rPr>
               <a:t>Distribution</a:t>
             </a:r>
+            <a:endParaRPr lang="en-US" i="0" u="none" strike="noStrike" baseline="0" dirty="0">
+              <a:highlight>
+                <a:srgbClr val="FFFF00"/>
+              </a:highlight>
+            </a:endParaRPr>
           </a:p>
           <a:p>
             <a:pPr lvl="1" algn="just"/>
             <a:r>
-              <a:rPr lang="en-US" dirty="0"/>
+              <a:rPr lang="en-US" dirty="0">
+                <a:highlight>
+                  <a:srgbClr val="FFFF00"/>
+                </a:highlight>
+              </a:rPr>
               <a:t>Manageability</a:t>
             </a:r>
-            <a:endParaRPr lang="en-US" i="0" u="none" strike="noStrike" baseline="0" dirty="0"/>
+            <a:endParaRPr lang="en-US" i="0" u="none" strike="noStrike" baseline="0" dirty="0">
+              <a:highlight>
+                <a:srgbClr val="FFFF00"/>
+              </a:highlight>
+            </a:endParaRPr>
           </a:p>
         </p:txBody>
       </p:sp>
     </p:spTree>
-    <p:extLst>
-      <p:ext uri="{BB962C8B-B14F-4D97-AF65-F5344CB8AC3E}">
-        <p14:creationId xmlns:p14="http://schemas.microsoft.com/office/powerpoint/2010/main" val="2486778142"/>
-      </p:ext>
-    </p:extLst>
   </p:cSld>
   <p:clrMapOvr>
     <a:masterClrMapping/>
@@ -6065,13 +5443,7 @@
       </p:grpSpPr>
       <p:sp>
         <p:nvSpPr>
-          <p:cNvPr id="2" name="Title 1">
-            <a:extLst>
-              <a:ext uri="{FF2B5EF4-FFF2-40B4-BE49-F238E27FC236}">
-                <a16:creationId xmlns:a16="http://schemas.microsoft.com/office/drawing/2014/main" id="{48C89230-195F-2462-D559-E29C5B03EB32}"/>
-              </a:ext>
-            </a:extLst>
-          </p:cNvPr>
+          <p:cNvPr id="2" name="Title 1"/>
           <p:cNvSpPr>
             <a:spLocks noGrp="1"/>
           </p:cNvSpPr>
@@ -6088,18 +5460,13 @@
               <a:rPr lang="en-US" dirty="0"/>
               <a:t>Size Scalability</a:t>
             </a:r>
-          </a:p>
-        </p:txBody>
-      </p:sp>
-      <p:sp>
-        <p:nvSpPr>
-          <p:cNvPr id="3" name="Content Placeholder 2">
-            <a:extLst>
-              <a:ext uri="{FF2B5EF4-FFF2-40B4-BE49-F238E27FC236}">
-                <a16:creationId xmlns:a16="http://schemas.microsoft.com/office/drawing/2014/main" id="{C9D578B7-3208-ED46-0507-D27647E99F00}"/>
-              </a:ext>
-            </a:extLst>
-          </p:cNvPr>
+            <a:endParaRPr lang="en-US" dirty="0"/>
+          </a:p>
+        </p:txBody>
+      </p:sp>
+      <p:sp>
+        <p:nvSpPr>
+          <p:cNvPr id="3" name="Content Placeholder 2"/>
           <p:cNvSpPr>
             <a:spLocks noGrp="1"/>
           </p:cNvSpPr>
@@ -6127,15 +5494,11 @@
               <a:rPr lang="en-US" sz="2800" b="0" i="0" u="none" strike="noStrike" baseline="0" dirty="0"/>
               <a:t>A system can be scalable regarding its size, meaning that we can easily add more users and resources to the system without any noticeable loss of performance.</a:t>
             </a:r>
+            <a:endParaRPr lang="en-US" sz="2800" b="0" i="0" u="none" strike="noStrike" baseline="0" dirty="0"/>
           </a:p>
         </p:txBody>
       </p:sp>
     </p:spTree>
-    <p:extLst>
-      <p:ext uri="{BB962C8B-B14F-4D97-AF65-F5344CB8AC3E}">
-        <p14:creationId xmlns:p14="http://schemas.microsoft.com/office/powerpoint/2010/main" val="2177231678"/>
-      </p:ext>
-    </p:extLst>
   </p:cSld>
   <p:clrMapOvr>
     <a:masterClrMapping/>
@@ -6148,13 +5511,7 @@
   <p:cSld>
     <p:spTree>
       <p:nvGrpSpPr>
-        <p:cNvPr id="1" name="">
-          <a:extLst>
-            <a:ext uri="{FF2B5EF4-FFF2-40B4-BE49-F238E27FC236}">
-              <a16:creationId xmlns:a16="http://schemas.microsoft.com/office/drawing/2014/main" id="{4543CEF7-4560-9479-60E1-18544F7B80EF}"/>
-            </a:ext>
-          </a:extLst>
-        </p:cNvPr>
+        <p:cNvPr id="1" name=""/>
         <p:cNvGrpSpPr/>
         <p:nvPr/>
       </p:nvGrpSpPr>
@@ -6168,13 +5525,7 @@
       </p:grpSpPr>
       <p:sp>
         <p:nvSpPr>
-          <p:cNvPr id="2" name="Title 1">
-            <a:extLst>
-              <a:ext uri="{FF2B5EF4-FFF2-40B4-BE49-F238E27FC236}">
-                <a16:creationId xmlns:a16="http://schemas.microsoft.com/office/drawing/2014/main" id="{FCB9B787-9744-E2D1-5EF7-84E779388899}"/>
-              </a:ext>
-            </a:extLst>
-          </p:cNvPr>
+          <p:cNvPr id="2" name="Title 1"/>
           <p:cNvSpPr>
             <a:spLocks noGrp="1"/>
           </p:cNvSpPr>
@@ -6191,18 +5542,13 @@
               <a:rPr lang="en-US" dirty="0"/>
               <a:t>Geographical Scalability</a:t>
             </a:r>
-          </a:p>
-        </p:txBody>
-      </p:sp>
-      <p:sp>
-        <p:nvSpPr>
-          <p:cNvPr id="3" name="Content Placeholder 2">
-            <a:extLst>
-              <a:ext uri="{FF2B5EF4-FFF2-40B4-BE49-F238E27FC236}">
-                <a16:creationId xmlns:a16="http://schemas.microsoft.com/office/drawing/2014/main" id="{E799A7D1-0A4C-7FDA-F44F-D438734FF920}"/>
-              </a:ext>
-            </a:extLst>
-          </p:cNvPr>
+            <a:endParaRPr lang="en-US" dirty="0"/>
+          </a:p>
+        </p:txBody>
+      </p:sp>
+      <p:sp>
+        <p:nvSpPr>
+          <p:cNvPr id="3" name="Content Placeholder 2"/>
           <p:cNvSpPr>
             <a:spLocks noGrp="1"/>
           </p:cNvSpPr>
@@ -6230,15 +5576,11 @@
               <a:rPr lang="en-US" sz="2800" b="0" i="0" u="none" strike="noStrike" baseline="0" dirty="0"/>
               <a:t>A geographically scalable system is one in which the users and resources may lie far apart, but the fact that communication delays may be significant is hardly noticed.</a:t>
             </a:r>
+            <a:endParaRPr lang="en-US" sz="2800" b="0" i="0" u="none" strike="noStrike" baseline="0" dirty="0"/>
           </a:p>
         </p:txBody>
       </p:sp>
     </p:spTree>
-    <p:extLst>
-      <p:ext uri="{BB962C8B-B14F-4D97-AF65-F5344CB8AC3E}">
-        <p14:creationId xmlns:p14="http://schemas.microsoft.com/office/powerpoint/2010/main" val="3749491308"/>
-      </p:ext>
-    </p:extLst>
   </p:cSld>
   <p:clrMapOvr>
     <a:masterClrMapping/>
@@ -6251,13 +5593,7 @@
   <p:cSld>
     <p:spTree>
       <p:nvGrpSpPr>
-        <p:cNvPr id="1" name="">
-          <a:extLst>
-            <a:ext uri="{FF2B5EF4-FFF2-40B4-BE49-F238E27FC236}">
-              <a16:creationId xmlns:a16="http://schemas.microsoft.com/office/drawing/2014/main" id="{33901FB0-F504-42A9-5ED2-63DCE7B66629}"/>
-            </a:ext>
-          </a:extLst>
-        </p:cNvPr>
+        <p:cNvPr id="1" name=""/>
         <p:cNvGrpSpPr/>
         <p:nvPr/>
       </p:nvGrpSpPr>
@@ -6271,13 +5607,7 @@
       </p:grpSpPr>
       <p:sp>
         <p:nvSpPr>
-          <p:cNvPr id="2" name="Title 1">
-            <a:extLst>
-              <a:ext uri="{FF2B5EF4-FFF2-40B4-BE49-F238E27FC236}">
-                <a16:creationId xmlns:a16="http://schemas.microsoft.com/office/drawing/2014/main" id="{6ED69260-6FA0-9821-C0A8-4E3BB3789C14}"/>
-              </a:ext>
-            </a:extLst>
-          </p:cNvPr>
+          <p:cNvPr id="2" name="Title 1"/>
           <p:cNvSpPr>
             <a:spLocks noGrp="1"/>
           </p:cNvSpPr>
@@ -6294,18 +5624,13 @@
               <a:rPr lang="en-US" dirty="0"/>
               <a:t>Administrative Scalability</a:t>
             </a:r>
-          </a:p>
-        </p:txBody>
-      </p:sp>
-      <p:sp>
-        <p:nvSpPr>
-          <p:cNvPr id="3" name="Content Placeholder 2">
-            <a:extLst>
-              <a:ext uri="{FF2B5EF4-FFF2-40B4-BE49-F238E27FC236}">
-                <a16:creationId xmlns:a16="http://schemas.microsoft.com/office/drawing/2014/main" id="{36B1B58E-3749-01E5-0424-EE089274AEB4}"/>
-              </a:ext>
-            </a:extLst>
-          </p:cNvPr>
+            <a:endParaRPr lang="en-US" dirty="0"/>
+          </a:p>
+        </p:txBody>
+      </p:sp>
+      <p:sp>
+        <p:nvSpPr>
+          <p:cNvPr id="3" name="Content Placeholder 2"/>
           <p:cNvSpPr>
             <a:spLocks noGrp="1"/>
           </p:cNvSpPr>
@@ -6324,6 +5649,7 @@
               <a:rPr lang="en-GB" dirty="0"/>
               <a:t>It should be possible to manage a system as it increases in size, even if parts of the system are located in independent organizations.</a:t>
             </a:r>
+            <a:endParaRPr lang="en-GB" dirty="0"/>
           </a:p>
           <a:p>
             <a:pPr algn="l"/>
@@ -6336,11 +5662,6 @@
         </p:txBody>
       </p:sp>
     </p:spTree>
-    <p:extLst>
-      <p:ext uri="{BB962C8B-B14F-4D97-AF65-F5344CB8AC3E}">
-        <p14:creationId xmlns:p14="http://schemas.microsoft.com/office/powerpoint/2010/main" val="2823472265"/>
-      </p:ext>
-    </p:extLst>
   </p:cSld>
   <p:clrMapOvr>
     <a:masterClrMapping/>
@@ -6353,13 +5674,7 @@
   <p:cSld>
     <p:spTree>
       <p:nvGrpSpPr>
-        <p:cNvPr id="1" name="">
-          <a:extLst>
-            <a:ext uri="{FF2B5EF4-FFF2-40B4-BE49-F238E27FC236}">
-              <a16:creationId xmlns:a16="http://schemas.microsoft.com/office/drawing/2014/main" id="{1F021019-0CA0-3249-37E2-112A6E6AAFD5}"/>
-            </a:ext>
-          </a:extLst>
-        </p:cNvPr>
+        <p:cNvPr id="1" name=""/>
         <p:cNvGrpSpPr/>
         <p:nvPr/>
       </p:nvGrpSpPr>
@@ -6373,13 +5688,7 @@
       </p:grpSpPr>
       <p:sp>
         <p:nvSpPr>
-          <p:cNvPr id="2" name="Title 1">
-            <a:extLst>
-              <a:ext uri="{FF2B5EF4-FFF2-40B4-BE49-F238E27FC236}">
-                <a16:creationId xmlns:a16="http://schemas.microsoft.com/office/drawing/2014/main" id="{8155D814-C2B1-3504-564B-E8EF2224DADC}"/>
-              </a:ext>
-            </a:extLst>
-          </p:cNvPr>
+          <p:cNvPr id="2" name="Title 1"/>
           <p:cNvSpPr>
             <a:spLocks noGrp="1"/>
           </p:cNvSpPr>
@@ -6396,18 +5705,13 @@
               <a:rPr lang="en-US" dirty="0"/>
               <a:t>Scaling Up vs Scaling Out</a:t>
             </a:r>
-          </a:p>
-        </p:txBody>
-      </p:sp>
-      <p:sp>
-        <p:nvSpPr>
-          <p:cNvPr id="3" name="Content Placeholder 2">
-            <a:extLst>
-              <a:ext uri="{FF2B5EF4-FFF2-40B4-BE49-F238E27FC236}">
-                <a16:creationId xmlns:a16="http://schemas.microsoft.com/office/drawing/2014/main" id="{AC0B8D06-17E0-3CE9-EE12-DE7773F2F4FB}"/>
-              </a:ext>
-            </a:extLst>
-          </p:cNvPr>
+            <a:endParaRPr lang="en-US" dirty="0"/>
+          </a:p>
+        </p:txBody>
+      </p:sp>
+      <p:sp>
+        <p:nvSpPr>
+          <p:cNvPr id="3" name="Content Placeholder 2"/>
           <p:cNvSpPr>
             <a:spLocks noGrp="1"/>
           </p:cNvSpPr>
@@ -6426,12 +5730,22 @@
               <a:rPr lang="en-US" dirty="0"/>
               <a:t>Changing the size of a system may involve either scaling up or scaling out.</a:t>
             </a:r>
-          </a:p>
-          <a:p>
-            <a:r>
-              <a:rPr lang="en-US" dirty="0"/>
-              <a:t>Scaling up means replacing resources in the system with more powerful resources. </a:t>
-            </a:r>
+            <a:endParaRPr lang="en-US" dirty="0"/>
+          </a:p>
+          <a:p>
+            <a:r>
+              <a:rPr lang="en-US" dirty="0">
+                <a:highlight>
+                  <a:srgbClr val="FFFF00"/>
+                </a:highlight>
+              </a:rPr>
+              <a:t>Scaling up means replacing resources in the system with more powerful resources.</a:t>
+            </a:r>
+            <a:r>
+              <a:rPr lang="en-US" dirty="0"/>
+              <a:t> </a:t>
+            </a:r>
+            <a:endParaRPr lang="en-US" dirty="0"/>
           </a:p>
           <a:p>
             <a:pPr lvl="1"/>
@@ -6439,12 +5753,22 @@
               <a:rPr lang="en-US" dirty="0"/>
               <a:t>For example, you may increase the memory in a server from 16 Gb to 64 Gb. </a:t>
             </a:r>
-          </a:p>
-          <a:p>
-            <a:r>
-              <a:rPr lang="en-US" dirty="0"/>
+            <a:endParaRPr lang="en-US" dirty="0"/>
+          </a:p>
+          <a:p>
+            <a:r>
+              <a:rPr lang="en-US" dirty="0">
+                <a:highlight>
+                  <a:srgbClr val="FFFF00"/>
+                </a:highlight>
+              </a:rPr>
               <a:t>Scaling out means adding more resources to the system</a:t>
             </a:r>
+            <a:endParaRPr lang="en-US" dirty="0">
+              <a:highlight>
+                <a:srgbClr val="FFFF00"/>
+              </a:highlight>
+            </a:endParaRPr>
           </a:p>
           <a:p>
             <a:pPr lvl="1"/>
@@ -6452,12 +5776,14 @@
               <a:rPr lang="en-US" dirty="0"/>
               <a:t>(e.g., an extra web server to work alongside an existing server). </a:t>
             </a:r>
+            <a:endParaRPr lang="en-US" dirty="0"/>
           </a:p>
           <a:p>
             <a:r>
               <a:rPr lang="en-US" dirty="0"/>
               <a:t>Scaling out is often more cost-effective than scaling up,</a:t>
             </a:r>
+            <a:endParaRPr lang="en-US" dirty="0"/>
           </a:p>
           <a:p>
             <a:pPr lvl="1"/>
@@ -6465,22 +5791,31 @@
               <a:rPr lang="en-US" dirty="0"/>
               <a:t>cloud computing makes it easy to add or remove servers from a system</a:t>
             </a:r>
+            <a:endParaRPr lang="en-US" dirty="0"/>
           </a:p>
           <a:p>
             <a:pPr lvl="1"/>
             <a:r>
               <a:rPr lang="en-US" dirty="0"/>
-              <a:t>however, this only provides performance improvements when concurrent processing is possible.</a:t>
-            </a:r>
+              <a:t>however, this only provides </a:t>
+            </a:r>
+            <a:r>
+              <a:rPr lang="en-US" dirty="0">
+                <a:highlight>
+                  <a:srgbClr val="FFFF00"/>
+                </a:highlight>
+              </a:rPr>
+              <a:t>performance improvements</a:t>
+            </a:r>
+            <a:r>
+              <a:rPr lang="en-US" dirty="0"/>
+              <a:t> when concurrent processing is possible.</a:t>
+            </a:r>
+            <a:endParaRPr lang="en-US" dirty="0"/>
           </a:p>
         </p:txBody>
       </p:sp>
     </p:spTree>
-    <p:extLst>
-      <p:ext uri="{BB962C8B-B14F-4D97-AF65-F5344CB8AC3E}">
-        <p14:creationId xmlns:p14="http://schemas.microsoft.com/office/powerpoint/2010/main" val="1584280398"/>
-      </p:ext>
-    </p:extLst>
   </p:cSld>
   <p:clrMapOvr>
     <a:masterClrMapping/>
@@ -6507,13 +5842,7 @@
       </p:grpSpPr>
       <p:sp>
         <p:nvSpPr>
-          <p:cNvPr id="2" name="Title 1">
-            <a:extLst>
-              <a:ext uri="{FF2B5EF4-FFF2-40B4-BE49-F238E27FC236}">
-                <a16:creationId xmlns:a16="http://schemas.microsoft.com/office/drawing/2014/main" id="{4DD88339-9D81-6523-21DC-820ECEEC525F}"/>
-              </a:ext>
-            </a:extLst>
-          </p:cNvPr>
+          <p:cNvPr id="2" name="Title 1"/>
           <p:cNvSpPr>
             <a:spLocks noGrp="1"/>
           </p:cNvSpPr>
@@ -6530,18 +5859,13 @@
               <a:rPr lang="en-US" dirty="0"/>
               <a:t>Design Goals of a Distributed Systems</a:t>
             </a:r>
-          </a:p>
-        </p:txBody>
-      </p:sp>
-      <p:sp>
-        <p:nvSpPr>
-          <p:cNvPr id="3" name="Content Placeholder 2">
-            <a:extLst>
-              <a:ext uri="{FF2B5EF4-FFF2-40B4-BE49-F238E27FC236}">
-                <a16:creationId xmlns:a16="http://schemas.microsoft.com/office/drawing/2014/main" id="{2CB752DE-FFF2-8FCA-1472-C62165CB90CF}"/>
-              </a:ext>
-            </a:extLst>
-          </p:cNvPr>
+            <a:endParaRPr lang="en-US" dirty="0"/>
+          </a:p>
+        </p:txBody>
+      </p:sp>
+      <p:sp>
+        <p:nvSpPr>
+          <p:cNvPr id="3" name="Content Placeholder 2"/>
           <p:cNvSpPr>
             <a:spLocks noGrp="1"/>
           </p:cNvSpPr>
@@ -6558,6 +5882,7 @@
               <a:rPr lang="en-US" dirty="0"/>
               <a:t>Four important goals that should be met to make building a distributed system worth the effort. </a:t>
             </a:r>
+            <a:endParaRPr lang="en-US" dirty="0"/>
           </a:p>
           <a:p>
             <a:pPr lvl="1"/>
@@ -6565,6 +5890,7 @@
               <a:rPr lang="en-US" dirty="0"/>
               <a:t>a distributed system should make resources easily accessible; </a:t>
             </a:r>
+            <a:endParaRPr lang="en-US" dirty="0"/>
           </a:p>
           <a:p>
             <a:pPr lvl="1"/>
@@ -6572,6 +5898,7 @@
               <a:rPr lang="en-US" dirty="0"/>
               <a:t>it should hide the fact that resources are distributed across a network; </a:t>
             </a:r>
+            <a:endParaRPr lang="en-US" dirty="0"/>
           </a:p>
           <a:p>
             <a:pPr lvl="1"/>
@@ -6579,6 +5906,7 @@
               <a:rPr lang="en-US" dirty="0"/>
               <a:t>it should be open; </a:t>
             </a:r>
+            <a:endParaRPr lang="en-US" dirty="0"/>
           </a:p>
           <a:p>
             <a:pPr lvl="1"/>
@@ -6586,15 +5914,11 @@
               <a:rPr lang="en-US" dirty="0"/>
               <a:t>it should be scalable</a:t>
             </a:r>
+            <a:endParaRPr lang="en-US" dirty="0"/>
           </a:p>
         </p:txBody>
       </p:sp>
     </p:spTree>
-    <p:extLst>
-      <p:ext uri="{BB962C8B-B14F-4D97-AF65-F5344CB8AC3E}">
-        <p14:creationId xmlns:p14="http://schemas.microsoft.com/office/powerpoint/2010/main" val="1740925708"/>
-      </p:ext>
-    </p:extLst>
   </p:cSld>
   <p:clrMapOvr>
     <a:masterClrMapping/>
@@ -6607,13 +5931,7 @@
   <p:cSld>
     <p:spTree>
       <p:nvGrpSpPr>
-        <p:cNvPr id="1" name="">
-          <a:extLst>
-            <a:ext uri="{FF2B5EF4-FFF2-40B4-BE49-F238E27FC236}">
-              <a16:creationId xmlns:a16="http://schemas.microsoft.com/office/drawing/2014/main" id="{03FE82A4-A07B-3E2F-2A73-834C9C110F80}"/>
-            </a:ext>
-          </a:extLst>
-        </p:cNvPr>
+        <p:cNvPr id="1" name=""/>
         <p:cNvGrpSpPr/>
         <p:nvPr/>
       </p:nvGrpSpPr>
@@ -6627,13 +5945,7 @@
       </p:grpSpPr>
       <p:sp>
         <p:nvSpPr>
-          <p:cNvPr id="2" name="Title 1">
-            <a:extLst>
-              <a:ext uri="{FF2B5EF4-FFF2-40B4-BE49-F238E27FC236}">
-                <a16:creationId xmlns:a16="http://schemas.microsoft.com/office/drawing/2014/main" id="{B2EBBF06-C08C-B3D5-FBE0-3702E47611C5}"/>
-              </a:ext>
-            </a:extLst>
-          </p:cNvPr>
+          <p:cNvPr id="2" name="Title 1"/>
           <p:cNvSpPr>
             <a:spLocks noGrp="1"/>
           </p:cNvSpPr>
@@ -6650,18 +5962,13 @@
               <a:rPr lang="en-US" dirty="0"/>
               <a:t>Design Goals of a Distributed Systems</a:t>
             </a:r>
-          </a:p>
-        </p:txBody>
-      </p:sp>
-      <p:sp>
-        <p:nvSpPr>
-          <p:cNvPr id="3" name="Text Placeholder 2">
-            <a:extLst>
-              <a:ext uri="{FF2B5EF4-FFF2-40B4-BE49-F238E27FC236}">
-                <a16:creationId xmlns:a16="http://schemas.microsoft.com/office/drawing/2014/main" id="{68B96FED-B0EF-2F45-9E28-1637B251EA85}"/>
-              </a:ext>
-            </a:extLst>
-          </p:cNvPr>
+            <a:endParaRPr lang="en-US" dirty="0"/>
+          </a:p>
+        </p:txBody>
+      </p:sp>
+      <p:sp>
+        <p:nvSpPr>
+          <p:cNvPr id="3" name="Text Placeholder 2"/>
           <p:cNvSpPr>
             <a:spLocks noGrp="1"/>
           </p:cNvSpPr>
@@ -6684,15 +5991,15 @@
               </a:rPr>
               <a:t>Resource Sharing</a:t>
             </a:r>
+            <a:endParaRPr lang="en-US" sz="4000" b="1" dirty="0">
+              <a:solidFill>
+                <a:schemeClr val="tx1"/>
+              </a:solidFill>
+            </a:endParaRPr>
           </a:p>
         </p:txBody>
       </p:sp>
     </p:spTree>
-    <p:extLst>
-      <p:ext uri="{BB962C8B-B14F-4D97-AF65-F5344CB8AC3E}">
-        <p14:creationId xmlns:p14="http://schemas.microsoft.com/office/powerpoint/2010/main" val="951482673"/>
-      </p:ext>
-    </p:extLst>
   </p:cSld>
   <p:clrMapOvr>
     <a:masterClrMapping/>
@@ -6719,13 +6026,7 @@
       </p:grpSpPr>
       <p:sp>
         <p:nvSpPr>
-          <p:cNvPr id="2" name="Title 1">
-            <a:extLst>
-              <a:ext uri="{FF2B5EF4-FFF2-40B4-BE49-F238E27FC236}">
-                <a16:creationId xmlns:a16="http://schemas.microsoft.com/office/drawing/2014/main" id="{3CD09130-5D97-9996-9BF5-E87E00A35199}"/>
-              </a:ext>
-            </a:extLst>
-          </p:cNvPr>
+          <p:cNvPr id="2" name="Title 1"/>
           <p:cNvSpPr>
             <a:spLocks noGrp="1"/>
           </p:cNvSpPr>
@@ -6742,18 +6043,13 @@
               <a:rPr lang="en-US" dirty="0"/>
               <a:t>Making Resource Accessible</a:t>
             </a:r>
-          </a:p>
-        </p:txBody>
-      </p:sp>
-      <p:sp>
-        <p:nvSpPr>
-          <p:cNvPr id="3" name="Content Placeholder 2">
-            <a:extLst>
-              <a:ext uri="{FF2B5EF4-FFF2-40B4-BE49-F238E27FC236}">
-                <a16:creationId xmlns:a16="http://schemas.microsoft.com/office/drawing/2014/main" id="{F4B5500D-8F9B-8B2B-2D8F-7FA7C3BBA886}"/>
-              </a:ext>
-            </a:extLst>
-          </p:cNvPr>
+            <a:endParaRPr lang="en-US" dirty="0"/>
+          </a:p>
+        </p:txBody>
+      </p:sp>
+      <p:sp>
+        <p:nvSpPr>
+          <p:cNvPr id="3" name="Content Placeholder 2"/>
           <p:cNvSpPr>
             <a:spLocks noGrp="1"/>
           </p:cNvSpPr>
@@ -6773,6 +6069,7 @@
               <a:rPr lang="en-US" dirty="0"/>
               <a:t>An important goal of a distributed system is to make it easy for users (and applications) to access and share remote resources.</a:t>
             </a:r>
+            <a:endParaRPr lang="en-US" dirty="0"/>
           </a:p>
           <a:p>
             <a:pPr algn="just"/>
@@ -6784,6 +6081,7 @@
               <a:rPr lang="en-US" dirty="0"/>
               <a:t>: printers, computers, storage facilities, data, files, services, networks etc.</a:t>
             </a:r>
+            <a:endParaRPr lang="en-US" dirty="0"/>
           </a:p>
           <a:p>
             <a:pPr algn="just"/>
@@ -6791,6 +6089,7 @@
               <a:rPr lang="en-US" dirty="0"/>
               <a:t>Economic reason: it makes economic sense to share costly resources such as supercomputers, high-performance storage systems, e.g., it is cheaper to</a:t>
             </a:r>
+            <a:endParaRPr lang="en-US" dirty="0"/>
           </a:p>
           <a:p>
             <a:pPr lvl="1" algn="just"/>
@@ -6798,6 +6097,7 @@
               <a:rPr lang="en-US" dirty="0"/>
               <a:t>have a single high-end reliable storage facility be shared than having to buy and maintain storage for each user separately.</a:t>
             </a:r>
+            <a:endParaRPr lang="en-US" dirty="0"/>
           </a:p>
           <a:p>
             <a:pPr lvl="1" algn="just"/>
@@ -6805,15 +6105,11 @@
               <a:rPr lang="en-US" dirty="0"/>
               <a:t>it is cheaper to let a printer be shared by several users in an office than having to buy and maintain a separate printer for each user</a:t>
             </a:r>
+            <a:endParaRPr lang="en-US" dirty="0"/>
           </a:p>
         </p:txBody>
       </p:sp>
     </p:spTree>
-    <p:extLst>
-      <p:ext uri="{BB962C8B-B14F-4D97-AF65-F5344CB8AC3E}">
-        <p14:creationId xmlns:p14="http://schemas.microsoft.com/office/powerpoint/2010/main" val="4081994822"/>
-      </p:ext>
-    </p:extLst>
   </p:cSld>
   <p:clrMapOvr>
     <a:masterClrMapping/>
@@ -6840,13 +6136,7 @@
       </p:grpSpPr>
       <p:sp>
         <p:nvSpPr>
-          <p:cNvPr id="2" name="Title 1">
-            <a:extLst>
-              <a:ext uri="{FF2B5EF4-FFF2-40B4-BE49-F238E27FC236}">
-                <a16:creationId xmlns:a16="http://schemas.microsoft.com/office/drawing/2014/main" id="{3CD09130-5D97-9996-9BF5-E87E00A35199}"/>
-              </a:ext>
-            </a:extLst>
-          </p:cNvPr>
+          <p:cNvPr id="2" name="Title 1"/>
           <p:cNvSpPr>
             <a:spLocks noGrp="1"/>
           </p:cNvSpPr>
@@ -6861,20 +6151,27 @@
           <a:p>
             <a:r>
               <a:rPr lang="en-US" dirty="0"/>
-              <a:t>Making Resource Accessible</a:t>
-            </a:r>
-          </a:p>
-        </p:txBody>
-      </p:sp>
-      <p:sp>
-        <p:nvSpPr>
-          <p:cNvPr id="3" name="Content Placeholder 2">
-            <a:extLst>
-              <a:ext uri="{FF2B5EF4-FFF2-40B4-BE49-F238E27FC236}">
-                <a16:creationId xmlns:a16="http://schemas.microsoft.com/office/drawing/2014/main" id="{F4B5500D-8F9B-8B2B-2D8F-7FA7C3BBA886}"/>
-              </a:ext>
-            </a:extLst>
-          </p:cNvPr>
+              <a:t>Making </a:t>
+            </a:r>
+            <a:r>
+              <a:rPr lang="en-US" dirty="0">
+                <a:highlight>
+                  <a:srgbClr val="FFFF00"/>
+                </a:highlight>
+              </a:rPr>
+              <a:t>Resource Accessible</a:t>
+            </a:r>
+            <a:endParaRPr lang="en-US" dirty="0">
+              <a:highlight>
+                <a:srgbClr val="FFFF00"/>
+              </a:highlight>
+            </a:endParaRPr>
+          </a:p>
+        </p:txBody>
+      </p:sp>
+      <p:sp>
+        <p:nvSpPr>
+          <p:cNvPr id="3" name="Content Placeholder 2"/>
           <p:cNvSpPr>
             <a:spLocks noGrp="1"/>
           </p:cNvSpPr>
@@ -6894,6 +6191,7 @@
               <a:rPr lang="en-US" dirty="0"/>
               <a:t>More advantages</a:t>
             </a:r>
+            <a:endParaRPr lang="en-US" dirty="0"/>
           </a:p>
           <a:p>
             <a:pPr lvl="1" algn="just"/>
@@ -6901,6 +6199,7 @@
               <a:rPr lang="en-US" dirty="0"/>
               <a:t>Connecting users and resources also makes it easier to collaborate and exchange information</a:t>
             </a:r>
+            <a:endParaRPr lang="en-US" dirty="0"/>
           </a:p>
           <a:p>
             <a:pPr lvl="1" algn="just"/>
@@ -6908,15 +6207,11 @@
               <a:rPr lang="en-US" dirty="0"/>
               <a:t>collaboration tools such as software for collaborative editing, teleconferencing, and so on that became (more easily) available due to the COVID-19 pandemic</a:t>
             </a:r>
+            <a:endParaRPr lang="en-US" dirty="0"/>
           </a:p>
         </p:txBody>
       </p:sp>
     </p:spTree>
-    <p:extLst>
-      <p:ext uri="{BB962C8B-B14F-4D97-AF65-F5344CB8AC3E}">
-        <p14:creationId xmlns:p14="http://schemas.microsoft.com/office/powerpoint/2010/main" val="4254342714"/>
-      </p:ext>
-    </p:extLst>
   </p:cSld>
   <p:clrMapOvr>
     <a:masterClrMapping/>
@@ -6943,13 +6238,7 @@
       </p:grpSpPr>
       <p:sp>
         <p:nvSpPr>
-          <p:cNvPr id="2" name="Title 1">
-            <a:extLst>
-              <a:ext uri="{FF2B5EF4-FFF2-40B4-BE49-F238E27FC236}">
-                <a16:creationId xmlns:a16="http://schemas.microsoft.com/office/drawing/2014/main" id="{9B61ED1B-3659-B7C1-080B-9B5E71DE097F}"/>
-              </a:ext>
-            </a:extLst>
-          </p:cNvPr>
+          <p:cNvPr id="2" name="Title 1"/>
           <p:cNvSpPr>
             <a:spLocks noGrp="1"/>
           </p:cNvSpPr>
@@ -6966,18 +6255,13 @@
               <a:rPr lang="en-US" dirty="0"/>
               <a:t>Design Goals of a Distributed Systems</a:t>
             </a:r>
-          </a:p>
-        </p:txBody>
-      </p:sp>
-      <p:sp>
-        <p:nvSpPr>
-          <p:cNvPr id="3" name="Text Placeholder 2">
-            <a:extLst>
-              <a:ext uri="{FF2B5EF4-FFF2-40B4-BE49-F238E27FC236}">
-                <a16:creationId xmlns:a16="http://schemas.microsoft.com/office/drawing/2014/main" id="{651E0CF6-DF3E-9103-BD39-4B63C2F4287F}"/>
-              </a:ext>
-            </a:extLst>
-          </p:cNvPr>
+            <a:endParaRPr lang="en-US" dirty="0"/>
+          </a:p>
+        </p:txBody>
+      </p:sp>
+      <p:sp>
+        <p:nvSpPr>
+          <p:cNvPr id="3" name="Text Placeholder 2"/>
           <p:cNvSpPr>
             <a:spLocks noGrp="1"/>
           </p:cNvSpPr>
@@ -7000,15 +6284,15 @@
               </a:rPr>
               <a:t>Distribution transparency</a:t>
             </a:r>
+            <a:endParaRPr lang="en-US" sz="4000" b="1" dirty="0">
+              <a:solidFill>
+                <a:schemeClr val="tx1"/>
+              </a:solidFill>
+            </a:endParaRPr>
           </a:p>
         </p:txBody>
       </p:sp>
     </p:spTree>
-    <p:extLst>
-      <p:ext uri="{BB962C8B-B14F-4D97-AF65-F5344CB8AC3E}">
-        <p14:creationId xmlns:p14="http://schemas.microsoft.com/office/powerpoint/2010/main" val="2517829271"/>
-      </p:ext>
-    </p:extLst>
   </p:cSld>
   <p:clrMapOvr>
     <a:masterClrMapping/>
@@ -7035,13 +6319,7 @@
       </p:grpSpPr>
       <p:sp>
         <p:nvSpPr>
-          <p:cNvPr id="4" name="Title 3">
-            <a:extLst>
-              <a:ext uri="{FF2B5EF4-FFF2-40B4-BE49-F238E27FC236}">
-                <a16:creationId xmlns:a16="http://schemas.microsoft.com/office/drawing/2014/main" id="{520FE37F-2DD6-84A0-E8EB-7FE76148C0B4}"/>
-              </a:ext>
-            </a:extLst>
-          </p:cNvPr>
+          <p:cNvPr id="4" name="Title 3"/>
           <p:cNvSpPr>
             <a:spLocks noGrp="1"/>
           </p:cNvSpPr>
@@ -7055,21 +6333,24 @@
           <a:lstStyle/>
           <a:p>
             <a:r>
-              <a:rPr lang="en-US" dirty="0"/>
+              <a:rPr lang="en-US" dirty="0">
+                <a:highlight>
+                  <a:srgbClr val="FFFF00"/>
+                </a:highlight>
+              </a:rPr>
               <a:t>Distribution transparency</a:t>
             </a:r>
-          </a:p>
-        </p:txBody>
-      </p:sp>
-      <p:sp>
-        <p:nvSpPr>
-          <p:cNvPr id="5" name="Content Placeholder 4">
-            <a:extLst>
-              <a:ext uri="{FF2B5EF4-FFF2-40B4-BE49-F238E27FC236}">
-                <a16:creationId xmlns:a16="http://schemas.microsoft.com/office/drawing/2014/main" id="{BBDA2841-01C1-E86B-9262-1D992EA7C4CC}"/>
-              </a:ext>
-            </a:extLst>
-          </p:cNvPr>
+            <a:endParaRPr lang="en-US" dirty="0">
+              <a:highlight>
+                <a:srgbClr val="FFFF00"/>
+              </a:highlight>
+            </a:endParaRPr>
+          </a:p>
+        </p:txBody>
+      </p:sp>
+      <p:sp>
+        <p:nvSpPr>
+          <p:cNvPr id="5" name="Content Placeholder 4"/>
           <p:cNvSpPr>
             <a:spLocks noGrp="1"/>
           </p:cNvSpPr>
@@ -7087,6 +6368,7 @@
               <a:rPr lang="en-US" dirty="0"/>
               <a:t>An important goal of a distributed system is to hide the fact that its processes and resources are physically distributed across multiple computers, possibly separated by large distances. </a:t>
             </a:r>
+            <a:endParaRPr lang="en-US" dirty="0"/>
           </a:p>
           <a:p>
             <a:pPr algn="just"/>
@@ -7102,26 +6384,35 @@
               <a:rPr lang="en-US" dirty="0"/>
               <a:t>, that is, invisible, to end users and applications.</a:t>
             </a:r>
+            <a:endParaRPr lang="en-US" dirty="0"/>
           </a:p>
           <a:p>
             <a:pPr algn="just"/>
             <a:r>
-              <a:rPr lang="en-US" dirty="0"/>
+              <a:rPr lang="en-US" dirty="0">
+                <a:highlight>
+                  <a:srgbClr val="FFFF00"/>
+                </a:highlight>
+              </a:rPr>
               <a:t>A system that is able to present itself to users and applications as if it were only a single computer system is said to be transparent.</a:t>
             </a:r>
+            <a:endParaRPr lang="en-US" dirty="0">
+              <a:highlight>
+                <a:srgbClr val="FFFF00"/>
+              </a:highlight>
+            </a:endParaRPr>
           </a:p>
           <a:p>
             <a:pPr algn="just"/>
-            <a:endParaRPr lang="en-US" dirty="0"/>
+            <a:endParaRPr lang="en-US" dirty="0">
+              <a:highlight>
+                <a:srgbClr val="FFFF00"/>
+              </a:highlight>
+            </a:endParaRPr>
           </a:p>
         </p:txBody>
       </p:sp>
     </p:spTree>
-    <p:extLst>
-      <p:ext uri="{BB962C8B-B14F-4D97-AF65-F5344CB8AC3E}">
-        <p14:creationId xmlns:p14="http://schemas.microsoft.com/office/powerpoint/2010/main" val="784316338"/>
-      </p:ext>
-    </p:extLst>
   </p:cSld>
   <p:clrMapOvr>
     <a:masterClrMapping/>
@@ -7134,13 +6425,7 @@
   <p:cSld>
     <p:spTree>
       <p:nvGrpSpPr>
-        <p:cNvPr id="1" name="">
-          <a:extLst>
-            <a:ext uri="{FF2B5EF4-FFF2-40B4-BE49-F238E27FC236}">
-              <a16:creationId xmlns:a16="http://schemas.microsoft.com/office/drawing/2014/main" id="{D1A4CA18-3C00-6FD7-78E2-F21564575616}"/>
-            </a:ext>
-          </a:extLst>
-        </p:cNvPr>
+        <p:cNvPr id="1" name=""/>
         <p:cNvGrpSpPr/>
         <p:nvPr/>
       </p:nvGrpSpPr>
@@ -7154,13 +6439,7 @@
       </p:grpSpPr>
       <p:sp>
         <p:nvSpPr>
-          <p:cNvPr id="4" name="Title 3">
-            <a:extLst>
-              <a:ext uri="{FF2B5EF4-FFF2-40B4-BE49-F238E27FC236}">
-                <a16:creationId xmlns:a16="http://schemas.microsoft.com/office/drawing/2014/main" id="{FDC6B8D2-5630-A733-7E00-B2D1731473DB}"/>
-              </a:ext>
-            </a:extLst>
-          </p:cNvPr>
+          <p:cNvPr id="4" name="Title 3"/>
           <p:cNvSpPr>
             <a:spLocks noGrp="1"/>
           </p:cNvSpPr>
@@ -7177,18 +6456,13 @@
               <a:rPr lang="en-US" dirty="0"/>
               <a:t>Distribution transparency</a:t>
             </a:r>
-          </a:p>
-        </p:txBody>
-      </p:sp>
-      <p:sp>
-        <p:nvSpPr>
-          <p:cNvPr id="5" name="Content Placeholder 4">
-            <a:extLst>
-              <a:ext uri="{FF2B5EF4-FFF2-40B4-BE49-F238E27FC236}">
-                <a16:creationId xmlns:a16="http://schemas.microsoft.com/office/drawing/2014/main" id="{1E733663-8819-2CD1-9838-CF9435854C71}"/>
-              </a:ext>
-            </a:extLst>
-          </p:cNvPr>
+            <a:endParaRPr lang="en-US" dirty="0"/>
+          </a:p>
+        </p:txBody>
+      </p:sp>
+      <p:sp>
+        <p:nvSpPr>
+          <p:cNvPr id="5" name="Content Placeholder 4"/>
           <p:cNvSpPr>
             <a:spLocks noGrp="1"/>
           </p:cNvSpPr>
@@ -7208,13 +6482,27 @@
               <a:rPr lang="en-US" dirty="0"/>
               <a:t>A system that is able to present itself to users and applications as if it were only a single computer system is said to be transparent.</a:t>
             </a:r>
+            <a:endParaRPr lang="en-US" dirty="0"/>
           </a:p>
           <a:p>
             <a:pPr algn="just"/>
             <a:r>
               <a:rPr lang="en-US" dirty="0"/>
-              <a:t>To make a distributed system transparent (i.e., conceal its distributed nature), you have to hide the underlying distribution.</a:t>
-            </a:r>
+              <a:t>To make a distributed system transparent (i.e., </a:t>
+            </a:r>
+            <a:r>
+              <a:rPr lang="en-US" dirty="0">
+                <a:highlight>
+                  <a:srgbClr val="FFFF00"/>
+                </a:highlight>
+              </a:rPr>
+              <a:t>conceal </a:t>
+            </a:r>
+            <a:r>
+              <a:rPr lang="en-US" dirty="0"/>
+              <a:t>its distributed nature), you have to hide the underlying distribution.</a:t>
+            </a:r>
+            <a:endParaRPr lang="en-US" dirty="0"/>
           </a:p>
           <a:p>
             <a:pPr algn="just"/>
@@ -7222,6 +6510,7 @@
               <a:rPr lang="en-US" dirty="0"/>
               <a:t>You create abstractions that hide the system resources so that the location and implementation of these resources can be changed without having to change the distributed application.</a:t>
             </a:r>
+            <a:endParaRPr lang="en-US" dirty="0"/>
           </a:p>
           <a:p>
             <a:pPr algn="just"/>
@@ -7229,6 +6518,7 @@
               <a:rPr lang="en-US" dirty="0"/>
               <a:t>Resources should be abstracted and addressed logically rather than physically.</a:t>
             </a:r>
+            <a:endParaRPr lang="en-US" dirty="0"/>
           </a:p>
           <a:p>
             <a:pPr algn="just"/>
@@ -7236,6 +6526,7 @@
               <a:rPr lang="en-US" dirty="0"/>
               <a:t>Middleware is used to map resources referenced by a program onto the actual physical resources.</a:t>
             </a:r>
+            <a:endParaRPr lang="en-US" dirty="0"/>
           </a:p>
           <a:p>
             <a:pPr algn="just"/>
@@ -7243,12 +6534,44 @@
           </a:p>
         </p:txBody>
       </p:sp>
+      <p:sp>
+        <p:nvSpPr>
+          <p:cNvPr id="2" name="Text Box 1"/>
+          <p:cNvSpPr txBox="1"/>
+          <p:nvPr/>
+        </p:nvSpPr>
+        <p:spPr>
+          <a:xfrm>
+            <a:off x="9085580" y="2511425"/>
+            <a:ext cx="4219575" cy="368300"/>
+          </a:xfrm>
+          <a:prstGeom prst="rect">
+            <a:avLst/>
+          </a:prstGeom>
+          <a:noFill/>
+        </p:spPr>
+        <p:txBody>
+          <a:bodyPr wrap="square" rtlCol="0">
+            <a:noAutofit/>
+          </a:bodyPr>
+          <a:p>
+            <a:r>
+              <a:rPr lang="" altLang="en-US"/>
+              <a:t>লুক্কায়িত</a:t>
+            </a:r>
+            <a:r>
+              <a:rPr lang="en-US" altLang="en-US"/>
+              <a:t> </a:t>
+            </a:r>
+            <a:r>
+              <a:rPr lang="" altLang="en-US"/>
+              <a:t>করা</a:t>
+            </a:r>
+            <a:endParaRPr lang="" altLang="en-US"/>
+          </a:p>
+        </p:txBody>
+      </p:sp>
     </p:spTree>
-    <p:extLst>
-      <p:ext uri="{BB962C8B-B14F-4D97-AF65-F5344CB8AC3E}">
-        <p14:creationId xmlns:p14="http://schemas.microsoft.com/office/powerpoint/2010/main" val="2453477097"/>
-      </p:ext>
-    </p:extLst>
   </p:cSld>
   <p:clrMapOvr>
     <a:masterClrMapping/>
@@ -7299,7 +6622,7 @@
     </a:clrScheme>
     <a:fontScheme name="Office">
       <a:majorFont>
-        <a:latin typeface="Calibri Light" panose="020F0302020204030204"/>
+        <a:latin typeface="Calibri Light"/>
         <a:ea typeface=""/>
         <a:cs typeface=""/>
         <a:font script="Jpan" typeface="游ゴシック Light"/>
@@ -7332,26 +6655,9 @@
         <a:font script="Viet" typeface="Times New Roman"/>
         <a:font script="Uigh" typeface="Microsoft Uighur"/>
         <a:font script="Geor" typeface="Sylfaen"/>
-        <a:font script="Armn" typeface="Arial"/>
-        <a:font script="Bugi" typeface="Leelawadee UI"/>
-        <a:font script="Bopo" typeface="Microsoft JhengHei"/>
-        <a:font script="Java" typeface="Javanese Text"/>
-        <a:font script="Lisu" typeface="Segoe UI"/>
-        <a:font script="Mymr" typeface="Myanmar Text"/>
-        <a:font script="Nkoo" typeface="Ebrima"/>
-        <a:font script="Olck" typeface="Nirmala UI"/>
-        <a:font script="Osma" typeface="Ebrima"/>
-        <a:font script="Phag" typeface="Phagspa"/>
-        <a:font script="Syrn" typeface="Estrangelo Edessa"/>
-        <a:font script="Syrj" typeface="Estrangelo Edessa"/>
-        <a:font script="Syre" typeface="Estrangelo Edessa"/>
-        <a:font script="Sora" typeface="Nirmala UI"/>
-        <a:font script="Tale" typeface="Microsoft Tai Le"/>
-        <a:font script="Talu" typeface="Microsoft New Tai Lue"/>
-        <a:font script="Tfng" typeface="Ebrima"/>
       </a:majorFont>
       <a:minorFont>
-        <a:latin typeface="Calibri" panose="020F0502020204030204"/>
+        <a:latin typeface="Calibri"/>
         <a:ea typeface=""/>
         <a:cs typeface=""/>
         <a:font script="Jpan" typeface="游ゴシック"/>
@@ -7384,23 +6690,6 @@
         <a:font script="Viet" typeface="Arial"/>
         <a:font script="Uigh" typeface="Microsoft Uighur"/>
         <a:font script="Geor" typeface="Sylfaen"/>
-        <a:font script="Armn" typeface="Arial"/>
-        <a:font script="Bugi" typeface="Leelawadee UI"/>
-        <a:font script="Bopo" typeface="Microsoft JhengHei"/>
-        <a:font script="Java" typeface="Javanese Text"/>
-        <a:font script="Lisu" typeface="Segoe UI"/>
-        <a:font script="Mymr" typeface="Myanmar Text"/>
-        <a:font script="Nkoo" typeface="Ebrima"/>
-        <a:font script="Olck" typeface="Nirmala UI"/>
-        <a:font script="Osma" typeface="Ebrima"/>
-        <a:font script="Phag" typeface="Phagspa"/>
-        <a:font script="Syrn" typeface="Estrangelo Edessa"/>
-        <a:font script="Syrj" typeface="Estrangelo Edessa"/>
-        <a:font script="Syre" typeface="Estrangelo Edessa"/>
-        <a:font script="Sora" typeface="Nirmala UI"/>
-        <a:font script="Tale" typeface="Microsoft Tai Le"/>
-        <a:font script="Talu" typeface="Microsoft New Tai Lue"/>
-        <a:font script="Tfng" typeface="Ebrima"/>
       </a:minorFont>
     </a:fontScheme>
     <a:fmtScheme name="Office">
@@ -7541,8 +6830,6 @@
       </a:bgFillStyleLst>
     </a:fmtScheme>
   </a:themeElements>
-  <a:objectDefaults/>
-  <a:extraClrSchemeLst/>
   <a:extLst>
     <a:ext uri="{05A4C25C-085E-4340-85A3-A5531E510DB2}">
       <thm15:themeFamily xmlns:thm15="http://schemas.microsoft.com/office/thememl/2012/main" name="Office Theme" id="{62F939B6-93AF-4DB8-9C6B-D6C7DFDC589F}" vid="{4A3C46E8-61CC-4603-A589-7422A47A8E4A}"/>
@@ -7594,7 +6881,7 @@
     </a:clrScheme>
     <a:fontScheme name="Office">
       <a:majorFont>
-        <a:latin typeface="Calibri Light" panose="020F0302020204030204"/>
+        <a:latin typeface="Calibri Light"/>
         <a:ea typeface=""/>
         <a:cs typeface=""/>
         <a:font script="Jpan" typeface="游ゴシック Light"/>
@@ -7627,26 +6914,9 @@
         <a:font script="Viet" typeface="Times New Roman"/>
         <a:font script="Uigh" typeface="Microsoft Uighur"/>
         <a:font script="Geor" typeface="Sylfaen"/>
-        <a:font script="Armn" typeface="Arial"/>
-        <a:font script="Bugi" typeface="Leelawadee UI"/>
-        <a:font script="Bopo" typeface="Microsoft JhengHei"/>
-        <a:font script="Java" typeface="Javanese Text"/>
-        <a:font script="Lisu" typeface="Segoe UI"/>
-        <a:font script="Mymr" typeface="Myanmar Text"/>
-        <a:font script="Nkoo" typeface="Ebrima"/>
-        <a:font script="Olck" typeface="Nirmala UI"/>
-        <a:font script="Osma" typeface="Ebrima"/>
-        <a:font script="Phag" typeface="Phagspa"/>
-        <a:font script="Syrn" typeface="Estrangelo Edessa"/>
-        <a:font script="Syrj" typeface="Estrangelo Edessa"/>
-        <a:font script="Syre" typeface="Estrangelo Edessa"/>
-        <a:font script="Sora" typeface="Nirmala UI"/>
-        <a:font script="Tale" typeface="Microsoft Tai Le"/>
-        <a:font script="Talu" typeface="Microsoft New Tai Lue"/>
-        <a:font script="Tfng" typeface="Ebrima"/>
       </a:majorFont>
       <a:minorFont>
-        <a:latin typeface="Calibri" panose="020F0502020204030204"/>
+        <a:latin typeface="Calibri"/>
         <a:ea typeface=""/>
         <a:cs typeface=""/>
         <a:font script="Jpan" typeface="游ゴシック"/>
@@ -7679,23 +6949,6 @@
         <a:font script="Viet" typeface="Arial"/>
         <a:font script="Uigh" typeface="Microsoft Uighur"/>
         <a:font script="Geor" typeface="Sylfaen"/>
-        <a:font script="Armn" typeface="Arial"/>
-        <a:font script="Bugi" typeface="Leelawadee UI"/>
-        <a:font script="Bopo" typeface="Microsoft JhengHei"/>
-        <a:font script="Java" typeface="Javanese Text"/>
-        <a:font script="Lisu" typeface="Segoe UI"/>
-        <a:font script="Mymr" typeface="Myanmar Text"/>
-        <a:font script="Nkoo" typeface="Ebrima"/>
-        <a:font script="Olck" typeface="Nirmala UI"/>
-        <a:font script="Osma" typeface="Ebrima"/>
-        <a:font script="Phag" typeface="Phagspa"/>
-        <a:font script="Syrn" typeface="Estrangelo Edessa"/>
-        <a:font script="Syrj" typeface="Estrangelo Edessa"/>
-        <a:font script="Syre" typeface="Estrangelo Edessa"/>
-        <a:font script="Sora" typeface="Nirmala UI"/>
-        <a:font script="Tale" typeface="Microsoft Tai Le"/>
-        <a:font script="Talu" typeface="Microsoft New Tai Lue"/>
-        <a:font script="Tfng" typeface="Ebrima"/>
       </a:minorFont>
     </a:fontScheme>
     <a:fmtScheme name="Office">
@@ -7836,8 +7089,6 @@
       </a:bgFillStyleLst>
     </a:fmtScheme>
   </a:themeElements>
-  <a:objectDefaults/>
-  <a:extraClrSchemeLst/>
   <a:extLst>
     <a:ext uri="{05A4C25C-085E-4340-85A3-A5531E510DB2}">
       <thm15:themeFamily xmlns:thm15="http://schemas.microsoft.com/office/thememl/2012/main" name="Office Theme" id="{62F939B6-93AF-4DB8-9C6B-D6C7DFDC589F}" vid="{4A3C46E8-61CC-4603-A589-7422A47A8E4A}"/>

</xml_diff>